<commit_message>
`Updated FItnessstan_Final Presentation_Part 2.pptx file`
</commit_message>
<xml_diff>
--- a/fitnesstan-documentation/FItnessstan_Final Presentation_Part 2.pptx
+++ b/fitnesstan-documentation/FItnessstan_Final Presentation_Part 2.pptx
@@ -42,12 +42,12 @@
     <p:sldId id="291" r:id="rId33"/>
     <p:sldId id="292" r:id="rId34"/>
     <p:sldId id="293" r:id="rId35"/>
-    <p:sldId id="271" r:id="rId36"/>
-    <p:sldId id="265" r:id="rId37"/>
-    <p:sldId id="266" r:id="rId38"/>
-    <p:sldId id="295" r:id="rId39"/>
-    <p:sldId id="272" r:id="rId40"/>
-    <p:sldId id="273" r:id="rId41"/>
+    <p:sldId id="296" r:id="rId36"/>
+    <p:sldId id="271" r:id="rId37"/>
+    <p:sldId id="265" r:id="rId38"/>
+    <p:sldId id="266" r:id="rId39"/>
+    <p:sldId id="295" r:id="rId40"/>
+    <p:sldId id="297" r:id="rId41"/>
   </p:sldIdLst>
   <p:sldSz cx="9144000" cy="6858000" type="screen4x3"/>
   <p:notesSz cx="7315200" cy="9601200"/>
@@ -296,7 +296,7 @@
       </p15:sldGuideLst>
     </p:ext>
     <p:ext uri="http://customooxmlschemas.google.com/">
-      <go:slidesCustomData xmlns="" xmlns:mc="http://schemas.openxmlformats.org/markup-compatibility/2006" xmlns:mv="urn:schemas-microsoft-com:mac:vml" xmlns:c="http://schemas.openxmlformats.org/drawingml/2006/chart" xmlns:dgm="http://schemas.openxmlformats.org/drawingml/2006/diagram" xmlns:o="urn:schemas-microsoft-com:office:office" xmlns:v="urn:schemas-microsoft-com:vml" xmlns:pvml="urn:schemas-microsoft-com:office:powerpoint" xmlns:com="http://schemas.openxmlformats.org/drawingml/2006/compatibility" xmlns:p14="http://schemas.microsoft.com/office/powerpoint/2010/main" xmlns:p15="http://schemas.microsoft.com/office/powerpoint/2012/main" xmlns:ahyp="http://schemas.microsoft.com/office/drawing/2018/hyperlinkcolor" xmlns:go="http://customooxmlschemas.google.com/" r:id="rId43" roundtripDataSignature="AMtx7mj2AY3DNheaNSztFqwRHhpggp8VFA=="/>
+      <go:slidesCustomData xmlns:go="http://customooxmlschemas.google.com/" xmlns:ahyp="http://schemas.microsoft.com/office/drawing/2018/hyperlinkcolor" xmlns:p15="http://schemas.microsoft.com/office/powerpoint/2012/main" xmlns:p14="http://schemas.microsoft.com/office/powerpoint/2010/main" xmlns:com="http://schemas.openxmlformats.org/drawingml/2006/compatibility" xmlns:pvml="urn:schemas-microsoft-com:office:powerpoint" xmlns:v="urn:schemas-microsoft-com:vml" xmlns:o="urn:schemas-microsoft-com:office:office" xmlns:dgm="http://schemas.openxmlformats.org/drawingml/2006/diagram" xmlns:c="http://schemas.openxmlformats.org/drawingml/2006/chart" xmlns:mv="urn:schemas-microsoft-com:mac:vml" xmlns:mc="http://schemas.openxmlformats.org/markup-compatibility/2006" xmlns="" r:id="rId43" roundtripDataSignature="AMtx7mj2AY3DNheaNSztFqwRHhpggp8VFA=="/>
     </p:ext>
   </p:extLst>
 </p:presentation>
@@ -1586,6 +1586,72 @@
 </file>
 
 <file path=ppt/notesSlides/notesSlide17.xml><?xml version="1.0" encoding="utf-8"?>
+<p:notes xmlns:a="http://schemas.openxmlformats.org/drawingml/2006/main" xmlns:r="http://schemas.openxmlformats.org/officeDocument/2006/relationships" xmlns:p="http://schemas.openxmlformats.org/presentationml/2006/main">
+  <p:cSld>
+    <p:spTree>
+      <p:nvGrpSpPr>
+        <p:cNvPr id="1" name=""/>
+        <p:cNvGrpSpPr/>
+        <p:nvPr/>
+      </p:nvGrpSpPr>
+      <p:grpSpPr>
+        <a:xfrm>
+          <a:off x="0" y="0"/>
+          <a:ext cx="0" cy="0"/>
+          <a:chOff x="0" y="0"/>
+          <a:chExt cx="0" cy="0"/>
+        </a:xfrm>
+      </p:grpSpPr>
+      <p:sp>
+        <p:nvSpPr>
+          <p:cNvPr id="2" name="Slide Image Placeholder 1"/>
+          <p:cNvSpPr>
+            <a:spLocks noGrp="1" noRot="1" noChangeAspect="1"/>
+          </p:cNvSpPr>
+          <p:nvPr>
+            <p:ph type="sldImg"/>
+          </p:nvPr>
+        </p:nvSpPr>
+        <p:spPr>
+          <a:xfrm>
+            <a:off x="1257300" y="720725"/>
+            <a:ext cx="4800600" cy="3600450"/>
+          </a:xfrm>
+        </p:spPr>
+      </p:sp>
+      <p:sp>
+        <p:nvSpPr>
+          <p:cNvPr id="3" name="Notes Placeholder 2"/>
+          <p:cNvSpPr>
+            <a:spLocks noGrp="1"/>
+          </p:cNvSpPr>
+          <p:nvPr>
+            <p:ph type="body" idx="1"/>
+          </p:nvPr>
+        </p:nvSpPr>
+        <p:spPr/>
+        <p:txBody>
+          <a:bodyPr/>
+          <a:lstStyle/>
+          <a:p>
+            <a:endParaRPr lang="en-GB" dirty="0"/>
+          </a:p>
+        </p:txBody>
+      </p:sp>
+    </p:spTree>
+    <p:extLst>
+      <p:ext uri="{BB962C8B-B14F-4D97-AF65-F5344CB8AC3E}">
+        <p14:creationId xmlns:p14="http://schemas.microsoft.com/office/powerpoint/2010/main" val="2632209161"/>
+      </p:ext>
+    </p:extLst>
+  </p:cSld>
+  <p:clrMapOvr>
+    <a:masterClrMapping/>
+  </p:clrMapOvr>
+</p:notes>
+</file>
+
+<file path=ppt/notesSlides/notesSlide18.xml><?xml version="1.0" encoding="utf-8"?>
 <p:notes xmlns:a="http://schemas.openxmlformats.org/drawingml/2006/main" xmlns:r="http://schemas.openxmlformats.org/officeDocument/2006/relationships" xmlns:p="http://schemas.openxmlformats.org/presentationml/2006/main" showMasterSp="0" showMasterPhAnim="0">
   <p:cSld>
     <p:spTree>
@@ -1689,7 +1755,7 @@
 </p:notes>
 </file>
 
-<file path=ppt/notesSlides/notesSlide18.xml><?xml version="1.0" encoding="utf-8"?>
+<file path=ppt/notesSlides/notesSlide19.xml><?xml version="1.0" encoding="utf-8"?>
 <p:notes xmlns:a="http://schemas.openxmlformats.org/drawingml/2006/main" xmlns:r="http://schemas.openxmlformats.org/officeDocument/2006/relationships" xmlns:p="http://schemas.openxmlformats.org/presentationml/2006/main" showMasterSp="0" showMasterPhAnim="0">
   <p:cSld>
     <p:spTree>
@@ -1747,110 +1813,6 @@
       <p:sp>
         <p:nvSpPr>
           <p:cNvPr id="137" name="Google Shape;137;p10:notes"/>
-          <p:cNvSpPr>
-            <a:spLocks noGrp="1" noRot="1" noChangeAspect="1"/>
-          </p:cNvSpPr>
-          <p:nvPr>
-            <p:ph type="sldImg" idx="2"/>
-          </p:nvPr>
-        </p:nvSpPr>
-        <p:spPr>
-          <a:xfrm>
-            <a:off x="1257300" y="720725"/>
-            <a:ext cx="4800600" cy="3600450"/>
-          </a:xfrm>
-          <a:custGeom>
-            <a:avLst/>
-            <a:gdLst/>
-            <a:ahLst/>
-            <a:cxnLst/>
-            <a:rect l="l" t="t" r="r" b="b"/>
-            <a:pathLst>
-              <a:path w="120000" h="120000" extrusionOk="0">
-                <a:moveTo>
-                  <a:pt x="0" y="0"/>
-                </a:moveTo>
-                <a:lnTo>
-                  <a:pt x="120000" y="0"/>
-                </a:lnTo>
-                <a:lnTo>
-                  <a:pt x="120000" y="120000"/>
-                </a:lnTo>
-                <a:lnTo>
-                  <a:pt x="0" y="120000"/>
-                </a:lnTo>
-                <a:close/>
-              </a:path>
-            </a:pathLst>
-          </a:custGeom>
-        </p:spPr>
-      </p:sp>
-    </p:spTree>
-  </p:cSld>
-  <p:clrMapOvr>
-    <a:masterClrMapping/>
-  </p:clrMapOvr>
-</p:notes>
-</file>
-
-<file path=ppt/notesSlides/notesSlide19.xml><?xml version="1.0" encoding="utf-8"?>
-<p:notes xmlns:a="http://schemas.openxmlformats.org/drawingml/2006/main" xmlns:r="http://schemas.openxmlformats.org/officeDocument/2006/relationships" xmlns:p="http://schemas.openxmlformats.org/presentationml/2006/main" showMasterSp="0" showMasterPhAnim="0">
-  <p:cSld>
-    <p:spTree>
-      <p:nvGrpSpPr>
-        <p:cNvPr id="1" name="Shape 141"/>
-        <p:cNvGrpSpPr/>
-        <p:nvPr/>
-      </p:nvGrpSpPr>
-      <p:grpSpPr>
-        <a:xfrm>
-          <a:off x="0" y="0"/>
-          <a:ext cx="0" cy="0"/>
-          <a:chOff x="0" y="0"/>
-          <a:chExt cx="0" cy="0"/>
-        </a:xfrm>
-      </p:grpSpPr>
-      <p:sp>
-        <p:nvSpPr>
-          <p:cNvPr id="142" name="Google Shape;142;p11:notes"/>
-          <p:cNvSpPr txBox="1">
-            <a:spLocks noGrp="1"/>
-          </p:cNvSpPr>
-          <p:nvPr>
-            <p:ph type="body" idx="1"/>
-          </p:nvPr>
-        </p:nvSpPr>
-        <p:spPr>
-          <a:xfrm>
-            <a:off x="731500" y="4560550"/>
-            <a:ext cx="5852150" cy="4320525"/>
-          </a:xfrm>
-          <a:prstGeom prst="rect">
-            <a:avLst/>
-          </a:prstGeom>
-        </p:spPr>
-        <p:txBody>
-          <a:bodyPr spcFirstLastPara="1" wrap="square" lIns="91425" tIns="91425" rIns="91425" bIns="91425" anchor="t" anchorCtr="0">
-            <a:noAutofit/>
-          </a:bodyPr>
-          <a:lstStyle/>
-          <a:p>
-            <a:pPr marL="0" lvl="0" indent="0" algn="l" rtl="0">
-              <a:spcBef>
-                <a:spcPts val="0"/>
-              </a:spcBef>
-              <a:spcAft>
-                <a:spcPts val="0"/>
-              </a:spcAft>
-              <a:buNone/>
-            </a:pPr>
-            <a:endParaRPr/>
-          </a:p>
-        </p:txBody>
-      </p:sp>
-      <p:sp>
-        <p:nvSpPr>
-          <p:cNvPr id="143" name="Google Shape;143;p11:notes"/>
           <p:cNvSpPr>
             <a:spLocks noGrp="1" noRot="1" noChangeAspect="1"/>
           </p:cNvSpPr>
@@ -2006,7 +1968,7 @@
   <p:cSld>
     <p:spTree>
       <p:nvGrpSpPr>
-        <p:cNvPr id="1" name="Shape 177"/>
+        <p:cNvPr id="1" name="Shape 141"/>
         <p:cNvGrpSpPr/>
         <p:nvPr/>
       </p:nvGrpSpPr>
@@ -2020,7 +1982,7 @@
       </p:grpSpPr>
       <p:sp>
         <p:nvSpPr>
-          <p:cNvPr id="178" name="Google Shape;178;p17:notes"/>
+          <p:cNvPr id="142" name="Google Shape;142;p11:notes"/>
           <p:cNvSpPr txBox="1">
             <a:spLocks noGrp="1"/>
           </p:cNvSpPr>
@@ -2058,111 +2020,7 @@
       </p:sp>
       <p:sp>
         <p:nvSpPr>
-          <p:cNvPr id="179" name="Google Shape;179;p17:notes"/>
-          <p:cNvSpPr>
-            <a:spLocks noGrp="1" noRot="1" noChangeAspect="1"/>
-          </p:cNvSpPr>
-          <p:nvPr>
-            <p:ph type="sldImg" idx="2"/>
-          </p:nvPr>
-        </p:nvSpPr>
-        <p:spPr>
-          <a:xfrm>
-            <a:off x="1257300" y="720725"/>
-            <a:ext cx="4800600" cy="3600450"/>
-          </a:xfrm>
-          <a:custGeom>
-            <a:avLst/>
-            <a:gdLst/>
-            <a:ahLst/>
-            <a:cxnLst/>
-            <a:rect l="l" t="t" r="r" b="b"/>
-            <a:pathLst>
-              <a:path w="120000" h="120000" extrusionOk="0">
-                <a:moveTo>
-                  <a:pt x="0" y="0"/>
-                </a:moveTo>
-                <a:lnTo>
-                  <a:pt x="120000" y="0"/>
-                </a:lnTo>
-                <a:lnTo>
-                  <a:pt x="120000" y="120000"/>
-                </a:lnTo>
-                <a:lnTo>
-                  <a:pt x="0" y="120000"/>
-                </a:lnTo>
-                <a:close/>
-              </a:path>
-            </a:pathLst>
-          </a:custGeom>
-        </p:spPr>
-      </p:sp>
-    </p:spTree>
-  </p:cSld>
-  <p:clrMapOvr>
-    <a:masterClrMapping/>
-  </p:clrMapOvr>
-</p:notes>
-</file>
-
-<file path=ppt/notesSlides/notesSlide21.xml><?xml version="1.0" encoding="utf-8"?>
-<p:notes xmlns:a="http://schemas.openxmlformats.org/drawingml/2006/main" xmlns:r="http://schemas.openxmlformats.org/officeDocument/2006/relationships" xmlns:p="http://schemas.openxmlformats.org/presentationml/2006/main" showMasterSp="0" showMasterPhAnim="0">
-  <p:cSld>
-    <p:spTree>
-      <p:nvGrpSpPr>
-        <p:cNvPr id="1" name="Shape 183"/>
-        <p:cNvGrpSpPr/>
-        <p:nvPr/>
-      </p:nvGrpSpPr>
-      <p:grpSpPr>
-        <a:xfrm>
-          <a:off x="0" y="0"/>
-          <a:ext cx="0" cy="0"/>
-          <a:chOff x="0" y="0"/>
-          <a:chExt cx="0" cy="0"/>
-        </a:xfrm>
-      </p:grpSpPr>
-      <p:sp>
-        <p:nvSpPr>
-          <p:cNvPr id="184" name="Google Shape;184;p18:notes"/>
-          <p:cNvSpPr txBox="1">
-            <a:spLocks noGrp="1"/>
-          </p:cNvSpPr>
-          <p:nvPr>
-            <p:ph type="body" idx="1"/>
-          </p:nvPr>
-        </p:nvSpPr>
-        <p:spPr>
-          <a:xfrm>
-            <a:off x="731500" y="4560550"/>
-            <a:ext cx="5852150" cy="4320525"/>
-          </a:xfrm>
-          <a:prstGeom prst="rect">
-            <a:avLst/>
-          </a:prstGeom>
-        </p:spPr>
-        <p:txBody>
-          <a:bodyPr spcFirstLastPara="1" wrap="square" lIns="91425" tIns="91425" rIns="91425" bIns="91425" anchor="t" anchorCtr="0">
-            <a:noAutofit/>
-          </a:bodyPr>
-          <a:lstStyle/>
-          <a:p>
-            <a:pPr marL="0" lvl="0" indent="0" algn="l" rtl="0">
-              <a:spcBef>
-                <a:spcPts val="0"/>
-              </a:spcBef>
-              <a:spcAft>
-                <a:spcPts val="0"/>
-              </a:spcAft>
-              <a:buNone/>
-            </a:pPr>
-            <a:endParaRPr/>
-          </a:p>
-        </p:txBody>
-      </p:sp>
-      <p:sp>
-        <p:nvSpPr>
-          <p:cNvPr id="185" name="Google Shape;185;p18:notes"/>
+          <p:cNvPr id="143" name="Google Shape;143;p11:notes"/>
           <p:cNvSpPr>
             <a:spLocks noGrp="1" noRot="1" noChangeAspect="1"/>
           </p:cNvSpPr>
@@ -14005,21 +13863,21 @@
                 <a:latin typeface="Times New Roman" panose="02020603050405020304" pitchFamily="18" charset="0"/>
                 <a:cs typeface="Times New Roman" panose="02020603050405020304" pitchFamily="18" charset="0"/>
               </a:rPr>
-              <a:t>By: Islam </a:t>
-            </a:r>
-            <a:r>
-              <a:rPr lang="en-GB" sz="1200" dirty="0" err="1">
-                <a:latin typeface="Times New Roman" panose="02020603050405020304" pitchFamily="18" charset="0"/>
-                <a:cs typeface="Times New Roman" panose="02020603050405020304" pitchFamily="18" charset="0"/>
-              </a:rPr>
-              <a:t>Abbasi</a:t>
+              <a:t>By: </a:t>
+            </a:r>
+            <a:r>
+              <a:rPr lang="en-GB" sz="1200" dirty="0" smtClean="0">
+                <a:latin typeface="Times New Roman" panose="02020603050405020304" pitchFamily="18" charset="0"/>
+                <a:cs typeface="Times New Roman" panose="02020603050405020304" pitchFamily="18" charset="0"/>
+              </a:rPr>
+              <a:t>Muhammad Islam (</a:t>
             </a:r>
             <a:r>
               <a:rPr lang="en-GB" sz="1200" dirty="0">
                 <a:latin typeface="Times New Roman" panose="02020603050405020304" pitchFamily="18" charset="0"/>
                 <a:cs typeface="Times New Roman" panose="02020603050405020304" pitchFamily="18" charset="0"/>
               </a:rPr>
-              <a:t> (Lecturer)</a:t>
+              <a:t>Lecturer)</a:t>
             </a:r>
           </a:p>
           <a:p>
@@ -14333,7 +14191,7 @@
                 <a:hlinkClick r:id="rId2">
                   <a:extLst>
                     <a:ext uri="{A12FA001-AC4F-418D-AE19-62706E023703}">
-                      <ahyp:hlinkClr xmlns="" xmlns:ahyp="http://schemas.microsoft.com/office/drawing/2018/hyperlinkcolor" xmlns:lc="http://schemas.openxmlformats.org/drawingml/2006/lockedCanvas" val="tx"/>
+                      <ahyp:hlinkClr xmlns:lc="http://schemas.openxmlformats.org/drawingml/2006/lockedCanvas" xmlns:ahyp="http://schemas.microsoft.com/office/drawing/2018/hyperlinkcolor" xmlns="" val="tx"/>
                     </a:ext>
                   </a:extLst>
                 </a:hlinkClick>
@@ -14643,7 +14501,7 @@
                 <a:hlinkClick r:id="rId2">
                   <a:extLst>
                     <a:ext uri="{A12FA001-AC4F-418D-AE19-62706E023703}">
-                      <ahyp:hlinkClr xmlns="" xmlns:ahyp="http://schemas.microsoft.com/office/drawing/2018/hyperlinkcolor" xmlns:lc="http://schemas.openxmlformats.org/drawingml/2006/lockedCanvas" val="tx"/>
+                      <ahyp:hlinkClr xmlns:lc="http://schemas.openxmlformats.org/drawingml/2006/lockedCanvas" xmlns:ahyp="http://schemas.microsoft.com/office/drawing/2018/hyperlinkcolor" xmlns="" val="tx"/>
                     </a:ext>
                   </a:extLst>
                 </a:hlinkClick>
@@ -14726,7 +14584,7 @@
           <p:nvPr>
             <p:extLst>
               <p:ext uri="{D42A27DB-BD31-4B8C-83A1-F6EECF244321}">
-                <p14:modId xmlns:p14="http://schemas.microsoft.com/office/powerpoint/2010/main" val="3506039807"/>
+                <p14:modId xmlns:p14="http://schemas.microsoft.com/office/powerpoint/2010/main" val="18840931"/>
               </p:ext>
             </p:extLst>
           </p:nvPr>
@@ -14970,8 +14828,20 @@
                     <a:lstStyle/>
                     <a:p>
                       <a:r>
-                        <a:rPr lang="en-GB" sz="1200"/>
-                        <a:t>Personalized diet plans</a:t>
+                        <a:rPr lang="en-GB" sz="1200" dirty="0" smtClean="0"/>
+                        <a:t>Giving</a:t>
+                      </a:r>
+                      <a:r>
+                        <a:rPr lang="en-GB" sz="1200" baseline="0" dirty="0" smtClean="0"/>
+                        <a:t> </a:t>
+                      </a:r>
+                      <a:r>
+                        <a:rPr lang="en-GB" sz="1200" dirty="0" smtClean="0"/>
+                        <a:t>diet </a:t>
+                      </a:r>
+                      <a:r>
+                        <a:rPr lang="en-GB" sz="1200" dirty="0"/>
+                        <a:t>plans</a:t>
                       </a:r>
                     </a:p>
                   </a:txBody>
@@ -15622,7 +15492,7 @@
         </p:nvSpPr>
         <p:spPr>
           <a:xfrm>
-            <a:off x="457200" y="1600200"/>
+            <a:off x="565484" y="2201779"/>
             <a:ext cx="8229600" cy="4525963"/>
           </a:xfrm>
           <a:prstGeom prst="rect">
@@ -15639,20 +15509,52 @@
           </a:bodyPr>
           <a:lstStyle/>
           <a:p>
-            <a:pPr marL="342900" lvl="0" indent="-139700" algn="l" rtl="0">
-              <a:spcBef>
-                <a:spcPts val="0"/>
-              </a:spcBef>
-              <a:spcAft>
-                <a:spcPts val="0"/>
-              </a:spcAft>
-              <a:buClr>
-                <a:schemeClr val="dk1"/>
-              </a:buClr>
+            <a:pPr marL="342900" lvl="0" indent="-139700" algn="just">
+              <a:spcBef>
+                <a:spcPts val="0"/>
+              </a:spcBef>
               <a:buSzPts val="3200"/>
               <a:buNone/>
             </a:pPr>
-            <a:endParaRPr/>
+            <a:r>
+              <a:rPr lang="en-GB" sz="2600" dirty="0" smtClean="0">
+                <a:latin typeface="Times New Roman" panose="02020603050405020304" pitchFamily="18" charset="0"/>
+                <a:cs typeface="Times New Roman" panose="02020603050405020304" pitchFamily="18" charset="0"/>
+              </a:rPr>
+              <a:t> Obesity individuals </a:t>
+            </a:r>
+            <a:r>
+              <a:rPr lang="en-GB" sz="2600" dirty="0">
+                <a:latin typeface="Times New Roman" panose="02020603050405020304" pitchFamily="18" charset="0"/>
+                <a:cs typeface="Times New Roman" panose="02020603050405020304" pitchFamily="18" charset="0"/>
+              </a:rPr>
+              <a:t>face significant </a:t>
+            </a:r>
+            <a:r>
+              <a:rPr lang="en-GB" sz="2600" dirty="0" smtClean="0">
+                <a:latin typeface="Times New Roman" panose="02020603050405020304" pitchFamily="18" charset="0"/>
+                <a:cs typeface="Times New Roman" panose="02020603050405020304" pitchFamily="18" charset="0"/>
+              </a:rPr>
+              <a:t>challenges in maintaining </a:t>
+            </a:r>
+            <a:r>
+              <a:rPr lang="en-GB" sz="2600" dirty="0">
+                <a:latin typeface="Times New Roman" panose="02020603050405020304" pitchFamily="18" charset="0"/>
+                <a:cs typeface="Times New Roman" panose="02020603050405020304" pitchFamily="18" charset="0"/>
+              </a:rPr>
+              <a:t>their diet </a:t>
+            </a:r>
+            <a:r>
+              <a:rPr lang="en-GB" sz="2600" dirty="0" smtClean="0">
+                <a:latin typeface="Times New Roman" panose="02020603050405020304" pitchFamily="18" charset="0"/>
+                <a:cs typeface="Times New Roman" panose="02020603050405020304" pitchFamily="18" charset="0"/>
+              </a:rPr>
+              <a:t>effectively. Existing platform only focus on exercise and struggles in giving personalized diet plan. Existing platform do not recommend diet along with exercises. They bound people to eat the food. They do not provide personalized diet plans according to user needs.    </a:t>
+            </a:r>
+            <a:endParaRPr lang="en-GB" sz="2600" dirty="0" smtClean="0">
+              <a:latin typeface="Times New Roman" panose="02020603050405020304" pitchFamily="18" charset="0"/>
+              <a:cs typeface="Times New Roman" panose="02020603050405020304" pitchFamily="18" charset="0"/>
+            </a:endParaRPr>
           </a:p>
         </p:txBody>
       </p:sp>
@@ -16331,18 +16233,25 @@
               <a:t> </a:t>
             </a:r>
             <a:r>
-              <a:rPr lang="en-US" sz="2800" dirty="0" err="1">
-                <a:latin typeface="Times New Roman" panose="02020603050405020304" pitchFamily="18" charset="0"/>
-                <a:cs typeface="Times New Roman" panose="02020603050405020304" pitchFamily="18" charset="0"/>
-              </a:rPr>
-              <a:t>abideen</a:t>
-            </a:r>
-            <a:r>
               <a:rPr lang="en-US" sz="2800" dirty="0">
                 <a:latin typeface="Times New Roman" panose="02020603050405020304" pitchFamily="18" charset="0"/>
                 <a:cs typeface="Times New Roman" panose="02020603050405020304" pitchFamily="18" charset="0"/>
               </a:rPr>
-              <a:t> (35515)</a:t>
+              <a:t>A</a:t>
+            </a:r>
+            <a:r>
+              <a:rPr lang="en-US" sz="2800" dirty="0" smtClean="0">
+                <a:latin typeface="Times New Roman" panose="02020603050405020304" pitchFamily="18" charset="0"/>
+                <a:cs typeface="Times New Roman" panose="02020603050405020304" pitchFamily="18" charset="0"/>
+              </a:rPr>
+              <a:t>bideen </a:t>
+            </a:r>
+            <a:r>
+              <a:rPr lang="en-US" sz="2800" dirty="0">
+                <a:latin typeface="Times New Roman" panose="02020603050405020304" pitchFamily="18" charset="0"/>
+                <a:cs typeface="Times New Roman" panose="02020603050405020304" pitchFamily="18" charset="0"/>
+              </a:rPr>
+              <a:t>(35515)</a:t>
             </a:r>
           </a:p>
           <a:p>
@@ -16353,18 +16262,11 @@
               <a:buSzPts val="3200"/>
             </a:pPr>
             <a:r>
-              <a:rPr lang="en-US" sz="2800" dirty="0" err="1">
-                <a:latin typeface="Times New Roman" panose="02020603050405020304" pitchFamily="18" charset="0"/>
-                <a:cs typeface="Times New Roman" panose="02020603050405020304" pitchFamily="18" charset="0"/>
-              </a:rPr>
-              <a:t>Huzaifa</a:t>
-            </a:r>
-            <a:r>
               <a:rPr lang="en-US" sz="2800" dirty="0">
                 <a:latin typeface="Times New Roman" panose="02020603050405020304" pitchFamily="18" charset="0"/>
                 <a:cs typeface="Times New Roman" panose="02020603050405020304" pitchFamily="18" charset="0"/>
               </a:rPr>
-              <a:t> khan (35726)</a:t>
+              <a:t>Huzaifa khan (35726)</a:t>
             </a:r>
           </a:p>
           <a:p>
@@ -16478,7 +16380,7 @@
         </p:blipFill>
         <p:spPr>
           <a:xfrm>
-            <a:off x="806116" y="1181780"/>
+            <a:off x="806116" y="1207681"/>
             <a:ext cx="7880684" cy="4435442"/>
           </a:xfrm>
           <a:prstGeom prst="rect">
@@ -16562,36 +16464,63 @@
           </a:p>
         </p:txBody>
       </p:sp>
-      <p:pic>
-        <p:nvPicPr>
-          <p:cNvPr id="4" name="Picture 3"/>
-          <p:cNvPicPr>
-            <a:picLocks noChangeAspect="1"/>
-          </p:cNvPicPr>
-          <p:nvPr/>
-        </p:nvPicPr>
-        <p:blipFill>
-          <a:blip r:embed="rId3">
-            <a:extLst>
-              <a:ext uri="{28A0092B-C50C-407E-A947-70E740481C1C}">
-                <a14:useLocalDpi xmlns:a14="http://schemas.microsoft.com/office/drawing/2010/main" val="0"/>
-              </a:ext>
-            </a:extLst>
-          </a:blip>
-          <a:stretch>
-            <a:fillRect/>
-          </a:stretch>
-        </p:blipFill>
-        <p:spPr>
-          <a:xfrm>
-            <a:off x="949531" y="1323065"/>
-            <a:ext cx="7498080" cy="4432063"/>
-          </a:xfrm>
-          <a:prstGeom prst="rect">
-            <a:avLst/>
-          </a:prstGeom>
-        </p:spPr>
-      </p:pic>
+      <p:graphicFrame>
+        <p:nvGraphicFramePr>
+          <p:cNvPr id="2" name="Object 1"/>
+          <p:cNvGraphicFramePr>
+            <a:graphicFrameLocks noChangeAspect="1"/>
+          </p:cNvGraphicFramePr>
+          <p:nvPr>
+            <p:extLst>
+              <p:ext uri="{D42A27DB-BD31-4B8C-83A1-F6EECF244321}">
+                <p14:modId xmlns:p14="http://schemas.microsoft.com/office/powerpoint/2010/main" val="801482356"/>
+              </p:ext>
+            </p:extLst>
+          </p:nvPr>
+        </p:nvGraphicFramePr>
+        <p:xfrm>
+          <a:off x="919214" y="1144248"/>
+          <a:ext cx="7767586" cy="4838559"/>
+        </p:xfrm>
+        <a:graphic>
+          <a:graphicData uri="http://schemas.openxmlformats.org/presentationml/2006/ole">
+            <mc:AlternateContent xmlns:mc="http://schemas.openxmlformats.org/markup-compatibility/2006">
+              <mc:Choice xmlns:v="urn:schemas-microsoft-com:vml" Requires="v">
+                <p:oleObj spid="_x0000_s1030" name="Visio" r:id="rId4" imgW="9702593" imgH="6045015" progId="Visio.Drawing.15">
+                  <p:embed/>
+                </p:oleObj>
+              </mc:Choice>
+              <mc:Fallback>
+                <p:oleObj name="Visio" r:id="rId4" imgW="9702593" imgH="6045015" progId="Visio.Drawing.15">
+                  <p:embed/>
+                  <p:pic>
+                    <p:nvPicPr>
+                      <p:cNvPr id="0" name=""/>
+                      <p:cNvPicPr/>
+                      <p:nvPr/>
+                    </p:nvPicPr>
+                    <p:blipFill>
+                      <a:blip r:embed="rId5"/>
+                      <a:stretch>
+                        <a:fillRect/>
+                      </a:stretch>
+                    </p:blipFill>
+                    <p:spPr>
+                      <a:xfrm>
+                        <a:off x="919214" y="1144248"/>
+                        <a:ext cx="7767586" cy="4838559"/>
+                      </a:xfrm>
+                      <a:prstGeom prst="rect">
+                        <a:avLst/>
+                      </a:prstGeom>
+                    </p:spPr>
+                  </p:pic>
+                </p:oleObj>
+              </mc:Fallback>
+            </mc:AlternateContent>
+          </a:graphicData>
+        </a:graphic>
+      </p:graphicFrame>
     </p:spTree>
   </p:cSld>
   <p:clrMapOvr>
@@ -16791,114 +16720,121 @@
                 <a:latin typeface="Times New Roman" panose="02020603050405020304" pitchFamily="18" charset="0"/>
                 <a:cs typeface="Times New Roman" panose="02020603050405020304" pitchFamily="18" charset="0"/>
               </a:rPr>
-              <a:t> (for a responsive and dynamic user interface) and Flutter.</a:t>
-            </a:r>
-          </a:p>
-          <a:p>
-            <a:pPr marL="285750" lvl="0" indent="-285750">
-              <a:spcBef>
-                <a:spcPts val="640"/>
-              </a:spcBef>
-              <a:buSzPts val="3200"/>
-            </a:pPr>
-            <a:r>
-              <a:rPr lang="en-US" sz="2500" b="1" dirty="0">
-                <a:latin typeface="Times New Roman" panose="02020603050405020304" pitchFamily="18" charset="0"/>
-                <a:cs typeface="Times New Roman" panose="02020603050405020304" pitchFamily="18" charset="0"/>
-              </a:rPr>
-              <a:t>Backend: Spring Boot</a:t>
-            </a:r>
-            <a:r>
-              <a:rPr lang="en-US" sz="2500" dirty="0">
-                <a:latin typeface="Times New Roman" panose="02020603050405020304" pitchFamily="18" charset="0"/>
-                <a:cs typeface="Times New Roman" panose="02020603050405020304" pitchFamily="18" charset="0"/>
-              </a:rPr>
-              <a:t>(for creating RESTful APIs).</a:t>
-            </a:r>
-          </a:p>
-          <a:p>
-            <a:pPr marL="285750" lvl="0" indent="-285750">
-              <a:spcBef>
-                <a:spcPts val="640"/>
-              </a:spcBef>
-              <a:buSzPts val="3200"/>
-            </a:pPr>
-            <a:r>
-              <a:rPr lang="en-US" sz="2500" b="1" dirty="0">
-                <a:latin typeface="Times New Roman" panose="02020603050405020304" pitchFamily="18" charset="0"/>
-                <a:cs typeface="Times New Roman" panose="02020603050405020304" pitchFamily="18" charset="0"/>
-              </a:rPr>
-              <a:t>Database:</a:t>
-            </a:r>
-            <a:r>
-              <a:rPr lang="en-US" sz="2500" dirty="0">
-                <a:latin typeface="Times New Roman" panose="02020603050405020304" pitchFamily="18" charset="0"/>
-                <a:cs typeface="Times New Roman" panose="02020603050405020304" pitchFamily="18" charset="0"/>
-              </a:rPr>
-              <a:t> </a:t>
-            </a:r>
-            <a:r>
-              <a:rPr lang="en-US" sz="2500" b="1" dirty="0">
-                <a:latin typeface="Times New Roman" panose="02020603050405020304" pitchFamily="18" charset="0"/>
-                <a:cs typeface="Times New Roman" panose="02020603050405020304" pitchFamily="18" charset="0"/>
-              </a:rPr>
-              <a:t>MongoDB</a:t>
-            </a:r>
-            <a:r>
-              <a:rPr lang="en-US" sz="2500" dirty="0">
-                <a:latin typeface="Times New Roman" panose="02020603050405020304" pitchFamily="18" charset="0"/>
-                <a:cs typeface="Times New Roman" panose="02020603050405020304" pitchFamily="18" charset="0"/>
-              </a:rPr>
-              <a:t> (for secure and efficient data storage).</a:t>
-            </a:r>
-          </a:p>
-          <a:p>
-            <a:pPr marL="285750" lvl="0" indent="-285750">
-              <a:spcBef>
-                <a:spcPts val="640"/>
-              </a:spcBef>
-              <a:buSzPts val="3200"/>
-            </a:pPr>
-            <a:r>
-              <a:rPr lang="en-US" sz="2500" b="1" dirty="0">
-                <a:latin typeface="Times New Roman" panose="02020603050405020304" pitchFamily="18" charset="0"/>
-                <a:cs typeface="Times New Roman" panose="02020603050405020304" pitchFamily="18" charset="0"/>
-              </a:rPr>
-              <a:t>Programming Languages:</a:t>
-            </a:r>
-            <a:r>
-              <a:rPr lang="en-US" sz="2500" dirty="0">
-                <a:latin typeface="Times New Roman" panose="02020603050405020304" pitchFamily="18" charset="0"/>
-                <a:cs typeface="Times New Roman" panose="02020603050405020304" pitchFamily="18" charset="0"/>
-              </a:rPr>
-              <a:t> Python, JavaScript, Java (for backend and frontend development).</a:t>
-            </a:r>
-          </a:p>
-          <a:p>
-            <a:pPr marL="285750" lvl="0" indent="-285750">
-              <a:spcBef>
-                <a:spcPts val="640"/>
-              </a:spcBef>
-              <a:buSzPts val="3200"/>
-            </a:pPr>
-            <a:r>
-              <a:rPr lang="en-US" sz="2500" b="1" dirty="0">
-                <a:latin typeface="Times New Roman" panose="02020603050405020304" pitchFamily="18" charset="0"/>
-                <a:cs typeface="Times New Roman" panose="02020603050405020304" pitchFamily="18" charset="0"/>
-              </a:rPr>
-              <a:t>Version Control:</a:t>
-            </a:r>
-            <a:r>
-              <a:rPr lang="en-US" sz="2500" dirty="0">
-                <a:latin typeface="Times New Roman" panose="02020603050405020304" pitchFamily="18" charset="0"/>
-                <a:cs typeface="Times New Roman" panose="02020603050405020304" pitchFamily="18" charset="0"/>
-              </a:rPr>
-              <a:t> GitHub (for collaboration version control and automation).</a:t>
+              <a:t> (for a responsive and dynamic user interface</a:t>
+            </a:r>
+            <a:r>
+              <a:rPr lang="en-US" sz="2500" dirty="0" smtClean="0">
+                <a:latin typeface="Times New Roman" panose="02020603050405020304" pitchFamily="18" charset="0"/>
+                <a:cs typeface="Times New Roman" panose="02020603050405020304" pitchFamily="18" charset="0"/>
+              </a:rPr>
+              <a:t>).</a:t>
             </a:r>
             <a:endParaRPr lang="en-US" sz="2500" dirty="0">
               <a:latin typeface="Times New Roman" panose="02020603050405020304" pitchFamily="18" charset="0"/>
               <a:cs typeface="Times New Roman" panose="02020603050405020304" pitchFamily="18" charset="0"/>
             </a:endParaRPr>
+          </a:p>
+          <a:p>
+            <a:pPr marL="285750" lvl="0" indent="-285750">
+              <a:spcBef>
+                <a:spcPts val="640"/>
+              </a:spcBef>
+              <a:buSzPts val="3200"/>
+            </a:pPr>
+            <a:r>
+              <a:rPr lang="en-US" sz="2500" b="1" dirty="0">
+                <a:latin typeface="Times New Roman" panose="02020603050405020304" pitchFamily="18" charset="0"/>
+                <a:cs typeface="Times New Roman" panose="02020603050405020304" pitchFamily="18" charset="0"/>
+              </a:rPr>
+              <a:t>Backend: Spring Boot</a:t>
+            </a:r>
+            <a:r>
+              <a:rPr lang="en-US" sz="2500" dirty="0">
+                <a:latin typeface="Times New Roman" panose="02020603050405020304" pitchFamily="18" charset="0"/>
+                <a:cs typeface="Times New Roman" panose="02020603050405020304" pitchFamily="18" charset="0"/>
+              </a:rPr>
+              <a:t>(for creating RESTful APIs).</a:t>
+            </a:r>
+          </a:p>
+          <a:p>
+            <a:pPr marL="285750" lvl="0" indent="-285750">
+              <a:spcBef>
+                <a:spcPts val="640"/>
+              </a:spcBef>
+              <a:buSzPts val="3200"/>
+            </a:pPr>
+            <a:r>
+              <a:rPr lang="en-US" sz="2500" b="1" dirty="0">
+                <a:latin typeface="Times New Roman" panose="02020603050405020304" pitchFamily="18" charset="0"/>
+                <a:cs typeface="Times New Roman" panose="02020603050405020304" pitchFamily="18" charset="0"/>
+              </a:rPr>
+              <a:t>Database:</a:t>
+            </a:r>
+            <a:r>
+              <a:rPr lang="en-US" sz="2500" dirty="0">
+                <a:latin typeface="Times New Roman" panose="02020603050405020304" pitchFamily="18" charset="0"/>
+                <a:cs typeface="Times New Roman" panose="02020603050405020304" pitchFamily="18" charset="0"/>
+              </a:rPr>
+              <a:t> </a:t>
+            </a:r>
+            <a:r>
+              <a:rPr lang="en-US" sz="2500" b="1" dirty="0">
+                <a:latin typeface="Times New Roman" panose="02020603050405020304" pitchFamily="18" charset="0"/>
+                <a:cs typeface="Times New Roman" panose="02020603050405020304" pitchFamily="18" charset="0"/>
+              </a:rPr>
+              <a:t>MongoDB</a:t>
+            </a:r>
+            <a:r>
+              <a:rPr lang="en-US" sz="2500" dirty="0">
+                <a:latin typeface="Times New Roman" panose="02020603050405020304" pitchFamily="18" charset="0"/>
+                <a:cs typeface="Times New Roman" panose="02020603050405020304" pitchFamily="18" charset="0"/>
+              </a:rPr>
+              <a:t> (for secure and efficient data storage).</a:t>
+            </a:r>
+          </a:p>
+          <a:p>
+            <a:pPr marL="285750" lvl="0" indent="-285750">
+              <a:spcBef>
+                <a:spcPts val="640"/>
+              </a:spcBef>
+              <a:buSzPts val="3200"/>
+            </a:pPr>
+            <a:r>
+              <a:rPr lang="en-US" sz="2500" b="1" dirty="0">
+                <a:latin typeface="Times New Roman" panose="02020603050405020304" pitchFamily="18" charset="0"/>
+                <a:cs typeface="Times New Roman" panose="02020603050405020304" pitchFamily="18" charset="0"/>
+              </a:rPr>
+              <a:t>Programming Languages:</a:t>
+            </a:r>
+            <a:r>
+              <a:rPr lang="en-US" sz="2500" dirty="0">
+                <a:latin typeface="Times New Roman" panose="02020603050405020304" pitchFamily="18" charset="0"/>
+                <a:cs typeface="Times New Roman" panose="02020603050405020304" pitchFamily="18" charset="0"/>
+              </a:rPr>
+              <a:t> Python, JavaScript, Java (for backend and frontend development).</a:t>
+            </a:r>
+          </a:p>
+          <a:p>
+            <a:pPr marL="285750" lvl="0" indent="-285750">
+              <a:spcBef>
+                <a:spcPts val="640"/>
+              </a:spcBef>
+              <a:buSzPts val="3200"/>
+            </a:pPr>
+            <a:r>
+              <a:rPr lang="en-US" sz="2500" b="1" dirty="0">
+                <a:latin typeface="Times New Roman" panose="02020603050405020304" pitchFamily="18" charset="0"/>
+                <a:cs typeface="Times New Roman" panose="02020603050405020304" pitchFamily="18" charset="0"/>
+              </a:rPr>
+              <a:t>Version Control:</a:t>
+            </a:r>
+            <a:r>
+              <a:rPr lang="en-US" sz="2500" dirty="0">
+                <a:latin typeface="Times New Roman" panose="02020603050405020304" pitchFamily="18" charset="0"/>
+                <a:cs typeface="Times New Roman" panose="02020603050405020304" pitchFamily="18" charset="0"/>
+              </a:rPr>
+              <a:t> GitHub (for collaboration version control and automation).</a:t>
+            </a:r>
           </a:p>
         </p:txBody>
       </p:sp>
@@ -17059,10 +16995,6 @@
               </a:rPr>
               <a:t>Axios</a:t>
             </a:r>
-            <a:endParaRPr lang="en-US" sz="2400" dirty="0">
-              <a:latin typeface="Times New Roman" panose="02020603050405020304" pitchFamily="18" charset="0"/>
-              <a:cs typeface="Times New Roman" panose="02020603050405020304" pitchFamily="18" charset="0"/>
-            </a:endParaRPr>
           </a:p>
         </p:txBody>
       </p:sp>
@@ -17243,10 +17175,6 @@
               </a:rPr>
               <a:t>OTP Store</a:t>
             </a:r>
-            <a:endParaRPr lang="en-US" sz="2400" dirty="0">
-              <a:latin typeface="Times New Roman" panose="02020603050405020304" pitchFamily="18" charset="0"/>
-              <a:cs typeface="Times New Roman" panose="02020603050405020304" pitchFamily="18" charset="0"/>
-            </a:endParaRPr>
           </a:p>
         </p:txBody>
       </p:sp>
@@ -17619,14 +17547,7 @@
                 <a:latin typeface="Times New Roman" panose="02020603050405020304" pitchFamily="18" charset="0"/>
                 <a:cs typeface="Times New Roman" panose="02020603050405020304" pitchFamily="18" charset="0"/>
               </a:rPr>
-              <a:t> </a:t>
-            </a:r>
-            <a:r>
-              <a:rPr lang="en-GB" sz="2800" dirty="0" smtClean="0">
-                <a:latin typeface="Times New Roman" panose="02020603050405020304" pitchFamily="18" charset="0"/>
-                <a:cs typeface="Times New Roman" panose="02020603050405020304" pitchFamily="18" charset="0"/>
-              </a:rPr>
-              <a:t>and </a:t>
+              <a:t> and </a:t>
             </a:r>
             <a:r>
               <a:rPr lang="en-GB" sz="2800" b="1" dirty="0" smtClean="0">
@@ -18366,33 +18287,14 @@
                 <a:latin typeface="Times New Roman" panose="02020603050405020304" pitchFamily="18" charset="0"/>
                 <a:cs typeface="Times New Roman" panose="02020603050405020304" pitchFamily="18" charset="0"/>
               </a:rPr>
-              <a:t>Testing Summary</a:t>
-            </a:r>
-            <a:endParaRPr sz="2200" dirty="0">
-              <a:latin typeface="Times New Roman" panose="02020603050405020304" pitchFamily="18" charset="0"/>
-              <a:cs typeface="Times New Roman" panose="02020603050405020304" pitchFamily="18" charset="0"/>
-            </a:endParaRPr>
-          </a:p>
-          <a:p>
-            <a:pPr marL="342900" lvl="0" indent="-342900" algn="l" rtl="0">
-              <a:spcBef>
-                <a:spcPts val="480"/>
-              </a:spcBef>
-              <a:spcAft>
-                <a:spcPts val="0"/>
-              </a:spcAft>
-              <a:buClr>
-                <a:schemeClr val="dk1"/>
-              </a:buClr>
-              <a:buSzPts val="2400"/>
-              <a:buChar char="•"/>
-            </a:pPr>
-            <a:r>
-              <a:rPr lang="en-US" sz="2200" dirty="0">
-                <a:latin typeface="Times New Roman" panose="02020603050405020304" pitchFamily="18" charset="0"/>
-                <a:cs typeface="Times New Roman" panose="02020603050405020304" pitchFamily="18" charset="0"/>
-              </a:rPr>
-              <a:t>Conclusion and Outlook</a:t>
+              <a:t>Testing </a:t>
+            </a:r>
+            <a:r>
+              <a:rPr lang="en-US" sz="2200" dirty="0" smtClean="0">
+                <a:latin typeface="Times New Roman" panose="02020603050405020304" pitchFamily="18" charset="0"/>
+                <a:cs typeface="Times New Roman" panose="02020603050405020304" pitchFamily="18" charset="0"/>
+              </a:rPr>
+              <a:t>Summary</a:t>
             </a:r>
             <a:endParaRPr sz="2200" dirty="0">
               <a:latin typeface="Times New Roman" panose="02020603050405020304" pitchFamily="18" charset="0"/>
@@ -18670,7 +18572,21 @@
                 <a:latin typeface="Times New Roman" panose="02020603050405020304" pitchFamily="18" charset="0"/>
                 <a:cs typeface="Times New Roman" panose="02020603050405020304" pitchFamily="18" charset="0"/>
               </a:rPr>
-              <a:t>we make a synthetic dataset of 20000 people using CTGAN model and split dataset </a:t>
+              <a:t>we make a synthetic dataset of 20000 people using </a:t>
+            </a:r>
+            <a:r>
+              <a:rPr lang="en-GB" sz="2500" b="1" dirty="0" smtClean="0">
+                <a:latin typeface="Times New Roman" panose="02020603050405020304" pitchFamily="18" charset="0"/>
+                <a:cs typeface="Times New Roman" panose="02020603050405020304" pitchFamily="18" charset="0"/>
+              </a:rPr>
+              <a:t>CTGAN </a:t>
+            </a:r>
+            <a:r>
+              <a:rPr lang="en-GB" sz="2500" dirty="0" smtClean="0">
+                <a:latin typeface="Times New Roman" panose="02020603050405020304" pitchFamily="18" charset="0"/>
+                <a:cs typeface="Times New Roman" panose="02020603050405020304" pitchFamily="18" charset="0"/>
+              </a:rPr>
+              <a:t>model and split dataset </a:t>
             </a:r>
             <a:r>
               <a:rPr lang="en-US" sz="2500" dirty="0">
@@ -18734,9 +18650,30 @@
                 <a:latin typeface="Times New Roman" panose="02020603050405020304" pitchFamily="18" charset="0"/>
                 <a:cs typeface="Times New Roman" panose="02020603050405020304" pitchFamily="18" charset="0"/>
               </a:rPr>
-              <a:t>XGBoost.</a:t>
-            </a:r>
-            <a:endParaRPr lang="en-GB" sz="2500" b="1" dirty="0" smtClean="0">
+              <a:t>XGBoost </a:t>
+            </a:r>
+            <a:r>
+              <a:rPr lang="en-US" sz="2500" dirty="0" smtClean="0">
+                <a:latin typeface="Times New Roman" panose="02020603050405020304" pitchFamily="18" charset="0"/>
+                <a:cs typeface="Times New Roman" panose="02020603050405020304" pitchFamily="18" charset="0"/>
+              </a:rPr>
+              <a:t>along</a:t>
+            </a:r>
+            <a:r>
+              <a:rPr lang="en-US" sz="2500" b="1" dirty="0" smtClean="0">
+                <a:latin typeface="Times New Roman" panose="02020603050405020304" pitchFamily="18" charset="0"/>
+                <a:cs typeface="Times New Roman" panose="02020603050405020304" pitchFamily="18" charset="0"/>
+              </a:rPr>
+              <a:t> </a:t>
+            </a:r>
+            <a:r>
+              <a:rPr lang="en-US" sz="2500" dirty="0" smtClean="0">
+                <a:latin typeface="Times New Roman" panose="02020603050405020304" pitchFamily="18" charset="0"/>
+                <a:cs typeface="Times New Roman" panose="02020603050405020304" pitchFamily="18" charset="0"/>
+              </a:rPr>
+              <a:t>with  meta learner of gradient boosting.</a:t>
+            </a:r>
+            <a:endParaRPr lang="en-GB" sz="2500" dirty="0" smtClean="0">
               <a:latin typeface="Times New Roman" panose="02020603050405020304" pitchFamily="18" charset="0"/>
               <a:cs typeface="Times New Roman" panose="02020603050405020304" pitchFamily="18" charset="0"/>
             </a:endParaRPr>
@@ -19075,7 +19012,7 @@
                 <a:latin typeface="Times New Roman" panose="02020603050405020304" pitchFamily="18" charset="0"/>
                 <a:cs typeface="Times New Roman" panose="02020603050405020304" pitchFamily="18" charset="0"/>
               </a:rPr>
-              <a:t>model</a:t>
+              <a:t>model with polynomial features.</a:t>
             </a:r>
             <a:endParaRPr lang="en-GB" sz="2500" dirty="0" smtClean="0">
               <a:latin typeface="Times New Roman" panose="02020603050405020304" pitchFamily="18" charset="0"/>
@@ -19795,6 +19732,59 @@
   <p:cSld>
     <p:spTree>
       <p:nvGrpSpPr>
+        <p:cNvPr id="1" name=""/>
+        <p:cNvGrpSpPr/>
+        <p:nvPr/>
+      </p:nvGrpSpPr>
+      <p:grpSpPr>
+        <a:xfrm>
+          <a:off x="0" y="0"/>
+          <a:ext cx="0" cy="0"/>
+          <a:chOff x="0" y="0"/>
+          <a:chExt cx="0" cy="0"/>
+        </a:xfrm>
+      </p:grpSpPr>
+      <p:sp>
+        <p:nvSpPr>
+          <p:cNvPr id="2" name="Title 1"/>
+          <p:cNvSpPr>
+            <a:spLocks noGrp="1"/>
+          </p:cNvSpPr>
+          <p:nvPr>
+            <p:ph type="title"/>
+          </p:nvPr>
+        </p:nvSpPr>
+        <p:spPr/>
+        <p:txBody>
+          <a:bodyPr/>
+          <a:lstStyle/>
+          <a:p>
+            <a:r>
+              <a:rPr lang="en-GB" dirty="0" smtClean="0"/>
+              <a:t>Testing Summary</a:t>
+            </a:r>
+            <a:endParaRPr lang="en-GB" dirty="0"/>
+          </a:p>
+        </p:txBody>
+      </p:sp>
+    </p:spTree>
+    <p:extLst>
+      <p:ext uri="{BB962C8B-B14F-4D97-AF65-F5344CB8AC3E}">
+        <p14:creationId xmlns:p14="http://schemas.microsoft.com/office/powerpoint/2010/main" val="3395275145"/>
+      </p:ext>
+    </p:extLst>
+  </p:cSld>
+  <p:clrMapOvr>
+    <a:masterClrMapping/>
+  </p:clrMapOvr>
+</p:sld>
+</file>
+
+<file path=ppt/slides/slide36.xml><?xml version="1.0" encoding="utf-8"?>
+<p:sld xmlns:a="http://schemas.openxmlformats.org/drawingml/2006/main" xmlns:r="http://schemas.openxmlformats.org/officeDocument/2006/relationships" xmlns:p="http://schemas.openxmlformats.org/presentationml/2006/main">
+  <p:cSld>
+    <p:spTree>
+      <p:nvGrpSpPr>
         <p:cNvPr id="1" name="Shape 174"/>
         <p:cNvGrpSpPr/>
         <p:nvPr/>
@@ -19820,7 +19810,7 @@
         <p:spPr>
           <a:xfrm>
             <a:off x="457200" y="274638"/>
-            <a:ext cx="8229600" cy="1143000"/>
+            <a:ext cx="8229600" cy="1124394"/>
           </a:xfrm>
           <a:prstGeom prst="rect">
             <a:avLst/>
@@ -19915,6 +19905,323 @@
           </a:p>
         </p:txBody>
       </p:sp>
+      <p:graphicFrame>
+        <p:nvGraphicFramePr>
+          <p:cNvPr id="5" name="Table 4"/>
+          <p:cNvGraphicFramePr>
+            <a:graphicFrameLocks noGrp="1"/>
+          </p:cNvGraphicFramePr>
+          <p:nvPr>
+            <p:extLst>
+              <p:ext uri="{D42A27DB-BD31-4B8C-83A1-F6EECF244321}">
+                <p14:modId xmlns:p14="http://schemas.microsoft.com/office/powerpoint/2010/main" val="27891360"/>
+              </p:ext>
+            </p:extLst>
+          </p:nvPr>
+        </p:nvGraphicFramePr>
+        <p:xfrm>
+          <a:off x="1536192" y="1600200"/>
+          <a:ext cx="6705600" cy="3868454"/>
+        </p:xfrm>
+        <a:graphic>
+          <a:graphicData uri="http://schemas.openxmlformats.org/drawingml/2006/table">
+            <a:tbl>
+              <a:tblPr firstRow="1" bandRow="1">
+                <a:tableStyleId>{69012ECD-51FC-41F1-AA8D-1B2483CD663E}</a:tableStyleId>
+              </a:tblPr>
+              <a:tblGrid>
+                <a:gridCol w="1889214">
+                  <a:extLst>
+                    <a:ext uri="{9D8B030D-6E8A-4147-A177-3AD203B41FA5}">
+                      <a16:colId xmlns:a16="http://schemas.microsoft.com/office/drawing/2014/main" val="1816247505"/>
+                    </a:ext>
+                  </a:extLst>
+                </a:gridCol>
+                <a:gridCol w="4816386">
+                  <a:extLst>
+                    <a:ext uri="{9D8B030D-6E8A-4147-A177-3AD203B41FA5}">
+                      <a16:colId xmlns:a16="http://schemas.microsoft.com/office/drawing/2014/main" val="2844669812"/>
+                    </a:ext>
+                  </a:extLst>
+                </a:gridCol>
+              </a:tblGrid>
+              <a:tr h="725503">
+                <a:tc>
+                  <a:txBody>
+                    <a:bodyPr/>
+                    <a:lstStyle/>
+                    <a:p>
+                      <a:r>
+                        <a:rPr lang="en-GB" dirty="0" smtClean="0">
+                          <a:solidFill>
+                            <a:schemeClr val="tx1"/>
+                          </a:solidFill>
+                        </a:rPr>
+                        <a:t>Testing  Aspect</a:t>
+                      </a:r>
+                      <a:endParaRPr lang="en-GB" dirty="0">
+                        <a:solidFill>
+                          <a:schemeClr val="tx1"/>
+                        </a:solidFill>
+                      </a:endParaRPr>
+                    </a:p>
+                  </a:txBody>
+                  <a:tcPr/>
+                </a:tc>
+                <a:tc>
+                  <a:txBody>
+                    <a:bodyPr/>
+                    <a:lstStyle/>
+                    <a:p>
+                      <a:r>
+                        <a:rPr lang="en-GB" dirty="0" smtClean="0">
+                          <a:solidFill>
+                            <a:schemeClr val="tx1"/>
+                          </a:solidFill>
+                        </a:rPr>
+                        <a:t>Summary</a:t>
+                      </a:r>
+                      <a:endParaRPr lang="en-GB" dirty="0">
+                        <a:solidFill>
+                          <a:schemeClr val="tx1"/>
+                        </a:solidFill>
+                      </a:endParaRPr>
+                    </a:p>
+                  </a:txBody>
+                  <a:tcPr/>
+                </a:tc>
+                <a:extLst>
+                  <a:ext uri="{0D108BD9-81ED-4DB2-BD59-A6C34878D82A}">
+                    <a16:rowId xmlns:a16="http://schemas.microsoft.com/office/drawing/2014/main" val="1590611437"/>
+                  </a:ext>
+                </a:extLst>
+              </a:tr>
+              <a:tr h="521455">
+                <a:tc>
+                  <a:txBody>
+                    <a:bodyPr/>
+                    <a:lstStyle/>
+                    <a:p>
+                      <a:r>
+                        <a:rPr lang="en-GB" dirty="0" smtClean="0"/>
+                        <a:t>Approach</a:t>
+                      </a:r>
+                      <a:endParaRPr lang="en-GB" dirty="0"/>
+                    </a:p>
+                  </a:txBody>
+                  <a:tcPr/>
+                </a:tc>
+                <a:tc>
+                  <a:txBody>
+                    <a:bodyPr/>
+                    <a:lstStyle/>
+                    <a:p>
+                      <a:r>
+                        <a:rPr lang="en-GB" dirty="0" smtClean="0"/>
+                        <a:t>  Blackbox and</a:t>
+                      </a:r>
+                      <a:r>
+                        <a:rPr lang="en-GB" baseline="0" dirty="0" smtClean="0"/>
+                        <a:t> Whitebox</a:t>
+                      </a:r>
+                      <a:endParaRPr lang="en-GB" dirty="0"/>
+                    </a:p>
+                  </a:txBody>
+                  <a:tcPr/>
+                </a:tc>
+                <a:extLst>
+                  <a:ext uri="{0D108BD9-81ED-4DB2-BD59-A6C34878D82A}">
+                    <a16:rowId xmlns:a16="http://schemas.microsoft.com/office/drawing/2014/main" val="3669611002"/>
+                  </a:ext>
+                </a:extLst>
+              </a:tr>
+              <a:tr h="518376">
+                <a:tc>
+                  <a:txBody>
+                    <a:bodyPr/>
+                    <a:lstStyle/>
+                    <a:p>
+                      <a:r>
+                        <a:rPr lang="en-GB" dirty="0" smtClean="0"/>
+                        <a:t>Purpose</a:t>
+                      </a:r>
+                      <a:endParaRPr lang="en-GB" dirty="0"/>
+                    </a:p>
+                  </a:txBody>
+                  <a:tcPr/>
+                </a:tc>
+                <a:tc>
+                  <a:txBody>
+                    <a:bodyPr/>
+                    <a:lstStyle/>
+                    <a:p>
+                      <a:r>
+                        <a:rPr lang="en-GB" dirty="0" smtClean="0"/>
+                        <a:t>To validate the functionalities</a:t>
+                      </a:r>
+                      <a:r>
+                        <a:rPr lang="en-GB" baseline="0" dirty="0" smtClean="0"/>
+                        <a:t> of Fitessstan via input and output and by giving different user data.</a:t>
+                      </a:r>
+                    </a:p>
+                  </a:txBody>
+                  <a:tcPr/>
+                </a:tc>
+                <a:extLst>
+                  <a:ext uri="{0D108BD9-81ED-4DB2-BD59-A6C34878D82A}">
+                    <a16:rowId xmlns:a16="http://schemas.microsoft.com/office/drawing/2014/main" val="2862970853"/>
+                  </a:ext>
+                </a:extLst>
+              </a:tr>
+              <a:tr h="1249058">
+                <a:tc>
+                  <a:txBody>
+                    <a:bodyPr/>
+                    <a:lstStyle/>
+                    <a:p>
+                      <a:r>
+                        <a:rPr lang="en-GB" dirty="0" smtClean="0"/>
+                        <a:t>Feature</a:t>
+                      </a:r>
+                      <a:r>
+                        <a:rPr lang="en-GB" baseline="0" dirty="0" smtClean="0"/>
+                        <a:t> Tested</a:t>
+                      </a:r>
+                      <a:endParaRPr lang="en-GB" dirty="0"/>
+                    </a:p>
+                  </a:txBody>
+                  <a:tcPr/>
+                </a:tc>
+                <a:tc>
+                  <a:txBody>
+                    <a:bodyPr/>
+                    <a:lstStyle/>
+                    <a:p>
+                      <a:r>
+                        <a:rPr lang="en-GB" dirty="0" smtClean="0"/>
+                        <a:t>✔ User registration &amp; login</a:t>
+                      </a:r>
+                      <a:br>
+                        <a:rPr lang="en-GB" dirty="0" smtClean="0"/>
+                      </a:br>
+                      <a:r>
+                        <a:rPr lang="en-GB" dirty="0" smtClean="0"/>
+                        <a:t>✔ Password recovery &amp; OTP</a:t>
+                      </a:r>
+                      <a:br>
+                        <a:rPr lang="en-GB" dirty="0" smtClean="0"/>
+                      </a:br>
+                      <a:r>
+                        <a:rPr lang="en-GB" dirty="0" smtClean="0"/>
+                        <a:t>✔ Input forms</a:t>
+                      </a:r>
+                      <a:br>
+                        <a:rPr lang="en-GB" dirty="0" smtClean="0"/>
+                      </a:br>
+                      <a:r>
+                        <a:rPr lang="en-GB" dirty="0" smtClean="0"/>
+                        <a:t>✔ Diet plans</a:t>
+                      </a:r>
+                      <a:br>
+                        <a:rPr lang="en-GB" dirty="0" smtClean="0"/>
+                      </a:br>
+                      <a:r>
+                        <a:rPr lang="en-GB" dirty="0" smtClean="0"/>
+                        <a:t>✔ Admin management</a:t>
+                      </a:r>
+                    </a:p>
+                    <a:p>
+                      <a:pPr marL="0" marR="0" lvl="0" indent="0" algn="l" defTabSz="914400" rtl="0" eaLnBrk="1" fontAlgn="auto" latinLnBrk="0" hangingPunct="1">
+                        <a:lnSpc>
+                          <a:spcPct val="100000"/>
+                        </a:lnSpc>
+                        <a:spcBef>
+                          <a:spcPts val="0"/>
+                        </a:spcBef>
+                        <a:spcAft>
+                          <a:spcPts val="0"/>
+                        </a:spcAft>
+                        <a:buClr>
+                          <a:srgbClr val="000000"/>
+                        </a:buClr>
+                        <a:buSzTx/>
+                        <a:buFont typeface="Arial"/>
+                        <a:buNone/>
+                        <a:tabLst/>
+                        <a:defRPr/>
+                      </a:pPr>
+                      <a:r>
+                        <a:rPr lang="en-GB" dirty="0" smtClean="0"/>
+                        <a:t>✔Model</a:t>
+                      </a:r>
+                      <a:r>
+                        <a:rPr lang="en-GB" baseline="0" dirty="0" smtClean="0"/>
+                        <a:t> Testing</a:t>
+                      </a:r>
+                      <a:endParaRPr lang="en-GB" dirty="0" smtClean="0"/>
+                    </a:p>
+                  </a:txBody>
+                  <a:tcPr/>
+                </a:tc>
+                <a:extLst>
+                  <a:ext uri="{0D108BD9-81ED-4DB2-BD59-A6C34878D82A}">
+                    <a16:rowId xmlns:a16="http://schemas.microsoft.com/office/drawing/2014/main" val="1023386783"/>
+                  </a:ext>
+                </a:extLst>
+              </a:tr>
+              <a:tr h="725503">
+                <a:tc>
+                  <a:txBody>
+                    <a:bodyPr/>
+                    <a:lstStyle/>
+                    <a:p>
+                      <a:r>
+                        <a:rPr lang="en-GB" dirty="0" smtClean="0"/>
+                        <a:t>Result</a:t>
+                      </a:r>
+                      <a:endParaRPr lang="en-GB" dirty="0"/>
+                    </a:p>
+                  </a:txBody>
+                  <a:tcPr/>
+                </a:tc>
+                <a:tc>
+                  <a:txBody>
+                    <a:bodyPr/>
+                    <a:lstStyle/>
+                    <a:p>
+                      <a:r>
+                        <a:rPr lang="en-GB" dirty="0" smtClean="0"/>
+                        <a:t>✔ All critical test cases passed successfully</a:t>
+                      </a:r>
+                      <a:br>
+                        <a:rPr lang="en-GB" dirty="0" smtClean="0"/>
+                      </a:br>
+                      <a:r>
+                        <a:rPr lang="en-GB" dirty="0" smtClean="0"/>
+                        <a:t>✔ Correct handling of all input types</a:t>
+                      </a:r>
+                      <a:br>
+                        <a:rPr lang="en-GB" dirty="0" smtClean="0"/>
+                      </a:br>
+                      <a:r>
+                        <a:rPr lang="en-GB" dirty="0" smtClean="0"/>
+                        <a:t>✔ Confirmed user-friendly experience</a:t>
+                      </a:r>
+                      <a:endParaRPr lang="en-GB" dirty="0"/>
+                    </a:p>
+                  </a:txBody>
+                  <a:tcPr/>
+                </a:tc>
+                <a:extLst>
+                  <a:ext uri="{0D108BD9-81ED-4DB2-BD59-A6C34878D82A}">
+                    <a16:rowId xmlns:a16="http://schemas.microsoft.com/office/drawing/2014/main" val="1104312955"/>
+                  </a:ext>
+                </a:extLst>
+              </a:tr>
+            </a:tbl>
+          </a:graphicData>
+        </a:graphic>
+      </p:graphicFrame>
     </p:spTree>
   </p:cSld>
   <p:clrMapOvr>
@@ -19923,7 +20230,7 @@
 </p:sld>
 </file>
 
-<file path=ppt/slides/slide36.xml><?xml version="1.0" encoding="utf-8"?>
+<file path=ppt/slides/slide37.xml><?xml version="1.0" encoding="utf-8"?>
 <p:sld xmlns:a="http://schemas.openxmlformats.org/drawingml/2006/main" xmlns:r="http://schemas.openxmlformats.org/officeDocument/2006/relationships" xmlns:p="http://schemas.openxmlformats.org/presentationml/2006/main">
   <p:cSld>
     <p:spTree>
@@ -19994,7 +20301,7 @@
 </p:sld>
 </file>
 
-<file path=ppt/slides/slide37.xml><?xml version="1.0" encoding="utf-8"?>
+<file path=ppt/slides/slide38.xml><?xml version="1.0" encoding="utf-8"?>
 <p:sld xmlns:a="http://schemas.openxmlformats.org/drawingml/2006/main" xmlns:r="http://schemas.openxmlformats.org/officeDocument/2006/relationships" xmlns:p="http://schemas.openxmlformats.org/presentationml/2006/main">
   <p:cSld>
     <p:spTree>
@@ -20076,7 +20383,7 @@
         <p:spPr>
           <a:xfrm>
             <a:off x="457200" y="1275347"/>
-            <a:ext cx="8229600" cy="4525963"/>
+            <a:ext cx="8229600" cy="4878565"/>
           </a:xfrm>
           <a:prstGeom prst="rect">
             <a:avLst/>
@@ -20099,11 +20406,17 @@
               <a:buSzPts val="3200"/>
             </a:pPr>
             <a:r>
-              <a:rPr lang="en-US" dirty="0" smtClean="0"/>
+              <a:rPr lang="en-US" sz="2500" dirty="0" smtClean="0">
+                <a:latin typeface="Times New Roman" panose="02020603050405020304" pitchFamily="18" charset="0"/>
+                <a:cs typeface="Times New Roman" panose="02020603050405020304" pitchFamily="18" charset="0"/>
+              </a:rPr>
               <a:t>Describe </a:t>
             </a:r>
             <a:r>
-              <a:rPr lang="en-US" dirty="0"/>
+              <a:rPr lang="en-US" sz="2500" dirty="0">
+                <a:latin typeface="Times New Roman" panose="02020603050405020304" pitchFamily="18" charset="0"/>
+                <a:cs typeface="Times New Roman" panose="02020603050405020304" pitchFamily="18" charset="0"/>
+              </a:rPr>
               <a:t>roles of your team members</a:t>
             </a:r>
           </a:p>
@@ -20133,21 +20446,7 @@
                 <a:latin typeface="Times New Roman" panose="02020603050405020304" pitchFamily="18" charset="0"/>
                 <a:cs typeface="Times New Roman" panose="02020603050405020304" pitchFamily="18" charset="0"/>
               </a:rPr>
-              <a:t> </a:t>
-            </a:r>
-            <a:r>
-              <a:rPr lang="en-US" sz="1800" b="1" dirty="0" err="1">
-                <a:latin typeface="Times New Roman" panose="02020603050405020304" pitchFamily="18" charset="0"/>
-                <a:cs typeface="Times New Roman" panose="02020603050405020304" pitchFamily="18" charset="0"/>
-              </a:rPr>
-              <a:t>Abideen</a:t>
-            </a:r>
-            <a:r>
-              <a:rPr lang="en-US" sz="1800" b="1" dirty="0">
-                <a:latin typeface="Times New Roman" panose="02020603050405020304" pitchFamily="18" charset="0"/>
-                <a:cs typeface="Times New Roman" panose="02020603050405020304" pitchFamily="18" charset="0"/>
-              </a:rPr>
-              <a:t> (35515)                                       </a:t>
+              <a:t> Abideen (35515)                                       </a:t>
             </a:r>
           </a:p>
           <a:p>
@@ -20173,18 +20472,11 @@
               <a:buSzPts val="3200"/>
             </a:pPr>
             <a:r>
-              <a:rPr lang="en-US" sz="1800" dirty="0" err="1">
-                <a:latin typeface="Times New Roman" panose="02020603050405020304" pitchFamily="18" charset="0"/>
-                <a:cs typeface="Times New Roman" panose="02020603050405020304" pitchFamily="18" charset="0"/>
-              </a:rPr>
-              <a:t>Ui</a:t>
-            </a:r>
-            <a:r>
               <a:rPr lang="en-US" sz="1800" dirty="0">
                 <a:latin typeface="Times New Roman" panose="02020603050405020304" pitchFamily="18" charset="0"/>
                 <a:cs typeface="Times New Roman" panose="02020603050405020304" pitchFamily="18" charset="0"/>
               </a:rPr>
-              <a:t>/</a:t>
+              <a:t>Ui/</a:t>
             </a:r>
             <a:r>
               <a:rPr lang="en-US" sz="1800" dirty="0" err="1">
@@ -20329,18 +20621,11 @@
               <a:buSzPts val="3200"/>
             </a:pPr>
             <a:r>
-              <a:rPr lang="en-US" sz="1800" b="1" dirty="0" err="1">
-                <a:latin typeface="Times New Roman" panose="02020603050405020304" pitchFamily="18" charset="0"/>
-                <a:cs typeface="Times New Roman" panose="02020603050405020304" pitchFamily="18" charset="0"/>
-              </a:rPr>
-              <a:t>Huzaifa</a:t>
-            </a:r>
-            <a:r>
               <a:rPr lang="en-US" sz="1800" b="1" dirty="0">
                 <a:latin typeface="Times New Roman" panose="02020603050405020304" pitchFamily="18" charset="0"/>
                 <a:cs typeface="Times New Roman" panose="02020603050405020304" pitchFamily="18" charset="0"/>
               </a:rPr>
-              <a:t> Khan (35726)</a:t>
+              <a:t>Huzaifa Khan (35726)</a:t>
             </a:r>
           </a:p>
           <a:p>
@@ -20351,12 +20636,16 @@
               <a:buSzPts val="3200"/>
             </a:pPr>
             <a:r>
-              <a:rPr lang="en-US" sz="1800" dirty="0">
-                <a:latin typeface="Times New Roman" panose="02020603050405020304" pitchFamily="18" charset="0"/>
-                <a:cs typeface="Times New Roman" panose="02020603050405020304" pitchFamily="18" charset="0"/>
-              </a:rPr>
-              <a:t>App Development</a:t>
-            </a:r>
+              <a:rPr lang="en-US" sz="1800" dirty="0" smtClean="0">
+                <a:latin typeface="Times New Roman" panose="02020603050405020304" pitchFamily="18" charset="0"/>
+                <a:cs typeface="Times New Roman" panose="02020603050405020304" pitchFamily="18" charset="0"/>
+              </a:rPr>
+              <a:t>Documentation</a:t>
+            </a:r>
+            <a:endParaRPr lang="en-US" sz="1800" dirty="0">
+              <a:latin typeface="Times New Roman" panose="02020603050405020304" pitchFamily="18" charset="0"/>
+              <a:cs typeface="Times New Roman" panose="02020603050405020304" pitchFamily="18" charset="0"/>
+            </a:endParaRPr>
           </a:p>
           <a:p>
             <a:pPr marL="1117600" lvl="1" indent="-457200">
@@ -20370,7 +20659,14 @@
                 <a:latin typeface="Times New Roman" panose="02020603050405020304" pitchFamily="18" charset="0"/>
                 <a:cs typeface="Times New Roman" panose="02020603050405020304" pitchFamily="18" charset="0"/>
               </a:rPr>
-              <a:t>Documentation</a:t>
+              <a:t>Gap </a:t>
+            </a:r>
+            <a:r>
+              <a:rPr lang="en-US" sz="1800" dirty="0" smtClean="0">
+                <a:latin typeface="Times New Roman" panose="02020603050405020304" pitchFamily="18" charset="0"/>
+                <a:cs typeface="Times New Roman" panose="02020603050405020304" pitchFamily="18" charset="0"/>
+              </a:rPr>
+              <a:t>Analysis</a:t>
             </a:r>
           </a:p>
           <a:p>
@@ -20385,8 +20681,67 @@
                 <a:latin typeface="Times New Roman" panose="02020603050405020304" pitchFamily="18" charset="0"/>
                 <a:cs typeface="Times New Roman" panose="02020603050405020304" pitchFamily="18" charset="0"/>
               </a:rPr>
-              <a:t>Gap Analysis</a:t>
-            </a:r>
+              <a:t>Literature </a:t>
+            </a:r>
+            <a:r>
+              <a:rPr lang="en-US" sz="1800" dirty="0" smtClean="0">
+                <a:latin typeface="Times New Roman" panose="02020603050405020304" pitchFamily="18" charset="0"/>
+                <a:cs typeface="Times New Roman" panose="02020603050405020304" pitchFamily="18" charset="0"/>
+              </a:rPr>
+              <a:t>Review</a:t>
+            </a:r>
+            <a:endParaRPr lang="en-US" sz="1800" dirty="0" smtClean="0">
+              <a:latin typeface="Times New Roman" panose="02020603050405020304" pitchFamily="18" charset="0"/>
+              <a:cs typeface="Times New Roman" panose="02020603050405020304" pitchFamily="18" charset="0"/>
+            </a:endParaRPr>
+          </a:p>
+          <a:p>
+            <a:pPr marL="1117600" lvl="1" indent="-457200">
+              <a:spcBef>
+                <a:spcPts val="0"/>
+              </a:spcBef>
+              <a:buSzPts val="3200"/>
+            </a:pPr>
+            <a:r>
+              <a:rPr lang="en-US" sz="1800" dirty="0" err="1">
+                <a:latin typeface="Times New Roman" panose="02020603050405020304" pitchFamily="18" charset="0"/>
+                <a:cs typeface="Times New Roman" panose="02020603050405020304" pitchFamily="18" charset="0"/>
+              </a:rPr>
+              <a:t>Ui</a:t>
+            </a:r>
+            <a:r>
+              <a:rPr lang="en-US" sz="1800" dirty="0">
+                <a:latin typeface="Times New Roman" panose="02020603050405020304" pitchFamily="18" charset="0"/>
+                <a:cs typeface="Times New Roman" panose="02020603050405020304" pitchFamily="18" charset="0"/>
+              </a:rPr>
+              <a:t>/</a:t>
+            </a:r>
+            <a:r>
+              <a:rPr lang="en-US" sz="1800" dirty="0" err="1">
+                <a:latin typeface="Times New Roman" panose="02020603050405020304" pitchFamily="18" charset="0"/>
+                <a:cs typeface="Times New Roman" panose="02020603050405020304" pitchFamily="18" charset="0"/>
+              </a:rPr>
+              <a:t>Ux</a:t>
+            </a:r>
+            <a:r>
+              <a:rPr lang="en-US" sz="1800" dirty="0">
+                <a:latin typeface="Times New Roman" panose="02020603050405020304" pitchFamily="18" charset="0"/>
+                <a:cs typeface="Times New Roman" panose="02020603050405020304" pitchFamily="18" charset="0"/>
+              </a:rPr>
+              <a:t> Design</a:t>
+            </a:r>
+          </a:p>
+          <a:p>
+            <a:pPr marL="1117600" lvl="1" indent="-457200">
+              <a:spcBef>
+                <a:spcPts val="0"/>
+              </a:spcBef>
+              <a:buSzPts val="3200"/>
+            </a:pPr>
+            <a:endParaRPr lang="en-US" sz="1800" dirty="0">
+              <a:latin typeface="Times New Roman" panose="02020603050405020304" pitchFamily="18" charset="0"/>
+              <a:cs typeface="Times New Roman" panose="02020603050405020304" pitchFamily="18" charset="0"/>
+            </a:endParaRPr>
           </a:p>
           <a:p>
             <a:pPr marL="0" lvl="0" indent="0" algn="l" rtl="0">
@@ -20414,7 +20769,7 @@
 </p:sld>
 </file>
 
-<file path=ppt/slides/slide38.xml><?xml version="1.0" encoding="utf-8"?>
+<file path=ppt/slides/slide39.xml><?xml version="1.0" encoding="utf-8"?>
 <p:sld xmlns:a="http://schemas.openxmlformats.org/drawingml/2006/main" xmlns:r="http://schemas.openxmlformats.org/officeDocument/2006/relationships" xmlns:p="http://schemas.openxmlformats.org/presentationml/2006/main">
   <p:cSld>
     <p:spTree>
@@ -20617,10 +20972,6 @@
               </a:rPr>
               <a:t>.</a:t>
             </a:r>
-            <a:endParaRPr lang="en-US" sz="2000" dirty="0">
-              <a:latin typeface="Times New Roman" panose="02020603050405020304" pitchFamily="18" charset="0"/>
-              <a:cs typeface="Times New Roman" panose="02020603050405020304" pitchFamily="18" charset="0"/>
-            </a:endParaRPr>
           </a:p>
         </p:txBody>
       </p:sp>
@@ -20630,124 +20981,6 @@
         <p14:creationId xmlns:p14="http://schemas.microsoft.com/office/powerpoint/2010/main" val="3692856438"/>
       </p:ext>
     </p:extLst>
-  </p:cSld>
-  <p:clrMapOvr>
-    <a:masterClrMapping/>
-  </p:clrMapOvr>
-</p:sld>
-</file>
-
-<file path=ppt/slides/slide39.xml><?xml version="1.0" encoding="utf-8"?>
-<p:sld xmlns:a="http://schemas.openxmlformats.org/drawingml/2006/main" xmlns:r="http://schemas.openxmlformats.org/officeDocument/2006/relationships" xmlns:p="http://schemas.openxmlformats.org/presentationml/2006/main">
-  <p:cSld>
-    <p:spTree>
-      <p:nvGrpSpPr>
-        <p:cNvPr id="1" name="Shape 180"/>
-        <p:cNvGrpSpPr/>
-        <p:nvPr/>
-      </p:nvGrpSpPr>
-      <p:grpSpPr>
-        <a:xfrm>
-          <a:off x="0" y="0"/>
-          <a:ext cx="0" cy="0"/>
-          <a:chOff x="0" y="0"/>
-          <a:chExt cx="0" cy="0"/>
-        </a:xfrm>
-      </p:grpSpPr>
-      <p:sp>
-        <p:nvSpPr>
-          <p:cNvPr id="181" name="Google Shape;181;p17"/>
-          <p:cNvSpPr txBox="1">
-            <a:spLocks noGrp="1"/>
-          </p:cNvSpPr>
-          <p:nvPr>
-            <p:ph type="title"/>
-          </p:nvPr>
-        </p:nvSpPr>
-        <p:spPr>
-          <a:xfrm>
-            <a:off x="722313" y="4406900"/>
-            <a:ext cx="7772400" cy="1362075"/>
-          </a:xfrm>
-          <a:prstGeom prst="rect">
-            <a:avLst/>
-          </a:prstGeom>
-          <a:noFill/>
-          <a:ln>
-            <a:noFill/>
-          </a:ln>
-        </p:spPr>
-        <p:txBody>
-          <a:bodyPr spcFirstLastPara="1" wrap="square" lIns="91425" tIns="45700" rIns="91425" bIns="45700" anchor="t" anchorCtr="0">
-            <a:normAutofit/>
-          </a:bodyPr>
-          <a:lstStyle/>
-          <a:p>
-            <a:pPr marL="0" lvl="0" indent="0" algn="l" rtl="0">
-              <a:spcBef>
-                <a:spcPts val="0"/>
-              </a:spcBef>
-              <a:spcAft>
-                <a:spcPts val="0"/>
-              </a:spcAft>
-              <a:buNone/>
-            </a:pPr>
-            <a:r>
-              <a:rPr lang="en-US"/>
-              <a:t>CONCLUSION AND OUTLOOK</a:t>
-            </a:r>
-            <a:endParaRPr/>
-          </a:p>
-        </p:txBody>
-      </p:sp>
-      <p:sp>
-        <p:nvSpPr>
-          <p:cNvPr id="182" name="Google Shape;182;p17"/>
-          <p:cNvSpPr txBox="1">
-            <a:spLocks noGrp="1"/>
-          </p:cNvSpPr>
-          <p:nvPr>
-            <p:ph type="body" idx="1"/>
-          </p:nvPr>
-        </p:nvSpPr>
-        <p:spPr>
-          <a:xfrm>
-            <a:off x="722313" y="2906713"/>
-            <a:ext cx="7772400" cy="1500187"/>
-          </a:xfrm>
-          <a:prstGeom prst="rect">
-            <a:avLst/>
-          </a:prstGeom>
-          <a:noFill/>
-          <a:ln>
-            <a:noFill/>
-          </a:ln>
-        </p:spPr>
-        <p:txBody>
-          <a:bodyPr spcFirstLastPara="1" wrap="square" lIns="91425" tIns="45700" rIns="91425" bIns="45700" anchor="b" anchorCtr="0">
-            <a:normAutofit/>
-          </a:bodyPr>
-          <a:lstStyle/>
-          <a:p>
-            <a:pPr marL="44450" lvl="0" indent="0" algn="l" rtl="0">
-              <a:spcBef>
-                <a:spcPts val="0"/>
-              </a:spcBef>
-              <a:spcAft>
-                <a:spcPts val="0"/>
-              </a:spcAft>
-              <a:buClr>
-                <a:srgbClr val="888888"/>
-              </a:buClr>
-              <a:buSzPts val="2000"/>
-              <a:buFont typeface="Arial"/>
-              <a:buNone/>
-            </a:pPr>
-            <a:endParaRPr/>
-          </a:p>
-        </p:txBody>
-      </p:sp>
-    </p:spTree>
   </p:cSld>
   <p:clrMapOvr>
     <a:masterClrMapping/>
@@ -20831,7 +21064,7 @@
   <p:cSld>
     <p:spTree>
       <p:nvGrpSpPr>
-        <p:cNvPr id="1" name="Shape 186"/>
+        <p:cNvPr id="1" name=""/>
         <p:cNvGrpSpPr/>
         <p:nvPr/>
       </p:nvGrpSpPr>
@@ -20845,54 +21078,8 @@
       </p:grpSpPr>
       <p:sp>
         <p:nvSpPr>
-          <p:cNvPr id="187" name="Google Shape;187;p18"/>
-          <p:cNvSpPr txBox="1">
-            <a:spLocks noGrp="1"/>
-          </p:cNvSpPr>
-          <p:nvPr>
-            <p:ph type="title"/>
-          </p:nvPr>
-        </p:nvSpPr>
-        <p:spPr>
-          <a:xfrm>
-            <a:off x="457200" y="274638"/>
-            <a:ext cx="8229600" cy="1143000"/>
-          </a:xfrm>
-          <a:prstGeom prst="rect">
-            <a:avLst/>
-          </a:prstGeom>
-          <a:noFill/>
-          <a:ln>
-            <a:noFill/>
-          </a:ln>
-        </p:spPr>
-        <p:txBody>
-          <a:bodyPr spcFirstLastPara="1" wrap="square" lIns="91425" tIns="45700" rIns="91425" bIns="45700" anchor="ctr" anchorCtr="0">
-            <a:noAutofit/>
-          </a:bodyPr>
-          <a:lstStyle/>
-          <a:p>
-            <a:pPr marL="0" lvl="0" indent="0" algn="ctr" rtl="0">
-              <a:spcBef>
-                <a:spcPts val="0"/>
-              </a:spcBef>
-              <a:spcAft>
-                <a:spcPts val="0"/>
-              </a:spcAft>
-              <a:buNone/>
-            </a:pPr>
-            <a:r>
-              <a:rPr lang="en-US"/>
-              <a:t>Conclusion &amp; Outlook</a:t>
-            </a:r>
-            <a:endParaRPr/>
-          </a:p>
-        </p:txBody>
-      </p:sp>
-      <p:sp>
-        <p:nvSpPr>
-          <p:cNvPr id="188" name="Google Shape;188;p18"/>
-          <p:cNvSpPr txBox="1">
+          <p:cNvPr id="3" name="Text Placeholder 2"/>
+          <p:cNvSpPr>
             <a:spLocks noGrp="1"/>
           </p:cNvSpPr>
           <p:nvPr>
@@ -20901,41 +21088,70 @@
         </p:nvSpPr>
         <p:spPr>
           <a:xfrm>
-            <a:off x="457200" y="1600200"/>
-            <a:ext cx="8229600" cy="4525963"/>
+            <a:off x="529388" y="4018547"/>
+            <a:ext cx="8097253" cy="1265406"/>
+          </a:xfrm>
+        </p:spPr>
+        <p:txBody>
+          <a:bodyPr/>
+          <a:lstStyle/>
+          <a:p>
+            <a:pPr marL="114300" indent="0">
+              <a:buNone/>
+            </a:pPr>
+            <a:r>
+              <a:rPr lang="en-GB" dirty="0" smtClean="0"/>
+              <a:t>		</a:t>
+            </a:r>
+            <a:r>
+              <a:rPr lang="en-GB" sz="4500" dirty="0" smtClean="0">
+                <a:latin typeface="Times New Roman" panose="02020603050405020304" pitchFamily="18" charset="0"/>
+                <a:cs typeface="Times New Roman" panose="02020603050405020304" pitchFamily="18" charset="0"/>
+              </a:rPr>
+              <a:t>	Thank You</a:t>
+            </a:r>
+            <a:endParaRPr lang="en-GB" sz="4500" dirty="0">
+              <a:latin typeface="Times New Roman" panose="02020603050405020304" pitchFamily="18" charset="0"/>
+              <a:cs typeface="Times New Roman" panose="02020603050405020304" pitchFamily="18" charset="0"/>
+            </a:endParaRPr>
+          </a:p>
+        </p:txBody>
+      </p:sp>
+      <p:pic>
+        <p:nvPicPr>
+          <p:cNvPr id="4" name="Picture 3">
+            <a:extLst>
+              <a:ext uri="{FF2B5EF4-FFF2-40B4-BE49-F238E27FC236}">
+                <a16:creationId xmlns:a16="http://schemas.microsoft.com/office/drawing/2014/main" id="{70D43D12-3B74-4C21-4724-84F54D4E0D91}"/>
+              </a:ext>
+            </a:extLst>
+          </p:cNvPr>
+          <p:cNvPicPr>
+            <a:picLocks noChangeAspect="1"/>
+          </p:cNvPicPr>
+          <p:nvPr/>
+        </p:nvPicPr>
+        <p:blipFill>
+          <a:blip r:embed="rId2"/>
+          <a:srcRect t="19879" b="28440"/>
+          <a:stretch/>
+        </p:blipFill>
+        <p:spPr>
+          <a:xfrm>
+            <a:off x="1160650" y="1078944"/>
+            <a:ext cx="7015205" cy="2939603"/>
           </a:xfrm>
           <a:prstGeom prst="rect">
             <a:avLst/>
           </a:prstGeom>
-          <a:noFill/>
-          <a:ln>
-            <a:noFill/>
-          </a:ln>
         </p:spPr>
-        <p:txBody>
-          <a:bodyPr spcFirstLastPara="1" wrap="square" lIns="91425" tIns="45700" rIns="91425" bIns="45700" anchor="t" anchorCtr="0">
-            <a:noAutofit/>
-          </a:bodyPr>
-          <a:lstStyle/>
-          <a:p>
-            <a:pPr marL="342900" lvl="0" indent="-139700" algn="l" rtl="0">
-              <a:spcBef>
-                <a:spcPts val="0"/>
-              </a:spcBef>
-              <a:spcAft>
-                <a:spcPts val="0"/>
-              </a:spcAft>
-              <a:buClr>
-                <a:schemeClr val="dk1"/>
-              </a:buClr>
-              <a:buSzPts val="3200"/>
-              <a:buNone/>
-            </a:pPr>
-            <a:endParaRPr/>
-          </a:p>
-        </p:txBody>
-      </p:sp>
+      </p:pic>
     </p:spTree>
+    <p:extLst>
+      <p:ext uri="{BB962C8B-B14F-4D97-AF65-F5344CB8AC3E}">
+        <p14:creationId xmlns:p14="http://schemas.microsoft.com/office/powerpoint/2010/main" val="2344932616"/>
+      </p:ext>
+    </p:extLst>
   </p:cSld>
   <p:clrMapOvr>
     <a:masterClrMapping/>
@@ -21210,7 +21426,7 @@
                 <a:hlinkClick r:id="rId3">
                   <a:extLst>
                     <a:ext uri="{A12FA001-AC4F-418D-AE19-62706E023703}">
-                      <ahyp:hlinkClr xmlns:ahyp="http://schemas.microsoft.com/office/drawing/2018/hyperlinkcolor" xmlns="" xmlns:lc="http://schemas.openxmlformats.org/drawingml/2006/lockedCanvas" val="tx"/>
+                      <ahyp:hlinkClr xmlns:lc="http://schemas.openxmlformats.org/drawingml/2006/lockedCanvas" xmlns="" xmlns:ahyp="http://schemas.microsoft.com/office/drawing/2018/hyperlinkcolor" val="tx"/>
                     </a:ext>
                   </a:extLst>
                 </a:hlinkClick>
@@ -21225,7 +21441,7 @@
                 <a:hlinkClick r:id="rId3">
                   <a:extLst>
                     <a:ext uri="{A12FA001-AC4F-418D-AE19-62706E023703}">
-                      <ahyp:hlinkClr xmlns:ahyp="http://schemas.microsoft.com/office/drawing/2018/hyperlinkcolor" xmlns="" xmlns:lc="http://schemas.openxmlformats.org/drawingml/2006/lockedCanvas" val="tx"/>
+                      <ahyp:hlinkClr xmlns:lc="http://schemas.openxmlformats.org/drawingml/2006/lockedCanvas" xmlns="" xmlns:ahyp="http://schemas.microsoft.com/office/drawing/2018/hyperlinkcolor" val="tx"/>
                     </a:ext>
                   </a:extLst>
                 </a:hlinkClick>
@@ -21356,7 +21572,28 @@
                 <a:latin typeface="Times New Roman" panose="02020603050405020304" pitchFamily="18" charset="0"/>
                 <a:cs typeface="Times New Roman" panose="02020603050405020304" pitchFamily="18" charset="0"/>
               </a:rPr>
-              <a:t>that provides personalized fitness solutions for health-conscious individuals, including those managing conditions like diabetes. By integrating tailored workout and diet recommendations, the platform ensures a balanced and comprehensive approach to achieving fitness goals. Its user-friendly design and accessibility aim to make fitness achievable for everyone.</a:t>
+              <a:t>that provides personalized fitness solutions for health-conscious individuals, including those managing conditions like </a:t>
+            </a:r>
+            <a:r>
+              <a:rPr lang="en-GB" sz="2500" dirty="0" smtClean="0">
+                <a:latin typeface="Times New Roman" panose="02020603050405020304" pitchFamily="18" charset="0"/>
+                <a:cs typeface="Times New Roman" panose="02020603050405020304" pitchFamily="18" charset="0"/>
+              </a:rPr>
+              <a:t>obesity</a:t>
+            </a:r>
+            <a:r>
+              <a:rPr lang="en-GB" sz="2500" dirty="0" smtClean="0">
+                <a:latin typeface="Times New Roman" panose="02020603050405020304" pitchFamily="18" charset="0"/>
+                <a:cs typeface="Times New Roman" panose="02020603050405020304" pitchFamily="18" charset="0"/>
+              </a:rPr>
+              <a:t>. </a:t>
+            </a:r>
+            <a:r>
+              <a:rPr lang="en-GB" sz="2500" dirty="0">
+                <a:latin typeface="Times New Roman" panose="02020603050405020304" pitchFamily="18" charset="0"/>
+                <a:cs typeface="Times New Roman" panose="02020603050405020304" pitchFamily="18" charset="0"/>
+              </a:rPr>
+              <a:t>By integrating tailored workout and diet recommendations, the platform ensures a balanced and comprehensive approach to achieving fitness goals. Its user-friendly design and accessibility aim to make fitness achievable for everyone.</a:t>
             </a:r>
           </a:p>
           <a:p>
@@ -21565,7 +21802,31 @@
                 <a:ea typeface="Calibri" panose="020F0502020204030204" pitchFamily="34" charset="0"/>
                 <a:cs typeface="Times New Roman" panose="02020603050405020304" pitchFamily="18" charset="0"/>
               </a:rPr>
-              <a:t>There's been a substantial increase in the usage of fitness apps using AI, with an annual growth rate of 17%. [1]</a:t>
+              <a:t>There's been a substantial increase in the usage of fitness </a:t>
+            </a:r>
+            <a:r>
+              <a:rPr lang="en-US" sz="2500" dirty="0" smtClean="0">
+                <a:latin typeface="Times New Roman" panose="02020603050405020304" pitchFamily="18" charset="0"/>
+                <a:ea typeface="Calibri" panose="020F0502020204030204" pitchFamily="34" charset="0"/>
+                <a:cs typeface="Times New Roman" panose="02020603050405020304" pitchFamily="18" charset="0"/>
+              </a:rPr>
+              <a:t>platforms </a:t>
+            </a:r>
+            <a:r>
+              <a:rPr lang="en-US" sz="2500" dirty="0" smtClean="0">
+                <a:latin typeface="Times New Roman" panose="02020603050405020304" pitchFamily="18" charset="0"/>
+                <a:ea typeface="Calibri" panose="020F0502020204030204" pitchFamily="34" charset="0"/>
+                <a:cs typeface="Times New Roman" panose="02020603050405020304" pitchFamily="18" charset="0"/>
+              </a:rPr>
+              <a:t>using </a:t>
+            </a:r>
+            <a:r>
+              <a:rPr lang="en-US" sz="2500" dirty="0">
+                <a:latin typeface="Times New Roman" panose="02020603050405020304" pitchFamily="18" charset="0"/>
+                <a:ea typeface="Calibri" panose="020F0502020204030204" pitchFamily="34" charset="0"/>
+                <a:cs typeface="Times New Roman" panose="02020603050405020304" pitchFamily="18" charset="0"/>
+              </a:rPr>
+              <a:t>AI, with an annual growth rate of 17%. [1]</a:t>
             </a:r>
           </a:p>
           <a:p>
@@ -21615,11 +21876,6 @@
               </a:rPr>
               <a:t>Combining a structured workout plan with a tailored diet plan can lead to better fitness outcomes.</a:t>
             </a:r>
-            <a:endParaRPr lang="en-US" sz="2500" dirty="0">
-              <a:latin typeface="Times New Roman" panose="02020603050405020304" pitchFamily="18" charset="0"/>
-              <a:ea typeface="Calibri" panose="020F0502020204030204" pitchFamily="34" charset="0"/>
-              <a:cs typeface="Times New Roman" panose="02020603050405020304" pitchFamily="18" charset="0"/>
-            </a:endParaRPr>
           </a:p>
         </p:txBody>
       </p:sp>
@@ -21631,7 +21887,7 @@
         </p:nvSpPr>
         <p:spPr>
           <a:xfrm>
-            <a:off x="2286000" y="6119336"/>
+            <a:off x="2286000" y="6073299"/>
             <a:ext cx="6400800" cy="738664"/>
           </a:xfrm>
           <a:prstGeom prst="rect">
@@ -21666,7 +21922,7 @@
                 <a:hlinkClick r:id="rId3">
                   <a:extLst>
                     <a:ext uri="{A12FA001-AC4F-418D-AE19-62706E023703}">
-                      <ahyp:hlinkClr xmlns="" xmlns:ahyp="http://schemas.microsoft.com/office/drawing/2018/hyperlinkcolor" xmlns:lc="http://schemas.openxmlformats.org/drawingml/2006/lockedCanvas" val="tx"/>
+                      <ahyp:hlinkClr xmlns:lc="http://schemas.openxmlformats.org/drawingml/2006/lockedCanvas" xmlns:ahyp="http://schemas.microsoft.com/office/drawing/2018/hyperlinkcolor" xmlns="" val="tx"/>
                     </a:ext>
                   </a:extLst>
                 </a:hlinkClick>
@@ -21705,7 +21961,7 @@
                 <a:hlinkClick r:id="rId4">
                   <a:extLst>
                     <a:ext uri="{A12FA001-AC4F-418D-AE19-62706E023703}">
-                      <ahyp:hlinkClr xmlns="" xmlns:ahyp="http://schemas.microsoft.com/office/drawing/2018/hyperlinkcolor" xmlns:lc="http://schemas.openxmlformats.org/drawingml/2006/lockedCanvas" val="tx"/>
+                      <ahyp:hlinkClr xmlns:lc="http://schemas.openxmlformats.org/drawingml/2006/lockedCanvas" xmlns:ahyp="http://schemas.microsoft.com/office/drawing/2018/hyperlinkcolor" xmlns="" val="tx"/>
                     </a:ext>
                   </a:extLst>
                 </a:hlinkClick>
@@ -21744,7 +22000,7 @@
                 <a:hlinkClick r:id="rId5">
                   <a:extLst>
                     <a:ext uri="{A12FA001-AC4F-418D-AE19-62706E023703}">
-                      <ahyp:hlinkClr xmlns="" xmlns:ahyp="http://schemas.microsoft.com/office/drawing/2018/hyperlinkcolor" xmlns:lc="http://schemas.openxmlformats.org/drawingml/2006/lockedCanvas" val="tx"/>
+                      <ahyp:hlinkClr xmlns:lc="http://schemas.openxmlformats.org/drawingml/2006/lockedCanvas" xmlns:ahyp="http://schemas.microsoft.com/office/drawing/2018/hyperlinkcolor" xmlns="" val="tx"/>
                     </a:ext>
                   </a:extLst>
                 </a:hlinkClick>
@@ -21975,11 +22231,6 @@
               </a:rPr>
               <a:t>REE=10×weight kg +6.25×height cm −5×age y −161</a:t>
             </a:r>
-            <a:endParaRPr lang="en-US" sz="2400" b="1" i="1" dirty="0">
-              <a:latin typeface="Times New Roman" panose="02020603050405020304" pitchFamily="18" charset="0"/>
-              <a:ea typeface="Calibri" panose="020F0502020204030204" pitchFamily="34" charset="0"/>
-              <a:cs typeface="Times New Roman" panose="02020603050405020304" pitchFamily="18" charset="0"/>
-            </a:endParaRPr>
           </a:p>
         </p:txBody>
       </p:sp>
@@ -22026,7 +22277,7 @@
                 <a:hlinkClick r:id="rId2">
                   <a:extLst>
                     <a:ext uri="{A12FA001-AC4F-418D-AE19-62706E023703}">
-                      <ahyp:hlinkClr xmlns="" xmlns:ahyp="http://schemas.microsoft.com/office/drawing/2018/hyperlinkcolor" xmlns:lc="http://schemas.openxmlformats.org/drawingml/2006/lockedCanvas" val="tx"/>
+                      <ahyp:hlinkClr xmlns:lc="http://schemas.openxmlformats.org/drawingml/2006/lockedCanvas" xmlns:ahyp="http://schemas.microsoft.com/office/drawing/2018/hyperlinkcolor" xmlns="" val="tx"/>
                     </a:ext>
                   </a:extLst>
                 </a:hlinkClick>

</xml_diff>

<commit_message>
`Updated Fitnessstan documentation and Fitnesstan_Documentation files with minor changes and corrections`
</commit_message>
<xml_diff>
--- a/fitnesstan-documentation/FItnessstan_Final Presentation_Part 2.pptx
+++ b/fitnesstan-documentation/FItnessstan_Final Presentation_Part 2.pptx
@@ -5,7 +5,7 @@
     <p:sldMasterId id="2147483648" r:id="rId1"/>
   </p:sldMasterIdLst>
   <p:notesMasterIdLst>
-    <p:notesMasterId r:id="rId42"/>
+    <p:notesMasterId r:id="rId43"/>
   </p:notesMasterIdLst>
   <p:sldIdLst>
     <p:sldId id="256" r:id="rId2"/>
@@ -39,15 +39,16 @@
     <p:sldId id="288" r:id="rId30"/>
     <p:sldId id="289" r:id="rId31"/>
     <p:sldId id="290" r:id="rId32"/>
-    <p:sldId id="291" r:id="rId33"/>
-    <p:sldId id="292" r:id="rId34"/>
-    <p:sldId id="293" r:id="rId35"/>
-    <p:sldId id="296" r:id="rId36"/>
-    <p:sldId id="271" r:id="rId37"/>
-    <p:sldId id="265" r:id="rId38"/>
-    <p:sldId id="266" r:id="rId39"/>
-    <p:sldId id="295" r:id="rId40"/>
-    <p:sldId id="297" r:id="rId41"/>
+    <p:sldId id="298" r:id="rId33"/>
+    <p:sldId id="291" r:id="rId34"/>
+    <p:sldId id="292" r:id="rId35"/>
+    <p:sldId id="293" r:id="rId36"/>
+    <p:sldId id="296" r:id="rId37"/>
+    <p:sldId id="271" r:id="rId38"/>
+    <p:sldId id="265" r:id="rId39"/>
+    <p:sldId id="266" r:id="rId40"/>
+    <p:sldId id="295" r:id="rId41"/>
+    <p:sldId id="297" r:id="rId42"/>
   </p:sldIdLst>
   <p:sldSz cx="9144000" cy="6858000" type="screen4x3"/>
   <p:notesSz cx="7315200" cy="9601200"/>
@@ -296,7 +297,7 @@
       </p15:sldGuideLst>
     </p:ext>
     <p:ext uri="http://customooxmlschemas.google.com/">
-      <go:slidesCustomData xmlns:go="http://customooxmlschemas.google.com/" xmlns:ahyp="http://schemas.microsoft.com/office/drawing/2018/hyperlinkcolor" xmlns:p15="http://schemas.microsoft.com/office/powerpoint/2012/main" xmlns:p14="http://schemas.microsoft.com/office/powerpoint/2010/main" xmlns:com="http://schemas.openxmlformats.org/drawingml/2006/compatibility" xmlns:pvml="urn:schemas-microsoft-com:office:powerpoint" xmlns:v="urn:schemas-microsoft-com:vml" xmlns:o="urn:schemas-microsoft-com:office:office" xmlns:dgm="http://schemas.openxmlformats.org/drawingml/2006/diagram" xmlns:c="http://schemas.openxmlformats.org/drawingml/2006/chart" xmlns:mv="urn:schemas-microsoft-com:mac:vml" xmlns:mc="http://schemas.openxmlformats.org/markup-compatibility/2006" xmlns="" r:id="rId43" roundtripDataSignature="AMtx7mj2AY3DNheaNSztFqwRHhpggp8VFA=="/>
+      <go:slidesCustomData xmlns="" xmlns:mc="http://schemas.openxmlformats.org/markup-compatibility/2006" xmlns:mv="urn:schemas-microsoft-com:mac:vml" xmlns:c="http://schemas.openxmlformats.org/drawingml/2006/chart" xmlns:dgm="http://schemas.openxmlformats.org/drawingml/2006/diagram" xmlns:o="urn:schemas-microsoft-com:office:office" xmlns:v="urn:schemas-microsoft-com:vml" xmlns:pvml="urn:schemas-microsoft-com:office:powerpoint" xmlns:com="http://schemas.openxmlformats.org/drawingml/2006/compatibility" xmlns:p14="http://schemas.microsoft.com/office/powerpoint/2010/main" xmlns:p15="http://schemas.microsoft.com/office/powerpoint/2012/main" xmlns:ahyp="http://schemas.microsoft.com/office/drawing/2018/hyperlinkcolor" xmlns:go="http://customooxmlschemas.google.com/" r:id="rId44" roundtripDataSignature="AMtx7mj2AY3DNheaNSztFqwRHhpggp8VFA=="/>
     </p:ext>
   </p:extLst>
 </p:presentation>
@@ -13838,7 +13839,7 @@
               </a:spcBef>
             </a:pPr>
             <a:r>
-              <a:rPr lang="en-US" b="1" dirty="0" smtClean="0">
+              <a:rPr lang="en-US" b="1" dirty="0">
                 <a:latin typeface="Times New Roman" panose="02020603050405020304" pitchFamily="18" charset="0"/>
                 <a:cs typeface="Times New Roman" panose="02020603050405020304" pitchFamily="18" charset="0"/>
               </a:rPr>
@@ -13852,32 +13853,11 @@
               </a:spcBef>
             </a:pPr>
             <a:r>
-              <a:rPr lang="en-GB" sz="1200" dirty="0" smtClean="0">
-                <a:latin typeface="Times New Roman" panose="02020603050405020304" pitchFamily="18" charset="0"/>
-                <a:cs typeface="Times New Roman" panose="02020603050405020304" pitchFamily="18" charset="0"/>
-              </a:rPr>
-              <a:t>Supervised </a:t>
-            </a:r>
-            <a:r>
               <a:rPr lang="en-GB" sz="1200" dirty="0">
                 <a:latin typeface="Times New Roman" panose="02020603050405020304" pitchFamily="18" charset="0"/>
                 <a:cs typeface="Times New Roman" panose="02020603050405020304" pitchFamily="18" charset="0"/>
               </a:rPr>
-              <a:t>By: </a:t>
-            </a:r>
-            <a:r>
-              <a:rPr lang="en-GB" sz="1200" dirty="0" smtClean="0">
-                <a:latin typeface="Times New Roman" panose="02020603050405020304" pitchFamily="18" charset="0"/>
-                <a:cs typeface="Times New Roman" panose="02020603050405020304" pitchFamily="18" charset="0"/>
-              </a:rPr>
-              <a:t>Muhammad Islam (</a:t>
-            </a:r>
-            <a:r>
-              <a:rPr lang="en-GB" sz="1200" dirty="0">
-                <a:latin typeface="Times New Roman" panose="02020603050405020304" pitchFamily="18" charset="0"/>
-                <a:cs typeface="Times New Roman" panose="02020603050405020304" pitchFamily="18" charset="0"/>
-              </a:rPr>
-              <a:t>Lecturer)</a:t>
+              <a:t>Supervised By: Muhammad Islam (Lecturer)</a:t>
             </a:r>
           </a:p>
           <a:p>
@@ -13971,21 +13951,7 @@
                 <a:latin typeface="Times New Roman" panose="02020603050405020304" pitchFamily="18" charset="0"/>
                 <a:cs typeface="Times New Roman" panose="02020603050405020304" pitchFamily="18" charset="0"/>
               </a:rPr>
-              <a:t>Literature Review </a:t>
-            </a:r>
-            <a:r>
-              <a:rPr lang="en-US" sz="3200" dirty="0" smtClean="0">
-                <a:latin typeface="Times New Roman" panose="02020603050405020304" pitchFamily="18" charset="0"/>
-                <a:cs typeface="Times New Roman" panose="02020603050405020304" pitchFamily="18" charset="0"/>
-              </a:rPr>
-              <a:t>[3/6</a:t>
-            </a:r>
-            <a:r>
-              <a:rPr lang="en-US" sz="3200" dirty="0">
-                <a:latin typeface="Times New Roman" panose="02020603050405020304" pitchFamily="18" charset="0"/>
-                <a:cs typeface="Times New Roman" panose="02020603050405020304" pitchFamily="18" charset="0"/>
-              </a:rPr>
-              <a:t>]</a:t>
+              <a:t>Literature Review [3/6]</a:t>
             </a:r>
             <a:endParaRPr lang="en-GB" sz="3200" dirty="0"/>
           </a:p>
@@ -14013,7 +13979,7 @@
               <a:buSzPts val="3200"/>
             </a:pPr>
             <a:r>
-              <a:rPr lang="en-US" sz="2300" b="1" dirty="0" smtClean="0">
+              <a:rPr lang="en-US" sz="2300" b="1" dirty="0">
                 <a:latin typeface="Times New Roman" panose="02020603050405020304" pitchFamily="18" charset="0"/>
                 <a:ea typeface="Calibri" panose="020F0502020204030204" pitchFamily="34" charset="0"/>
                 <a:cs typeface="Times New Roman" panose="02020603050405020304" pitchFamily="18" charset="0"/>
@@ -14021,7 +13987,7 @@
               <a:t>Total Daily Energy Expenditure (TDEE) </a:t>
             </a:r>
             <a:r>
-              <a:rPr lang="en-US" sz="2300" dirty="0" smtClean="0">
+              <a:rPr lang="en-US" sz="2300" dirty="0">
                 <a:latin typeface="Times New Roman" panose="02020603050405020304" pitchFamily="18" charset="0"/>
                 <a:ea typeface="Calibri" panose="020F0502020204030204" pitchFamily="34" charset="0"/>
                 <a:cs typeface="Times New Roman" panose="02020603050405020304" pitchFamily="18" charset="0"/>
@@ -14037,7 +14003,7 @@
               <a:buSzPts val="3200"/>
             </a:pPr>
             <a:r>
-              <a:rPr lang="en-US" sz="2300" dirty="0" smtClean="0">
+              <a:rPr lang="en-US" sz="2300" dirty="0">
                 <a:latin typeface="Times New Roman" panose="02020603050405020304" pitchFamily="18" charset="0"/>
                 <a:ea typeface="Calibri" panose="020F0502020204030204" pitchFamily="34" charset="0"/>
                 <a:cs typeface="Times New Roman" panose="02020603050405020304" pitchFamily="18" charset="0"/>
@@ -14053,7 +14019,7 @@
               <a:buSzPts val="3200"/>
             </a:pPr>
             <a:r>
-              <a:rPr lang="en-US" sz="2300" dirty="0" smtClean="0">
+              <a:rPr lang="en-US" sz="2300" dirty="0">
                 <a:latin typeface="Times New Roman" panose="02020603050405020304" pitchFamily="18" charset="0"/>
                 <a:ea typeface="Calibri" panose="020F0502020204030204" pitchFamily="34" charset="0"/>
                 <a:cs typeface="Times New Roman" panose="02020603050405020304" pitchFamily="18" charset="0"/>
@@ -14069,7 +14035,7 @@
               <a:buSzPts val="3200"/>
             </a:pPr>
             <a:r>
-              <a:rPr lang="en-US" sz="2300" dirty="0" smtClean="0">
+              <a:rPr lang="en-US" sz="2300" dirty="0">
                 <a:latin typeface="Times New Roman" panose="02020603050405020304" pitchFamily="18" charset="0"/>
                 <a:ea typeface="Calibri" panose="020F0502020204030204" pitchFamily="34" charset="0"/>
                 <a:cs typeface="Times New Roman" panose="02020603050405020304" pitchFamily="18" charset="0"/>
@@ -14085,7 +14051,7 @@
               <a:buSzPts val="3200"/>
             </a:pPr>
             <a:r>
-              <a:rPr lang="en-US" sz="2300" dirty="0" smtClean="0">
+              <a:rPr lang="en-US" sz="2300" dirty="0">
                 <a:latin typeface="Times New Roman" panose="02020603050405020304" pitchFamily="18" charset="0"/>
                 <a:ea typeface="Calibri" panose="020F0502020204030204" pitchFamily="34" charset="0"/>
                 <a:cs typeface="Times New Roman" panose="02020603050405020304" pitchFamily="18" charset="0"/>
@@ -14101,7 +14067,7 @@
               <a:buSzPts val="3200"/>
             </a:pPr>
             <a:r>
-              <a:rPr lang="en-US" sz="2300" dirty="0" smtClean="0">
+              <a:rPr lang="en-US" sz="2300" dirty="0">
                 <a:latin typeface="Times New Roman" panose="02020603050405020304" pitchFamily="18" charset="0"/>
                 <a:ea typeface="Calibri" panose="020F0502020204030204" pitchFamily="34" charset="0"/>
                 <a:cs typeface="Times New Roman" panose="02020603050405020304" pitchFamily="18" charset="0"/>
@@ -14117,7 +14083,7 @@
               <a:buSzPts val="3200"/>
             </a:pPr>
             <a:r>
-              <a:rPr lang="en-US" sz="2300" dirty="0" smtClean="0">
+              <a:rPr lang="en-US" sz="2300" dirty="0">
                 <a:latin typeface="Times New Roman" panose="02020603050405020304" pitchFamily="18" charset="0"/>
                 <a:ea typeface="Calibri" panose="020F0502020204030204" pitchFamily="34" charset="0"/>
                 <a:cs typeface="Times New Roman" panose="02020603050405020304" pitchFamily="18" charset="0"/>
@@ -14133,18 +14099,13 @@
               <a:buSzPts val="3200"/>
             </a:pPr>
             <a:r>
-              <a:rPr lang="en-US" sz="2300" dirty="0" smtClean="0">
+              <a:rPr lang="en-US" sz="2300" dirty="0">
                 <a:latin typeface="Times New Roman" panose="02020603050405020304" pitchFamily="18" charset="0"/>
                 <a:ea typeface="Calibri" panose="020F0502020204030204" pitchFamily="34" charset="0"/>
                 <a:cs typeface="Times New Roman" panose="02020603050405020304" pitchFamily="18" charset="0"/>
               </a:rPr>
               <a:t>Extra active (very hard exercise, training twice a day): REE × 1.9</a:t>
             </a:r>
-            <a:endParaRPr lang="en-US" sz="2300" dirty="0">
-              <a:latin typeface="Times New Roman" panose="02020603050405020304" pitchFamily="18" charset="0"/>
-              <a:ea typeface="Calibri" panose="020F0502020204030204" pitchFamily="34" charset="0"/>
-              <a:cs typeface="Times New Roman" panose="02020603050405020304" pitchFamily="18" charset="0"/>
-            </a:endParaRPr>
           </a:p>
         </p:txBody>
       </p:sp>
@@ -14191,7 +14152,7 @@
                 <a:hlinkClick r:id="rId2">
                   <a:extLst>
                     <a:ext uri="{A12FA001-AC4F-418D-AE19-62706E023703}">
-                      <ahyp:hlinkClr xmlns:lc="http://schemas.openxmlformats.org/drawingml/2006/lockedCanvas" xmlns:ahyp="http://schemas.microsoft.com/office/drawing/2018/hyperlinkcolor" xmlns="" val="tx"/>
+                      <ahyp:hlinkClr xmlns:ahyp="http://schemas.microsoft.com/office/drawing/2018/hyperlinkcolor" val="tx"/>
                     </a:ext>
                   </a:extLst>
                 </a:hlinkClick>
@@ -14259,21 +14220,7 @@
                 <a:latin typeface="Times New Roman" panose="02020603050405020304" pitchFamily="18" charset="0"/>
                 <a:cs typeface="Times New Roman" panose="02020603050405020304" pitchFamily="18" charset="0"/>
               </a:rPr>
-              <a:t>Literature Review </a:t>
-            </a:r>
-            <a:r>
-              <a:rPr lang="en-US" sz="3200" dirty="0" smtClean="0">
-                <a:latin typeface="Times New Roman" panose="02020603050405020304" pitchFamily="18" charset="0"/>
-                <a:cs typeface="Times New Roman" panose="02020603050405020304" pitchFamily="18" charset="0"/>
-              </a:rPr>
-              <a:t>[4/6</a:t>
-            </a:r>
-            <a:r>
-              <a:rPr lang="en-US" sz="3200" dirty="0">
-                <a:latin typeface="Times New Roman" panose="02020603050405020304" pitchFamily="18" charset="0"/>
-                <a:cs typeface="Times New Roman" panose="02020603050405020304" pitchFamily="18" charset="0"/>
-              </a:rPr>
-              <a:t>]</a:t>
+              <a:t>Literature Review [4/6]</a:t>
             </a:r>
             <a:endParaRPr lang="en-GB" sz="3200" dirty="0"/>
           </a:p>
@@ -14501,7 +14448,7 @@
                 <a:hlinkClick r:id="rId2">
                   <a:extLst>
                     <a:ext uri="{A12FA001-AC4F-418D-AE19-62706E023703}">
-                      <ahyp:hlinkClr xmlns:lc="http://schemas.openxmlformats.org/drawingml/2006/lockedCanvas" xmlns:ahyp="http://schemas.microsoft.com/office/drawing/2018/hyperlinkcolor" xmlns="" val="tx"/>
+                      <ahyp:hlinkClr xmlns:ahyp="http://schemas.microsoft.com/office/drawing/2018/hyperlinkcolor" val="tx"/>
                     </a:ext>
                   </a:extLst>
                 </a:hlinkClick>
@@ -14565,7 +14512,7 @@
           <a:lstStyle/>
           <a:p>
             <a:r>
-              <a:rPr lang="en-US" sz="3200" dirty="0" smtClean="0">
+              <a:rPr lang="en-US" sz="3200" dirty="0">
                 <a:latin typeface="Times New Roman" panose="02020603050405020304" pitchFamily="18" charset="0"/>
                 <a:cs typeface="Times New Roman" panose="02020603050405020304" pitchFamily="18" charset="0"/>
               </a:rPr>
@@ -14828,20 +14775,16 @@
                     <a:lstStyle/>
                     <a:p>
                       <a:r>
-                        <a:rPr lang="en-GB" sz="1200" dirty="0" smtClean="0"/>
+                        <a:rPr lang="en-GB" sz="1200" dirty="0"/>
                         <a:t>Giving</a:t>
                       </a:r>
                       <a:r>
-                        <a:rPr lang="en-GB" sz="1200" baseline="0" dirty="0" smtClean="0"/>
+                        <a:rPr lang="en-GB" sz="1200" baseline="0" dirty="0"/>
                         <a:t> </a:t>
                       </a:r>
                       <a:r>
-                        <a:rPr lang="en-GB" sz="1200" dirty="0" smtClean="0"/>
-                        <a:t>diet </a:t>
-                      </a:r>
-                      <a:r>
                         <a:rPr lang="en-GB" sz="1200" dirty="0"/>
-                        <a:t>plans</a:t>
+                        <a:t>diet plans</a:t>
                       </a:r>
                     </a:p>
                   </a:txBody>
@@ -15028,21 +14971,7 @@
                 <a:latin typeface="Times New Roman" panose="02020603050405020304" pitchFamily="18" charset="0"/>
                 <a:cs typeface="Times New Roman" panose="02020603050405020304" pitchFamily="18" charset="0"/>
               </a:rPr>
-              <a:t>Literature Review </a:t>
-            </a:r>
-            <a:r>
-              <a:rPr lang="en-US" sz="3200" dirty="0" smtClean="0">
-                <a:latin typeface="Times New Roman" panose="02020603050405020304" pitchFamily="18" charset="0"/>
-                <a:cs typeface="Times New Roman" panose="02020603050405020304" pitchFamily="18" charset="0"/>
-              </a:rPr>
-              <a:t>[6/6</a:t>
-            </a:r>
-            <a:r>
-              <a:rPr lang="en-US" sz="3200" dirty="0">
-                <a:latin typeface="Times New Roman" panose="02020603050405020304" pitchFamily="18" charset="0"/>
-                <a:cs typeface="Times New Roman" panose="02020603050405020304" pitchFamily="18" charset="0"/>
-              </a:rPr>
-              <a:t>]</a:t>
+              <a:t>Literature Review [6/6]</a:t>
             </a:r>
             <a:endParaRPr lang="en-GB" sz="3200" dirty="0"/>
           </a:p>
@@ -15517,44 +15446,29 @@
               <a:buNone/>
             </a:pPr>
             <a:r>
-              <a:rPr lang="en-GB" sz="2600" dirty="0" smtClean="0">
-                <a:latin typeface="Times New Roman" panose="02020603050405020304" pitchFamily="18" charset="0"/>
-                <a:cs typeface="Times New Roman" panose="02020603050405020304" pitchFamily="18" charset="0"/>
-              </a:rPr>
-              <a:t> Obesity individuals </a:t>
-            </a:r>
-            <a:r>
               <a:rPr lang="en-GB" sz="2600" dirty="0">
                 <a:latin typeface="Times New Roman" panose="02020603050405020304" pitchFamily="18" charset="0"/>
                 <a:cs typeface="Times New Roman" panose="02020603050405020304" pitchFamily="18" charset="0"/>
               </a:rPr>
-              <a:t>face significant </a:t>
-            </a:r>
-            <a:r>
-              <a:rPr lang="en-GB" sz="2600" dirty="0" smtClean="0">
-                <a:latin typeface="Times New Roman" panose="02020603050405020304" pitchFamily="18" charset="0"/>
-                <a:cs typeface="Times New Roman" panose="02020603050405020304" pitchFamily="18" charset="0"/>
-              </a:rPr>
-              <a:t>challenges in maintaining </a:t>
+              <a:t> Obesity individuals face significant challenges in maintaining their diet effectively. Existing platform only focus on exercise and struggles in giving personalized diet plan. Existing platform do not recommend diet along with exercises </a:t>
             </a:r>
             <a:r>
               <a:rPr lang="en-GB" sz="2600" dirty="0">
-                <a:latin typeface="Times New Roman" panose="02020603050405020304" pitchFamily="18" charset="0"/>
-                <a:cs typeface="Times New Roman" panose="02020603050405020304" pitchFamily="18" charset="0"/>
-              </a:rPr>
-              <a:t>their diet </a:t>
-            </a:r>
-            <a:r>
-              <a:rPr lang="en-GB" sz="2600" dirty="0" smtClean="0">
-                <a:latin typeface="Times New Roman" panose="02020603050405020304" pitchFamily="18" charset="0"/>
-                <a:cs typeface="Times New Roman" panose="02020603050405020304" pitchFamily="18" charset="0"/>
-              </a:rPr>
-              <a:t>effectively. Existing platform only focus on exercise and struggles in giving personalized diet plan. Existing platform do not recommend diet along with exercises. They bound people to eat the food. They do not provide personalized diet plans according to user needs.    </a:t>
-            </a:r>
-            <a:endParaRPr lang="en-GB" sz="2600" dirty="0" smtClean="0">
-              <a:latin typeface="Times New Roman" panose="02020603050405020304" pitchFamily="18" charset="0"/>
-              <a:cs typeface="Times New Roman" panose="02020603050405020304" pitchFamily="18" charset="0"/>
-            </a:endParaRPr>
+                <a:solidFill>
+                  <a:srgbClr val="FF0000"/>
+                </a:solidFill>
+                <a:latin typeface="Times New Roman" panose="02020603050405020304" pitchFamily="18" charset="0"/>
+                <a:cs typeface="Times New Roman" panose="02020603050405020304" pitchFamily="18" charset="0"/>
+              </a:rPr>
+              <a:t>If they do they bound people with specific food item, which is difficult for people to have on regular basis.</a:t>
+            </a:r>
+            <a:r>
+              <a:rPr lang="en-GB" sz="2600" dirty="0">
+                <a:latin typeface="Times New Roman" panose="02020603050405020304" pitchFamily="18" charset="0"/>
+                <a:cs typeface="Times New Roman" panose="02020603050405020304" pitchFamily="18" charset="0"/>
+              </a:rPr>
+              <a:t> They do not provide personalized diet plans according to user needs.    </a:t>
+            </a:r>
           </a:p>
         </p:txBody>
       </p:sp>
@@ -15599,10 +15513,9 @@
           <a:lstStyle/>
           <a:p>
             <a:r>
-              <a:rPr lang="en-GB" dirty="0" smtClean="0"/>
+              <a:rPr lang="en-GB" dirty="0"/>
               <a:t>Requirement and Design Summary</a:t>
             </a:r>
-            <a:endParaRPr lang="en-GB" dirty="0"/>
           </a:p>
         </p:txBody>
       </p:sp>
@@ -15730,18 +15643,11 @@
               <a:buNone/>
             </a:pPr>
             <a:r>
-              <a:rPr lang="en-GB" sz="2400" dirty="0" smtClean="0">
-                <a:latin typeface="Times New Roman" panose="02020603050405020304" pitchFamily="18" charset="0"/>
-                <a:cs typeface="Times New Roman" panose="02020603050405020304" pitchFamily="18" charset="0"/>
-              </a:rPr>
-              <a:t>             In </a:t>
-            </a:r>
-            <a:r>
               <a:rPr lang="en-GB" sz="2400" dirty="0">
                 <a:latin typeface="Times New Roman" panose="02020603050405020304" pitchFamily="18" charset="0"/>
                 <a:cs typeface="Times New Roman" panose="02020603050405020304" pitchFamily="18" charset="0"/>
               </a:rPr>
-              <a:t>our system the user have </a:t>
+              <a:t>             In our system the user have </a:t>
             </a:r>
             <a:r>
               <a:rPr lang="en-GB" sz="2400" b="1" dirty="0">
@@ -15770,14 +15676,7 @@
                 <a:latin typeface="Times New Roman" panose="02020603050405020304" pitchFamily="18" charset="0"/>
                 <a:cs typeface="Times New Roman" panose="02020603050405020304" pitchFamily="18" charset="0"/>
               </a:rPr>
-              <a:t>Admin Functional </a:t>
-            </a:r>
-            <a:r>
-              <a:rPr lang="en-GB" sz="2400" b="1" u="sng" dirty="0" smtClean="0">
-                <a:latin typeface="Times New Roman" panose="02020603050405020304" pitchFamily="18" charset="0"/>
-                <a:cs typeface="Times New Roman" panose="02020603050405020304" pitchFamily="18" charset="0"/>
-              </a:rPr>
-              <a:t>requirement:</a:t>
+              <a:t>Admin Functional requirement:</a:t>
             </a:r>
           </a:p>
           <a:p>
@@ -15785,18 +15684,11 @@
               <a:buNone/>
             </a:pPr>
             <a:r>
-              <a:rPr lang="en-GB" sz="2400" dirty="0" smtClean="0">
-                <a:latin typeface="Times New Roman" panose="02020603050405020304" pitchFamily="18" charset="0"/>
-                <a:cs typeface="Times New Roman" panose="02020603050405020304" pitchFamily="18" charset="0"/>
-              </a:rPr>
-              <a:t>              In </a:t>
-            </a:r>
-            <a:r>
               <a:rPr lang="en-GB" sz="2400" dirty="0">
                 <a:latin typeface="Times New Roman" panose="02020603050405020304" pitchFamily="18" charset="0"/>
                 <a:cs typeface="Times New Roman" panose="02020603050405020304" pitchFamily="18" charset="0"/>
               </a:rPr>
-              <a:t>our system the user have </a:t>
+              <a:t>              In our system the user have </a:t>
             </a:r>
             <a:r>
               <a:rPr lang="en-GB" sz="2400" b="1" dirty="0">
@@ -15977,26 +15869,15 @@
                 <a:latin typeface="Times New Roman" panose="02020603050405020304" pitchFamily="18" charset="0"/>
                 <a:cs typeface="Times New Roman" panose="02020603050405020304" pitchFamily="18" charset="0"/>
               </a:rPr>
-              <a:t>Methodology </a:t>
-            </a:r>
-            <a:r>
-              <a:rPr lang="en-GB" sz="2400" dirty="0" smtClean="0">
-                <a:latin typeface="Times New Roman" panose="02020603050405020304" pitchFamily="18" charset="0"/>
-                <a:cs typeface="Times New Roman" panose="02020603050405020304" pitchFamily="18" charset="0"/>
-              </a:rPr>
-              <a:t>Diagram</a:t>
-            </a:r>
-            <a:endParaRPr lang="en-GB" sz="2400" dirty="0">
-              <a:latin typeface="Times New Roman" panose="02020603050405020304" pitchFamily="18" charset="0"/>
-              <a:cs typeface="Times New Roman" panose="02020603050405020304" pitchFamily="18" charset="0"/>
-            </a:endParaRPr>
+              <a:t>Methodology Diagram</a:t>
+            </a:r>
           </a:p>
           <a:p>
             <a:pPr marL="342900">
               <a:buAutoNum type="arabicParenR"/>
             </a:pPr>
             <a:r>
-              <a:rPr lang="en-GB" sz="2400" dirty="0" smtClean="0">
+              <a:rPr lang="en-GB" sz="2400" dirty="0">
                 <a:latin typeface="Times New Roman" panose="02020603050405020304" pitchFamily="18" charset="0"/>
                 <a:cs typeface="Times New Roman" panose="02020603050405020304" pitchFamily="18" charset="0"/>
               </a:rPr>
@@ -16008,16 +15889,12 @@
               <a:buAutoNum type="arabicParenR"/>
             </a:pPr>
             <a:r>
-              <a:rPr lang="en-GB" sz="2400" dirty="0" smtClean="0">
+              <a:rPr lang="en-GB" sz="2400" dirty="0">
                 <a:latin typeface="Times New Roman" panose="02020603050405020304" pitchFamily="18" charset="0"/>
                 <a:cs typeface="Times New Roman" panose="02020603050405020304" pitchFamily="18" charset="0"/>
               </a:rPr>
               <a:t>Database schema Diagram</a:t>
             </a:r>
-            <a:endParaRPr lang="en-GB" sz="2400" dirty="0">
-              <a:latin typeface="Times New Roman" panose="02020603050405020304" pitchFamily="18" charset="0"/>
-              <a:cs typeface="Times New Roman" panose="02020603050405020304" pitchFamily="18" charset="0"/>
-            </a:endParaRPr>
           </a:p>
         </p:txBody>
       </p:sp>
@@ -16077,7 +15954,7 @@
           <a:p>
             <a:pPr lvl="0"/>
             <a:r>
-              <a:rPr lang="en-US" dirty="0" smtClean="0"/>
+              <a:rPr lang="en-US" dirty="0"/>
               <a:t>Methodology And Proposed Solution</a:t>
             </a:r>
             <a:endParaRPr dirty="0"/>
@@ -16230,28 +16107,7 @@
                 <a:latin typeface="Times New Roman" panose="02020603050405020304" pitchFamily="18" charset="0"/>
                 <a:cs typeface="Times New Roman" panose="02020603050405020304" pitchFamily="18" charset="0"/>
               </a:rPr>
-              <a:t> </a:t>
-            </a:r>
-            <a:r>
-              <a:rPr lang="en-US" sz="2800" dirty="0">
-                <a:latin typeface="Times New Roman" panose="02020603050405020304" pitchFamily="18" charset="0"/>
-                <a:cs typeface="Times New Roman" panose="02020603050405020304" pitchFamily="18" charset="0"/>
-              </a:rPr>
-              <a:t>A</a:t>
-            </a:r>
-            <a:r>
-              <a:rPr lang="en-US" sz="2800" dirty="0" smtClean="0">
-                <a:latin typeface="Times New Roman" panose="02020603050405020304" pitchFamily="18" charset="0"/>
-                <a:cs typeface="Times New Roman" panose="02020603050405020304" pitchFamily="18" charset="0"/>
-              </a:rPr>
-              <a:t>bideen </a:t>
-            </a:r>
-            <a:r>
-              <a:rPr lang="en-US" sz="2800" dirty="0">
-                <a:latin typeface="Times New Roman" panose="02020603050405020304" pitchFamily="18" charset="0"/>
-                <a:cs typeface="Times New Roman" panose="02020603050405020304" pitchFamily="18" charset="0"/>
-              </a:rPr>
-              <a:t>(35515)</a:t>
+              <a:t> Abideen (35515)</a:t>
             </a:r>
           </a:p>
           <a:p>
@@ -16360,28 +16216,28 @@
       </p:sp>
       <p:pic>
         <p:nvPicPr>
-          <p:cNvPr id="3" name="Picture 2"/>
+          <p:cNvPr id="4" name="Picture 3">
+            <a:extLst>
+              <a:ext uri="{FF2B5EF4-FFF2-40B4-BE49-F238E27FC236}">
+                <a16:creationId xmlns:a16="http://schemas.microsoft.com/office/drawing/2014/main" id="{9A91D876-87F7-FB0F-6A0C-8D6F0D617BD1}"/>
+              </a:ext>
+            </a:extLst>
+          </p:cNvPr>
           <p:cNvPicPr>
             <a:picLocks noChangeAspect="1"/>
           </p:cNvPicPr>
           <p:nvPr/>
         </p:nvPicPr>
         <p:blipFill>
-          <a:blip r:embed="rId3">
-            <a:extLst>
-              <a:ext uri="{28A0092B-C50C-407E-A947-70E740481C1C}">
-                <a14:useLocalDpi xmlns:a14="http://schemas.microsoft.com/office/drawing/2010/main" val="0"/>
-              </a:ext>
-            </a:extLst>
-          </a:blip>
+          <a:blip r:embed="rId3"/>
           <a:stretch>
             <a:fillRect/>
           </a:stretch>
         </p:blipFill>
         <p:spPr>
           <a:xfrm>
-            <a:off x="806116" y="1207681"/>
-            <a:ext cx="7880684" cy="4435442"/>
+            <a:off x="582385" y="1417638"/>
+            <a:ext cx="7979229" cy="4489352"/>
           </a:xfrm>
           <a:prstGeom prst="rect">
             <a:avLst/>
@@ -16464,63 +16320,36 @@
           </a:p>
         </p:txBody>
       </p:sp>
-      <p:graphicFrame>
-        <p:nvGraphicFramePr>
-          <p:cNvPr id="2" name="Object 1"/>
-          <p:cNvGraphicFramePr>
-            <a:graphicFrameLocks noChangeAspect="1"/>
-          </p:cNvGraphicFramePr>
-          <p:nvPr>
-            <p:extLst>
-              <p:ext uri="{D42A27DB-BD31-4B8C-83A1-F6EECF244321}">
-                <p14:modId xmlns:p14="http://schemas.microsoft.com/office/powerpoint/2010/main" val="801482356"/>
-              </p:ext>
-            </p:extLst>
-          </p:nvPr>
-        </p:nvGraphicFramePr>
-        <p:xfrm>
-          <a:off x="919214" y="1144248"/>
-          <a:ext cx="7767586" cy="4838559"/>
-        </p:xfrm>
-        <a:graphic>
-          <a:graphicData uri="http://schemas.openxmlformats.org/presentationml/2006/ole">
-            <mc:AlternateContent xmlns:mc="http://schemas.openxmlformats.org/markup-compatibility/2006">
-              <mc:Choice xmlns:v="urn:schemas-microsoft-com:vml" Requires="v">
-                <p:oleObj spid="_x0000_s1030" name="Visio" r:id="rId4" imgW="9702593" imgH="6045015" progId="Visio.Drawing.15">
-                  <p:embed/>
-                </p:oleObj>
-              </mc:Choice>
-              <mc:Fallback>
-                <p:oleObj name="Visio" r:id="rId4" imgW="9702593" imgH="6045015" progId="Visio.Drawing.15">
-                  <p:embed/>
-                  <p:pic>
-                    <p:nvPicPr>
-                      <p:cNvPr id="0" name=""/>
-                      <p:cNvPicPr/>
-                      <p:nvPr/>
-                    </p:nvPicPr>
-                    <p:blipFill>
-                      <a:blip r:embed="rId5"/>
-                      <a:stretch>
-                        <a:fillRect/>
-                      </a:stretch>
-                    </p:blipFill>
-                    <p:spPr>
-                      <a:xfrm>
-                        <a:off x="919214" y="1144248"/>
-                        <a:ext cx="7767586" cy="4838559"/>
-                      </a:xfrm>
-                      <a:prstGeom prst="rect">
-                        <a:avLst/>
-                      </a:prstGeom>
-                    </p:spPr>
-                  </p:pic>
-                </p:oleObj>
-              </mc:Fallback>
-            </mc:AlternateContent>
-          </a:graphicData>
-        </a:graphic>
-      </p:graphicFrame>
+      <p:pic>
+        <p:nvPicPr>
+          <p:cNvPr id="4" name="Picture 3">
+            <a:extLst>
+              <a:ext uri="{FF2B5EF4-FFF2-40B4-BE49-F238E27FC236}">
+                <a16:creationId xmlns:a16="http://schemas.microsoft.com/office/drawing/2014/main" id="{4BD7D776-FCAB-69F7-D312-C713DB65EDD9}"/>
+              </a:ext>
+            </a:extLst>
+          </p:cNvPr>
+          <p:cNvPicPr>
+            <a:picLocks noChangeAspect="1"/>
+          </p:cNvPicPr>
+          <p:nvPr/>
+        </p:nvPicPr>
+        <p:blipFill>
+          <a:blip r:embed="rId3"/>
+          <a:stretch>
+            <a:fillRect/>
+          </a:stretch>
+        </p:blipFill>
+        <p:spPr>
+          <a:xfrm>
+            <a:off x="566057" y="1417639"/>
+            <a:ext cx="8011886" cy="4384448"/>
+          </a:xfrm>
+          <a:prstGeom prst="rect">
+            <a:avLst/>
+          </a:prstGeom>
+        </p:spPr>
+      </p:pic>
     </p:spTree>
   </p:cSld>
   <p:clrMapOvr>
@@ -16562,10 +16391,9 @@
           <a:lstStyle/>
           <a:p>
             <a:r>
-              <a:rPr lang="en-GB" dirty="0" smtClean="0"/>
+              <a:rPr lang="en-GB" dirty="0"/>
               <a:t>Implementation Summary</a:t>
             </a:r>
-            <a:endParaRPr lang="en-GB" dirty="0"/>
           </a:p>
         </p:txBody>
       </p:sp>
@@ -16720,19 +16548,8 @@
                 <a:latin typeface="Times New Roman" panose="02020603050405020304" pitchFamily="18" charset="0"/>
                 <a:cs typeface="Times New Roman" panose="02020603050405020304" pitchFamily="18" charset="0"/>
               </a:rPr>
-              <a:t> (for a responsive and dynamic user interface</a:t>
-            </a:r>
-            <a:r>
-              <a:rPr lang="en-US" sz="2500" dirty="0" smtClean="0">
-                <a:latin typeface="Times New Roman" panose="02020603050405020304" pitchFamily="18" charset="0"/>
-                <a:cs typeface="Times New Roman" panose="02020603050405020304" pitchFamily="18" charset="0"/>
-              </a:rPr>
-              <a:t>).</a:t>
-            </a:r>
-            <a:endParaRPr lang="en-US" sz="2500" dirty="0">
-              <a:latin typeface="Times New Roman" panose="02020603050405020304" pitchFamily="18" charset="0"/>
-              <a:cs typeface="Times New Roman" panose="02020603050405020304" pitchFamily="18" charset="0"/>
-            </a:endParaRPr>
+              <a:t> (for a responsive and dynamic user interface).</a:t>
+            </a:r>
           </a:p>
           <a:p>
             <a:pPr marL="285750" lvl="0" indent="-285750">
@@ -17474,14 +17291,7 @@
                 <a:latin typeface="Times New Roman" panose="02020603050405020304" pitchFamily="18" charset="0"/>
                 <a:cs typeface="Times New Roman" panose="02020603050405020304" pitchFamily="18" charset="0"/>
               </a:rPr>
-              <a:t>Experiments and Results </a:t>
-            </a:r>
-            <a:r>
-              <a:rPr lang="en-US" sz="3200" dirty="0" smtClean="0">
-                <a:latin typeface="Times New Roman" panose="02020603050405020304" pitchFamily="18" charset="0"/>
-                <a:cs typeface="Times New Roman" panose="02020603050405020304" pitchFamily="18" charset="0"/>
-              </a:rPr>
-              <a:t>Summary[1/7]</a:t>
+              <a:t>Experiments and Results Summary[1/7]</a:t>
             </a:r>
             <a:endParaRPr lang="en-PK" sz="3200" dirty="0">
               <a:latin typeface="Times New Roman" panose="02020603050405020304" pitchFamily="18" charset="0"/>
@@ -17515,42 +17325,42 @@
               <a:buNone/>
             </a:pPr>
             <a:r>
-              <a:rPr lang="en-GB" sz="2800" dirty="0" smtClean="0">
+              <a:rPr lang="en-GB" sz="2800" dirty="0">
                 <a:latin typeface="Times New Roman" panose="02020603050405020304" pitchFamily="18" charset="0"/>
                 <a:cs typeface="Times New Roman" panose="02020603050405020304" pitchFamily="18" charset="0"/>
               </a:rPr>
               <a:t>In our proposed model there are three phases: </a:t>
             </a:r>
             <a:r>
-              <a:rPr lang="en-GB" sz="2800" b="1" dirty="0" smtClean="0">
+              <a:rPr lang="en-GB" sz="2800" b="1" dirty="0">
                 <a:latin typeface="Times New Roman" panose="02020603050405020304" pitchFamily="18" charset="0"/>
                 <a:cs typeface="Times New Roman" panose="02020603050405020304" pitchFamily="18" charset="0"/>
               </a:rPr>
               <a:t>Clustering</a:t>
             </a:r>
             <a:r>
-              <a:rPr lang="en-GB" sz="2800" dirty="0" smtClean="0">
+              <a:rPr lang="en-GB" sz="2800" dirty="0">
                 <a:latin typeface="Times New Roman" panose="02020603050405020304" pitchFamily="18" charset="0"/>
                 <a:cs typeface="Times New Roman" panose="02020603050405020304" pitchFamily="18" charset="0"/>
               </a:rPr>
               <a:t>, </a:t>
             </a:r>
             <a:r>
-              <a:rPr lang="en-GB" sz="2800" b="1" dirty="0" smtClean="0">
+              <a:rPr lang="en-GB" sz="2800" b="1" dirty="0">
                 <a:latin typeface="Times New Roman" panose="02020603050405020304" pitchFamily="18" charset="0"/>
                 <a:cs typeface="Times New Roman" panose="02020603050405020304" pitchFamily="18" charset="0"/>
               </a:rPr>
               <a:t>Classification</a:t>
             </a:r>
             <a:r>
-              <a:rPr lang="en-GB" sz="2800" dirty="0" smtClean="0">
+              <a:rPr lang="en-GB" sz="2800" dirty="0">
                 <a:latin typeface="Times New Roman" panose="02020603050405020304" pitchFamily="18" charset="0"/>
                 <a:cs typeface="Times New Roman" panose="02020603050405020304" pitchFamily="18" charset="0"/>
               </a:rPr>
               <a:t> and </a:t>
             </a:r>
             <a:r>
-              <a:rPr lang="en-GB" sz="2800" b="1" dirty="0" smtClean="0">
+              <a:rPr lang="en-GB" sz="2800" b="1" dirty="0">
                 <a:latin typeface="Times New Roman" panose="02020603050405020304" pitchFamily="18" charset="0"/>
                 <a:cs typeface="Times New Roman" panose="02020603050405020304" pitchFamily="18" charset="0"/>
               </a:rPr>
@@ -17561,7 +17371,7 @@
             <a:pPr marL="114300" indent="0">
               <a:buNone/>
             </a:pPr>
-            <a:endParaRPr lang="en-GB" sz="2800" b="1" dirty="0" smtClean="0">
+            <a:endParaRPr lang="en-GB" sz="2800" b="1" dirty="0">
               <a:latin typeface="Times New Roman" panose="02020603050405020304" pitchFamily="18" charset="0"/>
               <a:cs typeface="Times New Roman" panose="02020603050405020304" pitchFamily="18" charset="0"/>
             </a:endParaRPr>
@@ -17572,7 +17382,7 @@
               <a:buAutoNum type="arabicPeriod"/>
             </a:pPr>
             <a:r>
-              <a:rPr lang="en-GB" sz="2800" b="1" dirty="0" smtClean="0">
+              <a:rPr lang="en-GB" sz="2800" b="1" dirty="0">
                 <a:latin typeface="Times New Roman" panose="02020603050405020304" pitchFamily="18" charset="0"/>
                 <a:cs typeface="Times New Roman" panose="02020603050405020304" pitchFamily="18" charset="0"/>
               </a:rPr>
@@ -17585,14 +17395,14 @@
               <a:buChar char="§"/>
             </a:pPr>
             <a:r>
-              <a:rPr lang="en-GB" sz="2400" b="1" dirty="0" smtClean="0">
+              <a:rPr lang="en-GB" sz="2400" b="1" dirty="0">
                 <a:latin typeface="Times New Roman" panose="02020603050405020304" pitchFamily="18" charset="0"/>
                 <a:cs typeface="Times New Roman" panose="02020603050405020304" pitchFamily="18" charset="0"/>
               </a:rPr>
               <a:t> Dataset: </a:t>
             </a:r>
             <a:r>
-              <a:rPr lang="en-GB" sz="2400" dirty="0" smtClean="0">
+              <a:rPr lang="en-GB" sz="2400" dirty="0">
                 <a:latin typeface="Times New Roman" panose="02020603050405020304" pitchFamily="18" charset="0"/>
                 <a:cs typeface="Times New Roman" panose="02020603050405020304" pitchFamily="18" charset="0"/>
               </a:rPr>
@@ -17605,14 +17415,14 @@
               <a:buChar char="§"/>
             </a:pPr>
             <a:r>
-              <a:rPr lang="en-GB" sz="2400" b="1" dirty="0" smtClean="0">
+              <a:rPr lang="en-GB" sz="2400" b="1" dirty="0">
                 <a:latin typeface="Times New Roman" panose="02020603050405020304" pitchFamily="18" charset="0"/>
                 <a:cs typeface="Times New Roman" panose="02020603050405020304" pitchFamily="18" charset="0"/>
               </a:rPr>
               <a:t>Data Pre-processing: </a:t>
             </a:r>
             <a:r>
-              <a:rPr lang="en-GB" sz="2400" dirty="0" smtClean="0">
+              <a:rPr lang="en-GB" sz="2400" dirty="0">
                 <a:latin typeface="Times New Roman" panose="02020603050405020304" pitchFamily="18" charset="0"/>
                 <a:cs typeface="Times New Roman" panose="02020603050405020304" pitchFamily="18" charset="0"/>
               </a:rPr>
@@ -17689,21 +17499,7 @@
                 <a:latin typeface="Times New Roman" panose="02020603050405020304" pitchFamily="18" charset="0"/>
                 <a:cs typeface="Times New Roman" panose="02020603050405020304" pitchFamily="18" charset="0"/>
               </a:rPr>
-              <a:t>Experiments and Results </a:t>
-            </a:r>
-            <a:r>
-              <a:rPr lang="en-US" sz="3200" dirty="0" smtClean="0">
-                <a:latin typeface="Times New Roman" panose="02020603050405020304" pitchFamily="18" charset="0"/>
-                <a:cs typeface="Times New Roman" panose="02020603050405020304" pitchFamily="18" charset="0"/>
-              </a:rPr>
-              <a:t>Summary[2/7</a:t>
-            </a:r>
-            <a:r>
-              <a:rPr lang="en-US" sz="3200" dirty="0">
-                <a:latin typeface="Times New Roman" panose="02020603050405020304" pitchFamily="18" charset="0"/>
-                <a:cs typeface="Times New Roman" panose="02020603050405020304" pitchFamily="18" charset="0"/>
-              </a:rPr>
-              <a:t>]</a:t>
+              <a:t>Experiments and Results Summary[2/7]</a:t>
             </a:r>
             <a:endParaRPr lang="en-GB" sz="3200" dirty="0"/>
           </a:p>
@@ -17745,31 +17541,17 @@
                 <a:latin typeface="Times New Roman" panose="02020603050405020304" pitchFamily="18" charset="0"/>
                 <a:cs typeface="Times New Roman" panose="02020603050405020304" pitchFamily="18" charset="0"/>
               </a:rPr>
-              <a:t> </a:t>
-            </a:r>
-            <a:r>
-              <a:rPr lang="en-GB" sz="2400" dirty="0" smtClean="0">
-                <a:latin typeface="Times New Roman" panose="02020603050405020304" pitchFamily="18" charset="0"/>
-                <a:cs typeface="Times New Roman" panose="02020603050405020304" pitchFamily="18" charset="0"/>
-              </a:rPr>
-              <a:t>using </a:t>
+              <a:t> using </a:t>
             </a:r>
             <a:r>
               <a:rPr lang="en-GB" sz="2400" b="1" dirty="0">
                 <a:latin typeface="Times New Roman" panose="02020603050405020304" pitchFamily="18" charset="0"/>
                 <a:cs typeface="Times New Roman" panose="02020603050405020304" pitchFamily="18" charset="0"/>
               </a:rPr>
-              <a:t>Elbow </a:t>
-            </a:r>
-            <a:r>
-              <a:rPr lang="en-GB" sz="2400" b="1" dirty="0" smtClean="0">
-                <a:latin typeface="Times New Roman" panose="02020603050405020304" pitchFamily="18" charset="0"/>
-                <a:cs typeface="Times New Roman" panose="02020603050405020304" pitchFamily="18" charset="0"/>
-              </a:rPr>
-              <a:t>Method </a:t>
-            </a:r>
-            <a:r>
-              <a:rPr lang="en-GB" sz="2400" dirty="0" smtClean="0">
+              <a:t>Elbow Method </a:t>
+            </a:r>
+            <a:r>
+              <a:rPr lang="en-GB" sz="2400" dirty="0">
                 <a:latin typeface="Times New Roman" panose="02020603050405020304" pitchFamily="18" charset="0"/>
                 <a:cs typeface="Times New Roman" panose="02020603050405020304" pitchFamily="18" charset="0"/>
               </a:rPr>
@@ -17780,55 +17562,40 @@
                 <a:latin typeface="Times New Roman" panose="02020603050405020304" pitchFamily="18" charset="0"/>
                 <a:cs typeface="Times New Roman" panose="02020603050405020304" pitchFamily="18" charset="0"/>
               </a:rPr>
-              <a:t>Silhouette </a:t>
-            </a:r>
-            <a:r>
-              <a:rPr lang="en-GB" sz="2400" b="1" dirty="0" smtClean="0">
-                <a:latin typeface="Times New Roman" panose="02020603050405020304" pitchFamily="18" charset="0"/>
-                <a:cs typeface="Times New Roman" panose="02020603050405020304" pitchFamily="18" charset="0"/>
-              </a:rPr>
-              <a:t>Score</a:t>
+              <a:t>Silhouette Score</a:t>
             </a:r>
             <a:r>
               <a:rPr lang="en-GB" sz="2400" dirty="0"/>
-              <a:t> </a:t>
-            </a:r>
-            <a:r>
-              <a:rPr lang="en-GB" sz="2400" dirty="0" smtClean="0"/>
-              <a:t>they give result K = 14</a:t>
-            </a:r>
-            <a:endParaRPr lang="en-GB" sz="2400" b="1" dirty="0" smtClean="0">
-              <a:latin typeface="Times New Roman" panose="02020603050405020304" pitchFamily="18" charset="0"/>
-              <a:cs typeface="Times New Roman" panose="02020603050405020304" pitchFamily="18" charset="0"/>
-            </a:endParaRPr>
-          </a:p>
-          <a:p>
-            <a:pPr marL="571500" lvl="1" indent="0">
-              <a:buNone/>
-            </a:pPr>
-            <a:r>
-              <a:rPr lang="en-GB" sz="2400" b="1" dirty="0" smtClean="0">
-                <a:latin typeface="Times New Roman" panose="02020603050405020304" pitchFamily="18" charset="0"/>
-                <a:cs typeface="Times New Roman" panose="02020603050405020304" pitchFamily="18" charset="0"/>
-              </a:rPr>
-              <a:t>            </a:t>
-            </a:r>
-          </a:p>
-          <a:p>
-            <a:pPr marL="571500" lvl="1" indent="0">
-              <a:buNone/>
-            </a:pPr>
-            <a:r>
-              <a:rPr lang="en-GB" sz="2400" b="1" dirty="0" smtClean="0">
-                <a:latin typeface="Times New Roman" panose="02020603050405020304" pitchFamily="18" charset="0"/>
-                <a:cs typeface="Times New Roman" panose="02020603050405020304" pitchFamily="18" charset="0"/>
-              </a:rPr>
-              <a:t>                             </a:t>
+              <a:t> they give result K = 14</a:t>
             </a:r>
             <a:endParaRPr lang="en-GB" sz="2400" b="1" dirty="0">
               <a:latin typeface="Times New Roman" panose="02020603050405020304" pitchFamily="18" charset="0"/>
               <a:cs typeface="Times New Roman" panose="02020603050405020304" pitchFamily="18" charset="0"/>
             </a:endParaRPr>
+          </a:p>
+          <a:p>
+            <a:pPr marL="571500" lvl="1" indent="0">
+              <a:buNone/>
+            </a:pPr>
+            <a:r>
+              <a:rPr lang="en-GB" sz="2400" b="1" dirty="0">
+                <a:latin typeface="Times New Roman" panose="02020603050405020304" pitchFamily="18" charset="0"/>
+                <a:cs typeface="Times New Roman" panose="02020603050405020304" pitchFamily="18" charset="0"/>
+              </a:rPr>
+              <a:t>            </a:t>
+            </a:r>
+          </a:p>
+          <a:p>
+            <a:pPr marL="571500" lvl="1" indent="0">
+              <a:buNone/>
+            </a:pPr>
+            <a:r>
+              <a:rPr lang="en-GB" sz="2400" b="1" dirty="0">
+                <a:latin typeface="Times New Roman" panose="02020603050405020304" pitchFamily="18" charset="0"/>
+                <a:cs typeface="Times New Roman" panose="02020603050405020304" pitchFamily="18" charset="0"/>
+              </a:rPr>
+              <a:t>                             </a:t>
+            </a:r>
           </a:p>
         </p:txBody>
       </p:sp>
@@ -18117,14 +17884,7 @@
                 <a:latin typeface="Times New Roman" panose="02020603050405020304" pitchFamily="18" charset="0"/>
                 <a:cs typeface="Times New Roman" panose="02020603050405020304" pitchFamily="18" charset="0"/>
               </a:rPr>
-              <a:t>Problem </a:t>
-            </a:r>
-            <a:r>
-              <a:rPr lang="en-US" sz="2200" dirty="0" smtClean="0">
-                <a:latin typeface="Times New Roman" panose="02020603050405020304" pitchFamily="18" charset="0"/>
-                <a:cs typeface="Times New Roman" panose="02020603050405020304" pitchFamily="18" charset="0"/>
-              </a:rPr>
-              <a:t>Statement</a:t>
+              <a:t>Problem Statement</a:t>
             </a:r>
             <a:endParaRPr sz="2200" dirty="0">
               <a:latin typeface="Times New Roman" panose="02020603050405020304" pitchFamily="18" charset="0"/>
@@ -18287,14 +18047,7 @@
                 <a:latin typeface="Times New Roman" panose="02020603050405020304" pitchFamily="18" charset="0"/>
                 <a:cs typeface="Times New Roman" panose="02020603050405020304" pitchFamily="18" charset="0"/>
               </a:rPr>
-              <a:t>Testing </a:t>
-            </a:r>
-            <a:r>
-              <a:rPr lang="en-US" sz="2200" dirty="0" smtClean="0">
-                <a:latin typeface="Times New Roman" panose="02020603050405020304" pitchFamily="18" charset="0"/>
-                <a:cs typeface="Times New Roman" panose="02020603050405020304" pitchFamily="18" charset="0"/>
-              </a:rPr>
-              <a:t>Summary</a:t>
+              <a:t>Testing Summary</a:t>
             </a:r>
             <a:endParaRPr sz="2200" dirty="0">
               <a:latin typeface="Times New Roman" panose="02020603050405020304" pitchFamily="18" charset="0"/>
@@ -18348,21 +18101,7 @@
                 <a:latin typeface="Times New Roman" panose="02020603050405020304" pitchFamily="18" charset="0"/>
                 <a:cs typeface="Times New Roman" panose="02020603050405020304" pitchFamily="18" charset="0"/>
               </a:rPr>
-              <a:t>Experiments and Results </a:t>
-            </a:r>
-            <a:r>
-              <a:rPr lang="en-US" sz="3200" dirty="0" smtClean="0">
-                <a:latin typeface="Times New Roman" panose="02020603050405020304" pitchFamily="18" charset="0"/>
-                <a:cs typeface="Times New Roman" panose="02020603050405020304" pitchFamily="18" charset="0"/>
-              </a:rPr>
-              <a:t>Summary[3/7</a:t>
-            </a:r>
-            <a:r>
-              <a:rPr lang="en-US" sz="3200" dirty="0">
-                <a:latin typeface="Times New Roman" panose="02020603050405020304" pitchFamily="18" charset="0"/>
-                <a:cs typeface="Times New Roman" panose="02020603050405020304" pitchFamily="18" charset="0"/>
-              </a:rPr>
-              <a:t>]</a:t>
+              <a:t>Experiments and Results Summary[3/7]</a:t>
             </a:r>
             <a:endParaRPr lang="en-GB" sz="3200" dirty="0"/>
           </a:p>
@@ -18393,37 +18132,33 @@
               <a:buChar char="§"/>
             </a:pPr>
             <a:r>
-              <a:rPr lang="en-GB" sz="2500" b="1" dirty="0" smtClean="0">
+              <a:rPr lang="en-GB" sz="2500" b="1" dirty="0">
                 <a:latin typeface="Times New Roman" panose="02020603050405020304" pitchFamily="18" charset="0"/>
                 <a:cs typeface="Times New Roman" panose="02020603050405020304" pitchFamily="18" charset="0"/>
               </a:rPr>
               <a:t>Model and Result: </a:t>
             </a:r>
             <a:r>
-              <a:rPr lang="en-GB" sz="2500" dirty="0" smtClean="0">
+              <a:rPr lang="en-GB" sz="2500" dirty="0">
                 <a:latin typeface="Times New Roman" panose="02020603050405020304" pitchFamily="18" charset="0"/>
                 <a:cs typeface="Times New Roman" panose="02020603050405020304" pitchFamily="18" charset="0"/>
               </a:rPr>
               <a:t>we use </a:t>
             </a:r>
             <a:r>
-              <a:rPr lang="en-GB" sz="2500" b="1" dirty="0" smtClean="0">
+              <a:rPr lang="en-GB" sz="2500" b="1" dirty="0">
                 <a:latin typeface="Times New Roman" panose="02020603050405020304" pitchFamily="18" charset="0"/>
                 <a:cs typeface="Times New Roman" panose="02020603050405020304" pitchFamily="18" charset="0"/>
               </a:rPr>
               <a:t>k means Clustering</a:t>
             </a:r>
             <a:r>
-              <a:rPr lang="en-GB" sz="2500" dirty="0" smtClean="0">
+              <a:rPr lang="en-GB" sz="2500" dirty="0">
                 <a:latin typeface="Times New Roman" panose="02020603050405020304" pitchFamily="18" charset="0"/>
                 <a:cs typeface="Times New Roman" panose="02020603050405020304" pitchFamily="18" charset="0"/>
               </a:rPr>
               <a:t> algorithm to make the clusters of dataset</a:t>
             </a:r>
-            <a:endParaRPr lang="en-GB" sz="2500" dirty="0">
-              <a:latin typeface="Times New Roman" panose="02020603050405020304" pitchFamily="18" charset="0"/>
-              <a:cs typeface="Times New Roman" panose="02020603050405020304" pitchFamily="18" charset="0"/>
-            </a:endParaRPr>
           </a:p>
         </p:txBody>
       </p:sp>
@@ -18505,21 +18240,7 @@
                 <a:latin typeface="Times New Roman" panose="02020603050405020304" pitchFamily="18" charset="0"/>
                 <a:cs typeface="Times New Roman" panose="02020603050405020304" pitchFamily="18" charset="0"/>
               </a:rPr>
-              <a:t>Experiments and Results </a:t>
-            </a:r>
-            <a:r>
-              <a:rPr lang="en-US" sz="3200" dirty="0" smtClean="0">
-                <a:latin typeface="Times New Roman" panose="02020603050405020304" pitchFamily="18" charset="0"/>
-                <a:cs typeface="Times New Roman" panose="02020603050405020304" pitchFamily="18" charset="0"/>
-              </a:rPr>
-              <a:t>Summary[4/7</a:t>
-            </a:r>
-            <a:r>
-              <a:rPr lang="en-US" sz="3200" dirty="0">
-                <a:latin typeface="Times New Roman" panose="02020603050405020304" pitchFamily="18" charset="0"/>
-                <a:cs typeface="Times New Roman" panose="02020603050405020304" pitchFamily="18" charset="0"/>
-              </a:rPr>
-              <a:t>]</a:t>
+              <a:t>Experiments and Results Summary[4/7]</a:t>
             </a:r>
             <a:endParaRPr lang="en-GB" sz="3200" dirty="0"/>
           </a:p>
@@ -18544,16 +18265,12 @@
               <a:buNone/>
             </a:pPr>
             <a:r>
-              <a:rPr lang="en-GB" b="1" dirty="0" smtClean="0">
+              <a:rPr lang="en-GB" b="1" dirty="0">
                 <a:latin typeface="Times New Roman" panose="02020603050405020304" pitchFamily="18" charset="0"/>
                 <a:cs typeface="Times New Roman" panose="02020603050405020304" pitchFamily="18" charset="0"/>
               </a:rPr>
               <a:t>2. Classification</a:t>
             </a:r>
-            <a:endParaRPr lang="en-GB" b="1" dirty="0">
-              <a:latin typeface="Times New Roman" panose="02020603050405020304" pitchFamily="18" charset="0"/>
-              <a:cs typeface="Times New Roman" panose="02020603050405020304" pitchFamily="18" charset="0"/>
-            </a:endParaRPr>
           </a:p>
           <a:p>
             <a:pPr lvl="1">
@@ -18561,28 +18278,28 @@
               <a:buChar char="§"/>
             </a:pPr>
             <a:r>
-              <a:rPr lang="en-GB" sz="2500" b="1" dirty="0" smtClean="0">
+              <a:rPr lang="en-GB" sz="2500" b="1" dirty="0">
                 <a:latin typeface="Times New Roman" panose="02020603050405020304" pitchFamily="18" charset="0"/>
                 <a:cs typeface="Times New Roman" panose="02020603050405020304" pitchFamily="18" charset="0"/>
               </a:rPr>
               <a:t>Synthetic Dataset: </a:t>
             </a:r>
             <a:r>
-              <a:rPr lang="en-GB" sz="2500" dirty="0" smtClean="0">
+              <a:rPr lang="en-GB" sz="2500" dirty="0">
                 <a:latin typeface="Times New Roman" panose="02020603050405020304" pitchFamily="18" charset="0"/>
                 <a:cs typeface="Times New Roman" panose="02020603050405020304" pitchFamily="18" charset="0"/>
               </a:rPr>
               <a:t>we make a synthetic dataset of 20000 people using </a:t>
             </a:r>
             <a:r>
-              <a:rPr lang="en-GB" sz="2500" b="1" dirty="0" smtClean="0">
+              <a:rPr lang="en-GB" sz="2500" b="1" dirty="0">
                 <a:latin typeface="Times New Roman" panose="02020603050405020304" pitchFamily="18" charset="0"/>
                 <a:cs typeface="Times New Roman" panose="02020603050405020304" pitchFamily="18" charset="0"/>
               </a:rPr>
               <a:t>CTGAN </a:t>
             </a:r>
             <a:r>
-              <a:rPr lang="en-GB" sz="2500" dirty="0" smtClean="0">
+              <a:rPr lang="en-GB" sz="2500" dirty="0">
                 <a:latin typeface="Times New Roman" panose="02020603050405020304" pitchFamily="18" charset="0"/>
                 <a:cs typeface="Times New Roman" panose="02020603050405020304" pitchFamily="18" charset="0"/>
               </a:rPr>
@@ -18593,21 +18310,14 @@
                 <a:latin typeface="Times New Roman" panose="02020603050405020304" pitchFamily="18" charset="0"/>
                 <a:cs typeface="Times New Roman" panose="02020603050405020304" pitchFamily="18" charset="0"/>
               </a:rPr>
-              <a:t>80% for training and 20% for testing</a:t>
-            </a:r>
-            <a:r>
-              <a:rPr lang="en-US" sz="2500" dirty="0" smtClean="0">
-                <a:latin typeface="Times New Roman" panose="02020603050405020304" pitchFamily="18" charset="0"/>
-                <a:cs typeface="Times New Roman" panose="02020603050405020304" pitchFamily="18" charset="0"/>
-              </a:rPr>
-              <a:t>.</a:t>
+              <a:t>80% for training and 20% for testing.</a:t>
             </a:r>
           </a:p>
           <a:p>
             <a:pPr marL="571500" lvl="1" indent="0">
               <a:buNone/>
             </a:pPr>
-            <a:endParaRPr lang="en-US" sz="2500" dirty="0" smtClean="0">
+            <a:endParaRPr lang="en-US" sz="2500" dirty="0">
               <a:latin typeface="Times New Roman" panose="02020603050405020304" pitchFamily="18" charset="0"/>
               <a:cs typeface="Times New Roman" panose="02020603050405020304" pitchFamily="18" charset="0"/>
             </a:endParaRPr>
@@ -18618,62 +18328,127 @@
               <a:buChar char="§"/>
             </a:pPr>
             <a:r>
-              <a:rPr lang="en-US" sz="2500" b="1" dirty="0" smtClean="0">
+              <a:rPr lang="en-US" sz="2500" b="1" dirty="0">
                 <a:latin typeface="Times New Roman" panose="02020603050405020304" pitchFamily="18" charset="0"/>
                 <a:cs typeface="Times New Roman" panose="02020603050405020304" pitchFamily="18" charset="0"/>
               </a:rPr>
               <a:t>Model training and Result: </a:t>
             </a:r>
             <a:r>
-              <a:rPr lang="en-US" sz="2500" dirty="0" smtClean="0">
-                <a:latin typeface="Times New Roman" panose="02020603050405020304" pitchFamily="18" charset="0"/>
-                <a:cs typeface="Times New Roman" panose="02020603050405020304" pitchFamily="18" charset="0"/>
-              </a:rPr>
-              <a:t>We use ensemble technique to ensemble the two models </a:t>
-            </a:r>
-            <a:r>
-              <a:rPr lang="en-US" sz="2500" b="1" dirty="0" smtClean="0">
+              <a:rPr lang="en-US" sz="2500" dirty="0">
+                <a:latin typeface="Times New Roman" panose="02020603050405020304" pitchFamily="18" charset="0"/>
+                <a:cs typeface="Times New Roman" panose="02020603050405020304" pitchFamily="18" charset="0"/>
+              </a:rPr>
+              <a:t>After</a:t>
+            </a:r>
+            <a:r>
+              <a:rPr lang="en-US" sz="2500" b="1" dirty="0">
+                <a:latin typeface="Times New Roman" panose="02020603050405020304" pitchFamily="18" charset="0"/>
+                <a:cs typeface="Times New Roman" panose="02020603050405020304" pitchFamily="18" charset="0"/>
+              </a:rPr>
+              <a:t> Comparative Analysis, </a:t>
+            </a:r>
+            <a:r>
+              <a:rPr lang="en-US" sz="2500" dirty="0">
+                <a:latin typeface="Times New Roman" panose="02020603050405020304" pitchFamily="18" charset="0"/>
+                <a:cs typeface="Times New Roman" panose="02020603050405020304" pitchFamily="18" charset="0"/>
+              </a:rPr>
+              <a:t>we selects two model </a:t>
+            </a:r>
+            <a:r>
+              <a:rPr lang="en-US" sz="2500" b="1" dirty="0">
                 <a:latin typeface="Times New Roman" panose="02020603050405020304" pitchFamily="18" charset="0"/>
                 <a:cs typeface="Times New Roman" panose="02020603050405020304" pitchFamily="18" charset="0"/>
               </a:rPr>
               <a:t>Random forest </a:t>
             </a:r>
             <a:r>
-              <a:rPr lang="en-US" sz="2500" dirty="0" smtClean="0">
+              <a:rPr lang="en-US" sz="2500" dirty="0">
                 <a:latin typeface="Times New Roman" panose="02020603050405020304" pitchFamily="18" charset="0"/>
                 <a:cs typeface="Times New Roman" panose="02020603050405020304" pitchFamily="18" charset="0"/>
               </a:rPr>
               <a:t>and </a:t>
             </a:r>
             <a:r>
-              <a:rPr lang="en-US" sz="2500" b="1" dirty="0" smtClean="0">
-                <a:latin typeface="Times New Roman" panose="02020603050405020304" pitchFamily="18" charset="0"/>
-                <a:cs typeface="Times New Roman" panose="02020603050405020304" pitchFamily="18" charset="0"/>
-              </a:rPr>
-              <a:t>XGBoost </a:t>
-            </a:r>
-            <a:r>
-              <a:rPr lang="en-US" sz="2500" dirty="0" smtClean="0">
-                <a:latin typeface="Times New Roman" panose="02020603050405020304" pitchFamily="18" charset="0"/>
-                <a:cs typeface="Times New Roman" panose="02020603050405020304" pitchFamily="18" charset="0"/>
-              </a:rPr>
-              <a:t>along</a:t>
-            </a:r>
-            <a:r>
-              <a:rPr lang="en-US" sz="2500" b="1" dirty="0" smtClean="0">
+              <a:rPr lang="en-US" sz="2500" b="1" dirty="0" err="1">
+                <a:latin typeface="Times New Roman" panose="02020603050405020304" pitchFamily="18" charset="0"/>
+                <a:cs typeface="Times New Roman" panose="02020603050405020304" pitchFamily="18" charset="0"/>
+              </a:rPr>
+              <a:t>XGBoost</a:t>
+            </a:r>
+            <a:r>
+              <a:rPr lang="en-US" sz="2500" b="1" dirty="0">
                 <a:latin typeface="Times New Roman" panose="02020603050405020304" pitchFamily="18" charset="0"/>
                 <a:cs typeface="Times New Roman" panose="02020603050405020304" pitchFamily="18" charset="0"/>
               </a:rPr>
               <a:t> </a:t>
             </a:r>
             <a:r>
-              <a:rPr lang="en-US" sz="2500" dirty="0" smtClean="0">
-                <a:latin typeface="Times New Roman" panose="02020603050405020304" pitchFamily="18" charset="0"/>
-                <a:cs typeface="Times New Roman" panose="02020603050405020304" pitchFamily="18" charset="0"/>
-              </a:rPr>
-              <a:t>with  meta learner of gradient boosting.</a:t>
-            </a:r>
-            <a:endParaRPr lang="en-GB" sz="2500" dirty="0" smtClean="0">
+              <a:rPr lang="en-US" sz="2500" dirty="0">
+                <a:latin typeface="Times New Roman" panose="02020603050405020304" pitchFamily="18" charset="0"/>
+                <a:cs typeface="Times New Roman" panose="02020603050405020304" pitchFamily="18" charset="0"/>
+              </a:rPr>
+              <a:t>and </a:t>
+            </a:r>
+            <a:r>
+              <a:rPr lang="en-US" sz="2500" b="1" dirty="0">
+                <a:solidFill>
+                  <a:srgbClr val="FF0000"/>
+                </a:solidFill>
+                <a:latin typeface="Times New Roman" panose="02020603050405020304" pitchFamily="18" charset="0"/>
+                <a:cs typeface="Times New Roman" panose="02020603050405020304" pitchFamily="18" charset="0"/>
+              </a:rPr>
+              <a:t>Ensemble</a:t>
+            </a:r>
+            <a:r>
+              <a:rPr lang="en-US" sz="2500" dirty="0">
+                <a:latin typeface="Times New Roman" panose="02020603050405020304" pitchFamily="18" charset="0"/>
+                <a:cs typeface="Times New Roman" panose="02020603050405020304" pitchFamily="18" charset="0"/>
+              </a:rPr>
+              <a:t> them</a:t>
+            </a:r>
+            <a:r>
+              <a:rPr lang="en-US" sz="2500" b="1" dirty="0">
+                <a:latin typeface="Times New Roman" panose="02020603050405020304" pitchFamily="18" charset="0"/>
+                <a:cs typeface="Times New Roman" panose="02020603050405020304" pitchFamily="18" charset="0"/>
+              </a:rPr>
+              <a:t> </a:t>
+            </a:r>
+            <a:r>
+              <a:rPr lang="en-US" sz="2500" dirty="0">
+                <a:latin typeface="Times New Roman" panose="02020603050405020304" pitchFamily="18" charset="0"/>
+                <a:cs typeface="Times New Roman" panose="02020603050405020304" pitchFamily="18" charset="0"/>
+              </a:rPr>
+              <a:t>using  meta learner technique for ensemble on two base models </a:t>
+            </a:r>
+          </a:p>
+          <a:p>
+            <a:pPr lvl="1">
+              <a:buFont typeface="Wingdings" panose="05000000000000000000" pitchFamily="2" charset="2"/>
+              <a:buChar char="§"/>
+            </a:pPr>
+            <a:r>
+              <a:rPr lang="en-US" sz="2500" dirty="0">
+                <a:latin typeface="Times New Roman" panose="02020603050405020304" pitchFamily="18" charset="0"/>
+                <a:cs typeface="Times New Roman" panose="02020603050405020304" pitchFamily="18" charset="0"/>
+              </a:rPr>
+              <a:t>Utilizing </a:t>
+            </a:r>
+            <a:r>
+              <a:rPr lang="en-US" sz="2500" b="1" dirty="0">
+                <a:latin typeface="Times New Roman" panose="02020603050405020304" pitchFamily="18" charset="0"/>
+                <a:cs typeface="Times New Roman" panose="02020603050405020304" pitchFamily="18" charset="0"/>
+              </a:rPr>
+              <a:t>gradient boosting </a:t>
+            </a:r>
+            <a:r>
+              <a:rPr lang="en-US" sz="2500" dirty="0">
+                <a:latin typeface="Times New Roman" panose="02020603050405020304" pitchFamily="18" charset="0"/>
+                <a:cs typeface="Times New Roman" panose="02020603050405020304" pitchFamily="18" charset="0"/>
+              </a:rPr>
+              <a:t>model in mete learner.</a:t>
+            </a:r>
+            <a:endParaRPr lang="en-GB" sz="2500" dirty="0">
               <a:latin typeface="Times New Roman" panose="02020603050405020304" pitchFamily="18" charset="0"/>
               <a:cs typeface="Times New Roman" panose="02020603050405020304" pitchFamily="18" charset="0"/>
             </a:endParaRPr>
@@ -18712,6 +18487,141 @@
       </p:grpSpPr>
       <p:sp>
         <p:nvSpPr>
+          <p:cNvPr id="4" name="Title 1">
+            <a:extLst>
+              <a:ext uri="{FF2B5EF4-FFF2-40B4-BE49-F238E27FC236}">
+                <a16:creationId xmlns:a16="http://schemas.microsoft.com/office/drawing/2014/main" id="{0EB01CA0-41D4-6639-BF70-930856AAEF8A}"/>
+              </a:ext>
+            </a:extLst>
+          </p:cNvPr>
+          <p:cNvSpPr>
+            <a:spLocks noGrp="1"/>
+          </p:cNvSpPr>
+          <p:nvPr>
+            <p:ph type="title"/>
+          </p:nvPr>
+        </p:nvSpPr>
+        <p:spPr>
+          <a:xfrm>
+            <a:off x="457200" y="274638"/>
+            <a:ext cx="8229600" cy="1143000"/>
+          </a:xfrm>
+        </p:spPr>
+        <p:txBody>
+          <a:bodyPr/>
+          <a:lstStyle/>
+          <a:p>
+            <a:r>
+              <a:rPr lang="en-US" sz="3200" dirty="0">
+                <a:latin typeface="Times New Roman" panose="02020603050405020304" pitchFamily="18" charset="0"/>
+                <a:cs typeface="Times New Roman" panose="02020603050405020304" pitchFamily="18" charset="0"/>
+              </a:rPr>
+              <a:t>Experiments and Results Summary[5/8]</a:t>
+            </a:r>
+            <a:endParaRPr lang="en-GB" sz="3200" dirty="0"/>
+          </a:p>
+        </p:txBody>
+      </p:sp>
+      <p:pic>
+        <p:nvPicPr>
+          <p:cNvPr id="5" name="Picture 4">
+            <a:extLst>
+              <a:ext uri="{FF2B5EF4-FFF2-40B4-BE49-F238E27FC236}">
+                <a16:creationId xmlns:a16="http://schemas.microsoft.com/office/drawing/2014/main" id="{3993B955-E35F-AAE0-07F1-94048F5F51C2}"/>
+              </a:ext>
+            </a:extLst>
+          </p:cNvPr>
+          <p:cNvPicPr>
+            <a:picLocks noChangeAspect="1"/>
+          </p:cNvPicPr>
+          <p:nvPr/>
+        </p:nvPicPr>
+        <p:blipFill>
+          <a:blip r:embed="rId2"/>
+          <a:stretch>
+            <a:fillRect/>
+          </a:stretch>
+        </p:blipFill>
+        <p:spPr>
+          <a:xfrm>
+            <a:off x="1240971" y="1940858"/>
+            <a:ext cx="7293428" cy="3872113"/>
+          </a:xfrm>
+          <a:prstGeom prst="rect">
+            <a:avLst/>
+          </a:prstGeom>
+        </p:spPr>
+      </p:pic>
+      <p:sp>
+        <p:nvSpPr>
+          <p:cNvPr id="6" name="TextBox 5">
+            <a:extLst>
+              <a:ext uri="{FF2B5EF4-FFF2-40B4-BE49-F238E27FC236}">
+                <a16:creationId xmlns:a16="http://schemas.microsoft.com/office/drawing/2014/main" id="{04F78C1A-1380-E6D1-3D94-C1CD6863E5A8}"/>
+              </a:ext>
+            </a:extLst>
+          </p:cNvPr>
+          <p:cNvSpPr txBox="1"/>
+          <p:nvPr/>
+        </p:nvSpPr>
+        <p:spPr>
+          <a:xfrm>
+            <a:off x="925286" y="1417638"/>
+            <a:ext cx="5377543" cy="523220"/>
+          </a:xfrm>
+          <a:prstGeom prst="rect">
+            <a:avLst/>
+          </a:prstGeom>
+          <a:noFill/>
+        </p:spPr>
+        <p:txBody>
+          <a:bodyPr wrap="square" rtlCol="0">
+            <a:spAutoFit/>
+          </a:bodyPr>
+          <a:lstStyle/>
+          <a:p>
+            <a:r>
+              <a:rPr lang="en-US" sz="2800" b="1" dirty="0">
+                <a:latin typeface="Times New Roman" panose="02020603050405020304" pitchFamily="18" charset="0"/>
+                <a:cs typeface="Times New Roman" panose="02020603050405020304" pitchFamily="18" charset="0"/>
+              </a:rPr>
+              <a:t>Comparative Analysis</a:t>
+            </a:r>
+          </a:p>
+        </p:txBody>
+      </p:sp>
+    </p:spTree>
+    <p:extLst>
+      <p:ext uri="{BB962C8B-B14F-4D97-AF65-F5344CB8AC3E}">
+        <p14:creationId xmlns:p14="http://schemas.microsoft.com/office/powerpoint/2010/main" val="2874184697"/>
+      </p:ext>
+    </p:extLst>
+  </p:cSld>
+  <p:clrMapOvr>
+    <a:masterClrMapping/>
+  </p:clrMapOvr>
+</p:sld>
+</file>
+
+<file path=ppt/slides/slide33.xml><?xml version="1.0" encoding="utf-8"?>
+<p:sld xmlns:a="http://schemas.openxmlformats.org/drawingml/2006/main" xmlns:r="http://schemas.openxmlformats.org/officeDocument/2006/relationships" xmlns:p="http://schemas.openxmlformats.org/presentationml/2006/main">
+  <p:cSld>
+    <p:spTree>
+      <p:nvGrpSpPr>
+        <p:cNvPr id="1" name=""/>
+        <p:cNvGrpSpPr/>
+        <p:nvPr/>
+      </p:nvGrpSpPr>
+      <p:grpSpPr>
+        <a:xfrm>
+          <a:off x="0" y="0"/>
+          <a:ext cx="0" cy="0"/>
+          <a:chOff x="0" y="0"/>
+          <a:chExt cx="0" cy="0"/>
+        </a:xfrm>
+      </p:grpSpPr>
+      <p:sp>
+        <p:nvSpPr>
           <p:cNvPr id="2" name="Title 1"/>
           <p:cNvSpPr>
             <a:spLocks noGrp="1"/>
@@ -18730,21 +18640,7 @@
                 <a:latin typeface="Times New Roman" panose="02020603050405020304" pitchFamily="18" charset="0"/>
                 <a:cs typeface="Times New Roman" panose="02020603050405020304" pitchFamily="18" charset="0"/>
               </a:rPr>
-              <a:t>Experiments and Results </a:t>
-            </a:r>
-            <a:r>
-              <a:rPr lang="en-US" sz="3200" dirty="0" smtClean="0">
-                <a:latin typeface="Times New Roman" panose="02020603050405020304" pitchFamily="18" charset="0"/>
-                <a:cs typeface="Times New Roman" panose="02020603050405020304" pitchFamily="18" charset="0"/>
-              </a:rPr>
-              <a:t>Summary[5/7</a:t>
-            </a:r>
-            <a:r>
-              <a:rPr lang="en-US" sz="3200" dirty="0">
-                <a:latin typeface="Times New Roman" panose="02020603050405020304" pitchFamily="18" charset="0"/>
-                <a:cs typeface="Times New Roman" panose="02020603050405020304" pitchFamily="18" charset="0"/>
-              </a:rPr>
-              <a:t>]</a:t>
+              <a:t>Experiments and Results Summary[5/7]</a:t>
             </a:r>
             <a:endParaRPr lang="en-GB" sz="3200" dirty="0"/>
           </a:p>
@@ -18775,10 +18671,9 @@
               <a:buChar char="§"/>
             </a:pPr>
             <a:r>
-              <a:rPr lang="en-GB" dirty="0" smtClean="0"/>
+              <a:rPr lang="en-GB" dirty="0"/>
               <a:t>Result:</a:t>
             </a:r>
-            <a:endParaRPr lang="en-GB" dirty="0"/>
           </a:p>
         </p:txBody>
       </p:sp>
@@ -18823,252 +18718,6 @@
 </p:sld>
 </file>
 
-<file path=ppt/slides/slide33.xml><?xml version="1.0" encoding="utf-8"?>
-<p:sld xmlns:a="http://schemas.openxmlformats.org/drawingml/2006/main" xmlns:r="http://schemas.openxmlformats.org/officeDocument/2006/relationships" xmlns:p="http://schemas.openxmlformats.org/presentationml/2006/main">
-  <p:cSld>
-    <p:spTree>
-      <p:nvGrpSpPr>
-        <p:cNvPr id="1" name=""/>
-        <p:cNvGrpSpPr/>
-        <p:nvPr/>
-      </p:nvGrpSpPr>
-      <p:grpSpPr>
-        <a:xfrm>
-          <a:off x="0" y="0"/>
-          <a:ext cx="0" cy="0"/>
-          <a:chOff x="0" y="0"/>
-          <a:chExt cx="0" cy="0"/>
-        </a:xfrm>
-      </p:grpSpPr>
-      <p:sp>
-        <p:nvSpPr>
-          <p:cNvPr id="2" name="Title 1"/>
-          <p:cNvSpPr>
-            <a:spLocks noGrp="1"/>
-          </p:cNvSpPr>
-          <p:nvPr>
-            <p:ph type="title"/>
-          </p:nvPr>
-        </p:nvSpPr>
-        <p:spPr/>
-        <p:txBody>
-          <a:bodyPr/>
-          <a:lstStyle/>
-          <a:p>
-            <a:r>
-              <a:rPr lang="en-US" sz="3200" dirty="0">
-                <a:latin typeface="Times New Roman" panose="02020603050405020304" pitchFamily="18" charset="0"/>
-                <a:cs typeface="Times New Roman" panose="02020603050405020304" pitchFamily="18" charset="0"/>
-              </a:rPr>
-              <a:t>Experiments and Results </a:t>
-            </a:r>
-            <a:r>
-              <a:rPr lang="en-US" sz="3200" dirty="0" smtClean="0">
-                <a:latin typeface="Times New Roman" panose="02020603050405020304" pitchFamily="18" charset="0"/>
-                <a:cs typeface="Times New Roman" panose="02020603050405020304" pitchFamily="18" charset="0"/>
-              </a:rPr>
-              <a:t>Summary[6/7</a:t>
-            </a:r>
-            <a:r>
-              <a:rPr lang="en-US" sz="3200" dirty="0">
-                <a:latin typeface="Times New Roman" panose="02020603050405020304" pitchFamily="18" charset="0"/>
-                <a:cs typeface="Times New Roman" panose="02020603050405020304" pitchFamily="18" charset="0"/>
-              </a:rPr>
-              <a:t>]</a:t>
-            </a:r>
-            <a:endParaRPr lang="en-GB" sz="3200" dirty="0"/>
-          </a:p>
-        </p:txBody>
-      </p:sp>
-      <p:sp>
-        <p:nvSpPr>
-          <p:cNvPr id="3" name="Text Placeholder 2"/>
-          <p:cNvSpPr>
-            <a:spLocks noGrp="1"/>
-          </p:cNvSpPr>
-          <p:nvPr>
-            <p:ph type="body" idx="1"/>
-          </p:nvPr>
-        </p:nvSpPr>
-        <p:spPr/>
-        <p:txBody>
-          <a:bodyPr/>
-          <a:lstStyle/>
-          <a:p>
-            <a:pPr marL="114300" indent="0">
-              <a:buNone/>
-            </a:pPr>
-            <a:r>
-              <a:rPr lang="en-GB" b="1" dirty="0" smtClean="0"/>
-              <a:t>3</a:t>
-            </a:r>
-            <a:r>
-              <a:rPr lang="en-GB" b="1" dirty="0" smtClean="0">
-                <a:latin typeface="Times New Roman" panose="02020603050405020304" pitchFamily="18" charset="0"/>
-                <a:cs typeface="Times New Roman" panose="02020603050405020304" pitchFamily="18" charset="0"/>
-              </a:rPr>
-              <a:t>. Regression</a:t>
-            </a:r>
-          </a:p>
-          <a:p>
-            <a:pPr lvl="2">
-              <a:buFont typeface="Wingdings" panose="05000000000000000000" pitchFamily="2" charset="2"/>
-              <a:buChar char="§"/>
-            </a:pPr>
-            <a:r>
-              <a:rPr lang="en-GB" sz="2500" b="1" dirty="0" smtClean="0">
-                <a:latin typeface="Times New Roman" panose="02020603050405020304" pitchFamily="18" charset="0"/>
-                <a:cs typeface="Times New Roman" panose="02020603050405020304" pitchFamily="18" charset="0"/>
-              </a:rPr>
-              <a:t>Dataset: </a:t>
-            </a:r>
-            <a:r>
-              <a:rPr lang="en-GB" sz="2500" dirty="0" smtClean="0">
-                <a:latin typeface="Times New Roman" panose="02020603050405020304" pitchFamily="18" charset="0"/>
-                <a:cs typeface="Times New Roman" panose="02020603050405020304" pitchFamily="18" charset="0"/>
-              </a:rPr>
-              <a:t>We use food nutrition data such as protein, carbohydrates, fats and calories etc. and split dataset </a:t>
-            </a:r>
-            <a:r>
-              <a:rPr lang="en-US" sz="2500" dirty="0">
-                <a:latin typeface="Times New Roman" panose="02020603050405020304" pitchFamily="18" charset="0"/>
-                <a:cs typeface="Times New Roman" panose="02020603050405020304" pitchFamily="18" charset="0"/>
-              </a:rPr>
-              <a:t> training 80% and testing 20</a:t>
-            </a:r>
-            <a:r>
-              <a:rPr lang="en-US" sz="2500" dirty="0" smtClean="0">
-                <a:latin typeface="Times New Roman" panose="02020603050405020304" pitchFamily="18" charset="0"/>
-                <a:cs typeface="Times New Roman" panose="02020603050405020304" pitchFamily="18" charset="0"/>
-              </a:rPr>
-              <a:t>%.</a:t>
-            </a:r>
-          </a:p>
-          <a:p>
-            <a:pPr marL="1028700" lvl="2" indent="0">
-              <a:buNone/>
-            </a:pPr>
-            <a:endParaRPr lang="en-US" sz="2500" dirty="0" smtClean="0">
-              <a:latin typeface="Times New Roman" panose="02020603050405020304" pitchFamily="18" charset="0"/>
-              <a:cs typeface="Times New Roman" panose="02020603050405020304" pitchFamily="18" charset="0"/>
-            </a:endParaRPr>
-          </a:p>
-          <a:p>
-            <a:pPr lvl="2">
-              <a:buFont typeface="Wingdings" panose="05000000000000000000" pitchFamily="2" charset="2"/>
-              <a:buChar char="§"/>
-            </a:pPr>
-            <a:r>
-              <a:rPr lang="en-US" sz="2500" b="1" dirty="0" smtClean="0">
-                <a:latin typeface="Times New Roman" panose="02020603050405020304" pitchFamily="18" charset="0"/>
-                <a:cs typeface="Times New Roman" panose="02020603050405020304" pitchFamily="18" charset="0"/>
-              </a:rPr>
-              <a:t>Model Training and Result: </a:t>
-            </a:r>
-            <a:r>
-              <a:rPr lang="en-US" sz="2500" dirty="0" smtClean="0">
-                <a:latin typeface="Times New Roman" panose="02020603050405020304" pitchFamily="18" charset="0"/>
-                <a:cs typeface="Times New Roman" panose="02020603050405020304" pitchFamily="18" charset="0"/>
-              </a:rPr>
-              <a:t>We use Ensemble technique to Ensemble </a:t>
-            </a:r>
-            <a:r>
-              <a:rPr lang="en-US" sz="2500" b="1" dirty="0" smtClean="0">
-                <a:latin typeface="Times New Roman" panose="02020603050405020304" pitchFamily="18" charset="0"/>
-                <a:cs typeface="Times New Roman" panose="02020603050405020304" pitchFamily="18" charset="0"/>
-              </a:rPr>
-              <a:t>HGB</a:t>
-            </a:r>
-            <a:r>
-              <a:rPr lang="en-US" sz="2500" dirty="0" smtClean="0">
-                <a:latin typeface="Times New Roman" panose="02020603050405020304" pitchFamily="18" charset="0"/>
-                <a:cs typeface="Times New Roman" panose="02020603050405020304" pitchFamily="18" charset="0"/>
-              </a:rPr>
-              <a:t> and </a:t>
-            </a:r>
-            <a:r>
-              <a:rPr lang="en-US" sz="2500" b="1" dirty="0" smtClean="0">
-                <a:latin typeface="Times New Roman" panose="02020603050405020304" pitchFamily="18" charset="0"/>
-                <a:cs typeface="Times New Roman" panose="02020603050405020304" pitchFamily="18" charset="0"/>
-              </a:rPr>
-              <a:t>Ridge</a:t>
-            </a:r>
-            <a:r>
-              <a:rPr lang="en-US" sz="2500" dirty="0" smtClean="0">
-                <a:latin typeface="Times New Roman" panose="02020603050405020304" pitchFamily="18" charset="0"/>
-                <a:cs typeface="Times New Roman" panose="02020603050405020304" pitchFamily="18" charset="0"/>
-              </a:rPr>
-              <a:t> </a:t>
-            </a:r>
-            <a:r>
-              <a:rPr lang="en-US" sz="2500" b="1" dirty="0" smtClean="0">
-                <a:latin typeface="Times New Roman" panose="02020603050405020304" pitchFamily="18" charset="0"/>
-                <a:cs typeface="Times New Roman" panose="02020603050405020304" pitchFamily="18" charset="0"/>
-              </a:rPr>
-              <a:t>regression </a:t>
-            </a:r>
-            <a:r>
-              <a:rPr lang="en-US" sz="2500" dirty="0" smtClean="0">
-                <a:latin typeface="Times New Roman" panose="02020603050405020304" pitchFamily="18" charset="0"/>
-                <a:cs typeface="Times New Roman" panose="02020603050405020304" pitchFamily="18" charset="0"/>
-              </a:rPr>
-              <a:t>model with polynomial features.</a:t>
-            </a:r>
-            <a:endParaRPr lang="en-GB" sz="2500" dirty="0" smtClean="0">
-              <a:latin typeface="Times New Roman" panose="02020603050405020304" pitchFamily="18" charset="0"/>
-              <a:cs typeface="Times New Roman" panose="02020603050405020304" pitchFamily="18" charset="0"/>
-            </a:endParaRPr>
-          </a:p>
-          <a:p>
-            <a:pPr marL="3771900" lvl="8" indent="0">
-              <a:buNone/>
-            </a:pPr>
-            <a:endParaRPr lang="en-GB" dirty="0"/>
-          </a:p>
-          <a:p>
-            <a:pPr marL="114300" indent="0">
-              <a:buNone/>
-            </a:pPr>
-            <a:endParaRPr lang="en-GB" dirty="0">
-              <a:latin typeface="Times New Roman" panose="02020603050405020304" pitchFamily="18" charset="0"/>
-              <a:cs typeface="Times New Roman" panose="02020603050405020304" pitchFamily="18" charset="0"/>
-            </a:endParaRPr>
-          </a:p>
-          <a:p>
-            <a:pPr marL="114300" indent="0">
-              <a:buNone/>
-            </a:pPr>
-            <a:endParaRPr lang="en-GB" dirty="0" smtClean="0"/>
-          </a:p>
-          <a:p>
-            <a:pPr marL="114300" indent="0">
-              <a:buNone/>
-            </a:pPr>
-            <a:r>
-              <a:rPr lang="en-GB" dirty="0"/>
-              <a:t> </a:t>
-            </a:r>
-            <a:r>
-              <a:rPr lang="en-GB" dirty="0" smtClean="0"/>
-              <a:t>     </a:t>
-            </a:r>
-            <a:endParaRPr lang="en-GB" dirty="0"/>
-          </a:p>
-        </p:txBody>
-      </p:sp>
-    </p:spTree>
-    <p:extLst>
-      <p:ext uri="{BB962C8B-B14F-4D97-AF65-F5344CB8AC3E}">
-        <p14:creationId xmlns:p14="http://schemas.microsoft.com/office/powerpoint/2010/main" val="3093201424"/>
-      </p:ext>
-    </p:extLst>
-  </p:cSld>
-  <p:clrMapOvr>
-    <a:masterClrMapping/>
-  </p:clrMapOvr>
-</p:sld>
-</file>
-
 <file path=ppt/slides/slide34.xml><?xml version="1.0" encoding="utf-8"?>
 <p:sld xmlns:a="http://schemas.openxmlformats.org/drawingml/2006/main" xmlns:r="http://schemas.openxmlformats.org/officeDocument/2006/relationships" xmlns:p="http://schemas.openxmlformats.org/presentationml/2006/main">
   <p:cSld>
@@ -19106,21 +18755,227 @@
                 <a:latin typeface="Times New Roman" panose="02020603050405020304" pitchFamily="18" charset="0"/>
                 <a:cs typeface="Times New Roman" panose="02020603050405020304" pitchFamily="18" charset="0"/>
               </a:rPr>
-              <a:t>Experiments and Results </a:t>
-            </a:r>
-            <a:r>
-              <a:rPr lang="en-US" sz="3200" dirty="0" smtClean="0">
-                <a:latin typeface="Times New Roman" panose="02020603050405020304" pitchFamily="18" charset="0"/>
-                <a:cs typeface="Times New Roman" panose="02020603050405020304" pitchFamily="18" charset="0"/>
-              </a:rPr>
-              <a:t>Summary[7/7</a:t>
-            </a:r>
+              <a:t>Experiments and Results Summary[6/7]</a:t>
+            </a:r>
+            <a:endParaRPr lang="en-GB" sz="3200" dirty="0"/>
+          </a:p>
+        </p:txBody>
+      </p:sp>
+      <p:sp>
+        <p:nvSpPr>
+          <p:cNvPr id="3" name="Text Placeholder 2"/>
+          <p:cNvSpPr>
+            <a:spLocks noGrp="1"/>
+          </p:cNvSpPr>
+          <p:nvPr>
+            <p:ph type="body" idx="1"/>
+          </p:nvPr>
+        </p:nvSpPr>
+        <p:spPr/>
+        <p:txBody>
+          <a:bodyPr/>
+          <a:lstStyle/>
+          <a:p>
+            <a:pPr marL="114300" indent="0">
+              <a:buNone/>
+            </a:pPr>
+            <a:r>
+              <a:rPr lang="en-GB" b="1" dirty="0"/>
+              <a:t>3</a:t>
+            </a:r>
+            <a:r>
+              <a:rPr lang="en-GB" b="1" dirty="0">
+                <a:latin typeface="Times New Roman" panose="02020603050405020304" pitchFamily="18" charset="0"/>
+                <a:cs typeface="Times New Roman" panose="02020603050405020304" pitchFamily="18" charset="0"/>
+              </a:rPr>
+              <a:t>. Regression</a:t>
+            </a:r>
+          </a:p>
+          <a:p>
+            <a:pPr lvl="2">
+              <a:buFont typeface="Wingdings" panose="05000000000000000000" pitchFamily="2" charset="2"/>
+              <a:buChar char="§"/>
+            </a:pPr>
+            <a:r>
+              <a:rPr lang="en-GB" sz="2500" b="1" dirty="0">
+                <a:latin typeface="Times New Roman" panose="02020603050405020304" pitchFamily="18" charset="0"/>
+                <a:cs typeface="Times New Roman" panose="02020603050405020304" pitchFamily="18" charset="0"/>
+              </a:rPr>
+              <a:t>Dataset: </a:t>
+            </a:r>
+            <a:r>
+              <a:rPr lang="en-GB" sz="2500" dirty="0">
+                <a:latin typeface="Times New Roman" panose="02020603050405020304" pitchFamily="18" charset="0"/>
+                <a:cs typeface="Times New Roman" panose="02020603050405020304" pitchFamily="18" charset="0"/>
+              </a:rPr>
+              <a:t>We use food nutrition data such as protein, carbohydrates, fats and calories etc. and split dataset </a:t>
+            </a:r>
+            <a:r>
+              <a:rPr lang="en-US" sz="2500" dirty="0">
+                <a:latin typeface="Times New Roman" panose="02020603050405020304" pitchFamily="18" charset="0"/>
+                <a:cs typeface="Times New Roman" panose="02020603050405020304" pitchFamily="18" charset="0"/>
+              </a:rPr>
+              <a:t> training 80% and testing 20%.</a:t>
+            </a:r>
+          </a:p>
+          <a:p>
+            <a:pPr marL="1028700" lvl="2" indent="0">
+              <a:buNone/>
+            </a:pPr>
+            <a:endParaRPr lang="en-US" sz="2500" dirty="0">
+              <a:latin typeface="Times New Roman" panose="02020603050405020304" pitchFamily="18" charset="0"/>
+              <a:cs typeface="Times New Roman" panose="02020603050405020304" pitchFamily="18" charset="0"/>
+            </a:endParaRPr>
+          </a:p>
+          <a:p>
+            <a:pPr lvl="2">
+              <a:buFont typeface="Wingdings" panose="05000000000000000000" pitchFamily="2" charset="2"/>
+              <a:buChar char="§"/>
+            </a:pPr>
+            <a:r>
+              <a:rPr lang="en-US" sz="2500" b="1" dirty="0">
+                <a:latin typeface="Times New Roman" panose="02020603050405020304" pitchFamily="18" charset="0"/>
+                <a:cs typeface="Times New Roman" panose="02020603050405020304" pitchFamily="18" charset="0"/>
+              </a:rPr>
+              <a:t>Model Training and Result: </a:t>
+            </a:r>
+            <a:r>
+              <a:rPr lang="en-US" sz="2500" dirty="0">
+                <a:latin typeface="Times New Roman" panose="02020603050405020304" pitchFamily="18" charset="0"/>
+                <a:cs typeface="Times New Roman" panose="02020603050405020304" pitchFamily="18" charset="0"/>
+              </a:rPr>
+              <a:t>We use Ensemble technique to Ensemble </a:t>
+            </a:r>
+            <a:r>
+              <a:rPr lang="en-US" sz="2500" b="1" dirty="0">
+                <a:latin typeface="Times New Roman" panose="02020603050405020304" pitchFamily="18" charset="0"/>
+                <a:cs typeface="Times New Roman" panose="02020603050405020304" pitchFamily="18" charset="0"/>
+              </a:rPr>
+              <a:t>HGB</a:t>
+            </a:r>
+            <a:r>
+              <a:rPr lang="en-US" sz="2500" dirty="0">
+                <a:latin typeface="Times New Roman" panose="02020603050405020304" pitchFamily="18" charset="0"/>
+                <a:cs typeface="Times New Roman" panose="02020603050405020304" pitchFamily="18" charset="0"/>
+              </a:rPr>
+              <a:t> and </a:t>
+            </a:r>
+            <a:r>
+              <a:rPr lang="en-US" sz="2500" b="1" dirty="0">
+                <a:latin typeface="Times New Roman" panose="02020603050405020304" pitchFamily="18" charset="0"/>
+                <a:cs typeface="Times New Roman" panose="02020603050405020304" pitchFamily="18" charset="0"/>
+              </a:rPr>
+              <a:t>Ridge</a:t>
+            </a:r>
+            <a:r>
+              <a:rPr lang="en-US" sz="2500" dirty="0">
+                <a:latin typeface="Times New Roman" panose="02020603050405020304" pitchFamily="18" charset="0"/>
+                <a:cs typeface="Times New Roman" panose="02020603050405020304" pitchFamily="18" charset="0"/>
+              </a:rPr>
+              <a:t> </a:t>
+            </a:r>
+            <a:r>
+              <a:rPr lang="en-US" sz="2500" b="1" dirty="0">
+                <a:latin typeface="Times New Roman" panose="02020603050405020304" pitchFamily="18" charset="0"/>
+                <a:cs typeface="Times New Roman" panose="02020603050405020304" pitchFamily="18" charset="0"/>
+              </a:rPr>
+              <a:t>regression </a:t>
+            </a:r>
+            <a:r>
+              <a:rPr lang="en-US" sz="2500" dirty="0">
+                <a:latin typeface="Times New Roman" panose="02020603050405020304" pitchFamily="18" charset="0"/>
+                <a:cs typeface="Times New Roman" panose="02020603050405020304" pitchFamily="18" charset="0"/>
+              </a:rPr>
+              <a:t>model with polynomial features.</a:t>
+            </a:r>
+            <a:endParaRPr lang="en-GB" sz="2500" dirty="0">
+              <a:latin typeface="Times New Roman" panose="02020603050405020304" pitchFamily="18" charset="0"/>
+              <a:cs typeface="Times New Roman" panose="02020603050405020304" pitchFamily="18" charset="0"/>
+            </a:endParaRPr>
+          </a:p>
+          <a:p>
+            <a:pPr marL="3771900" lvl="8" indent="0">
+              <a:buNone/>
+            </a:pPr>
+            <a:endParaRPr lang="en-GB" dirty="0"/>
+          </a:p>
+          <a:p>
+            <a:pPr marL="114300" indent="0">
+              <a:buNone/>
+            </a:pPr>
+            <a:endParaRPr lang="en-GB" dirty="0">
+              <a:latin typeface="Times New Roman" panose="02020603050405020304" pitchFamily="18" charset="0"/>
+              <a:cs typeface="Times New Roman" panose="02020603050405020304" pitchFamily="18" charset="0"/>
+            </a:endParaRPr>
+          </a:p>
+          <a:p>
+            <a:pPr marL="114300" indent="0">
+              <a:buNone/>
+            </a:pPr>
+            <a:endParaRPr lang="en-GB" dirty="0"/>
+          </a:p>
+          <a:p>
+            <a:pPr marL="114300" indent="0">
+              <a:buNone/>
+            </a:pPr>
+            <a:r>
+              <a:rPr lang="en-GB" dirty="0"/>
+              <a:t>      </a:t>
+            </a:r>
+          </a:p>
+        </p:txBody>
+      </p:sp>
+    </p:spTree>
+    <p:extLst>
+      <p:ext uri="{BB962C8B-B14F-4D97-AF65-F5344CB8AC3E}">
+        <p14:creationId xmlns:p14="http://schemas.microsoft.com/office/powerpoint/2010/main" val="3093201424"/>
+      </p:ext>
+    </p:extLst>
+  </p:cSld>
+  <p:clrMapOvr>
+    <a:masterClrMapping/>
+  </p:clrMapOvr>
+</p:sld>
+</file>
+
+<file path=ppt/slides/slide35.xml><?xml version="1.0" encoding="utf-8"?>
+<p:sld xmlns:a="http://schemas.openxmlformats.org/drawingml/2006/main" xmlns:r="http://schemas.openxmlformats.org/officeDocument/2006/relationships" xmlns:p="http://schemas.openxmlformats.org/presentationml/2006/main">
+  <p:cSld>
+    <p:spTree>
+      <p:nvGrpSpPr>
+        <p:cNvPr id="1" name=""/>
+        <p:cNvGrpSpPr/>
+        <p:nvPr/>
+      </p:nvGrpSpPr>
+      <p:grpSpPr>
+        <a:xfrm>
+          <a:off x="0" y="0"/>
+          <a:ext cx="0" cy="0"/>
+          <a:chOff x="0" y="0"/>
+          <a:chExt cx="0" cy="0"/>
+        </a:xfrm>
+      </p:grpSpPr>
+      <p:sp>
+        <p:nvSpPr>
+          <p:cNvPr id="2" name="Title 1"/>
+          <p:cNvSpPr>
+            <a:spLocks noGrp="1"/>
+          </p:cNvSpPr>
+          <p:nvPr>
+            <p:ph type="title"/>
+          </p:nvPr>
+        </p:nvSpPr>
+        <p:spPr/>
+        <p:txBody>
+          <a:bodyPr/>
+          <a:lstStyle/>
+          <a:p>
             <a:r>
               <a:rPr lang="en-US" sz="3200" dirty="0">
                 <a:latin typeface="Times New Roman" panose="02020603050405020304" pitchFamily="18" charset="0"/>
                 <a:cs typeface="Times New Roman" panose="02020603050405020304" pitchFamily="18" charset="0"/>
               </a:rPr>
-              <a:t>]</a:t>
+              <a:t>Experiments and Results Summary[7/7]</a:t>
             </a:r>
             <a:endParaRPr lang="en-GB" sz="3200" dirty="0"/>
           </a:p>
@@ -19151,16 +19006,12 @@
               <a:buChar char="§"/>
             </a:pPr>
             <a:r>
-              <a:rPr lang="en-GB" sz="2500" b="1" dirty="0" smtClean="0">
+              <a:rPr lang="en-GB" sz="2500" b="1" dirty="0">
                 <a:latin typeface="Times New Roman" panose="02020603050405020304" pitchFamily="18" charset="0"/>
                 <a:cs typeface="Times New Roman" panose="02020603050405020304" pitchFamily="18" charset="0"/>
               </a:rPr>
               <a:t>Result</a:t>
             </a:r>
-            <a:endParaRPr lang="en-GB" sz="2500" b="1" dirty="0">
-              <a:latin typeface="Times New Roman" panose="02020603050405020304" pitchFamily="18" charset="0"/>
-              <a:cs typeface="Times New Roman" panose="02020603050405020304" pitchFamily="18" charset="0"/>
-            </a:endParaRPr>
           </a:p>
         </p:txBody>
       </p:sp>
@@ -19727,7 +19578,7 @@
 </p:sld>
 </file>
 
-<file path=ppt/slides/slide35.xml><?xml version="1.0" encoding="utf-8"?>
+<file path=ppt/slides/slide36.xml><?xml version="1.0" encoding="utf-8"?>
 <p:sld xmlns:a="http://schemas.openxmlformats.org/drawingml/2006/main" xmlns:r="http://schemas.openxmlformats.org/officeDocument/2006/relationships" xmlns:p="http://schemas.openxmlformats.org/presentationml/2006/main">
   <p:cSld>
     <p:spTree>
@@ -19760,10 +19611,9 @@
           <a:lstStyle/>
           <a:p>
             <a:r>
-              <a:rPr lang="en-GB" dirty="0" smtClean="0"/>
+              <a:rPr lang="en-GB" dirty="0"/>
               <a:t>Testing Summary</a:t>
             </a:r>
-            <a:endParaRPr lang="en-GB" dirty="0"/>
           </a:p>
         </p:txBody>
       </p:sp>
@@ -19780,7 +19630,7 @@
 </p:sld>
 </file>
 
-<file path=ppt/slides/slide36.xml><?xml version="1.0" encoding="utf-8"?>
+<file path=ppt/slides/slide37.xml><?xml version="1.0" encoding="utf-8"?>
 <p:sld xmlns:a="http://schemas.openxmlformats.org/drawingml/2006/main" xmlns:r="http://schemas.openxmlformats.org/officeDocument/2006/relationships" xmlns:p="http://schemas.openxmlformats.org/presentationml/2006/main">
   <p:cSld>
     <p:spTree>
@@ -19952,18 +19802,13 @@
                     <a:lstStyle/>
                     <a:p>
                       <a:r>
-                        <a:rPr lang="en-GB" dirty="0" smtClean="0">
+                        <a:rPr lang="en-GB" dirty="0">
                           <a:solidFill>
                             <a:schemeClr val="tx1"/>
                           </a:solidFill>
                         </a:rPr>
                         <a:t>Testing  Aspect</a:t>
                       </a:r>
-                      <a:endParaRPr lang="en-GB" dirty="0">
-                        <a:solidFill>
-                          <a:schemeClr val="tx1"/>
-                        </a:solidFill>
-                      </a:endParaRPr>
                     </a:p>
                   </a:txBody>
                   <a:tcPr/>
@@ -19974,18 +19819,13 @@
                     <a:lstStyle/>
                     <a:p>
                       <a:r>
-                        <a:rPr lang="en-GB" dirty="0" smtClean="0">
+                        <a:rPr lang="en-GB" dirty="0">
                           <a:solidFill>
                             <a:schemeClr val="tx1"/>
                           </a:solidFill>
                         </a:rPr>
                         <a:t>Summary</a:t>
                       </a:r>
-                      <a:endParaRPr lang="en-GB" dirty="0">
-                        <a:solidFill>
-                          <a:schemeClr val="tx1"/>
-                        </a:solidFill>
-                      </a:endParaRPr>
                     </a:p>
                   </a:txBody>
                   <a:tcPr/>
@@ -20003,10 +19843,9 @@
                     <a:lstStyle/>
                     <a:p>
                       <a:r>
-                        <a:rPr lang="en-GB" dirty="0" smtClean="0"/>
+                        <a:rPr lang="en-GB" dirty="0"/>
                         <a:t>Approach</a:t>
                       </a:r>
-                      <a:endParaRPr lang="en-GB" dirty="0"/>
                     </a:p>
                   </a:txBody>
                   <a:tcPr/>
@@ -20017,11 +19856,11 @@
                     <a:lstStyle/>
                     <a:p>
                       <a:r>
-                        <a:rPr lang="en-GB" dirty="0" smtClean="0"/>
+                        <a:rPr lang="en-GB" dirty="0"/>
                         <a:t>  Blackbox and</a:t>
                       </a:r>
                       <a:r>
-                        <a:rPr lang="en-GB" baseline="0" dirty="0" smtClean="0"/>
+                        <a:rPr lang="en-GB" baseline="0" dirty="0"/>
                         <a:t> Whitebox</a:t>
                       </a:r>
                       <a:endParaRPr lang="en-GB" dirty="0"/>
@@ -20042,10 +19881,9 @@
                     <a:lstStyle/>
                     <a:p>
                       <a:r>
-                        <a:rPr lang="en-GB" dirty="0" smtClean="0"/>
+                        <a:rPr lang="en-GB" dirty="0"/>
                         <a:t>Purpose</a:t>
                       </a:r>
-                      <a:endParaRPr lang="en-GB" dirty="0"/>
                     </a:p>
                   </a:txBody>
                   <a:tcPr/>
@@ -20056,11 +19894,11 @@
                     <a:lstStyle/>
                     <a:p>
                       <a:r>
-                        <a:rPr lang="en-GB" dirty="0" smtClean="0"/>
+                        <a:rPr lang="en-GB" dirty="0"/>
                         <a:t>To validate the functionalities</a:t>
                       </a:r>
                       <a:r>
-                        <a:rPr lang="en-GB" baseline="0" dirty="0" smtClean="0"/>
+                        <a:rPr lang="en-GB" baseline="0" dirty="0"/>
                         <a:t> of Fitessstan via input and output and by giving different user data.</a:t>
                       </a:r>
                     </a:p>
@@ -20080,11 +19918,11 @@
                     <a:lstStyle/>
                     <a:p>
                       <a:r>
-                        <a:rPr lang="en-GB" dirty="0" smtClean="0"/>
+                        <a:rPr lang="en-GB" dirty="0"/>
                         <a:t>Feature</a:t>
                       </a:r>
                       <a:r>
-                        <a:rPr lang="en-GB" baseline="0" dirty="0" smtClean="0"/>
+                        <a:rPr lang="en-GB" baseline="0" dirty="0"/>
                         <a:t> Tested</a:t>
                       </a:r>
                       <a:endParaRPr lang="en-GB" dirty="0"/>
@@ -20098,35 +19936,35 @@
                     <a:lstStyle/>
                     <a:p>
                       <a:r>
-                        <a:rPr lang="en-GB" dirty="0" smtClean="0"/>
+                        <a:rPr lang="en-GB" dirty="0"/>
                         <a:t>✔ User registration &amp; login</a:t>
                       </a:r>
                       <a:br>
-                        <a:rPr lang="en-GB" dirty="0" smtClean="0"/>
+                        <a:rPr lang="en-GB" dirty="0"/>
                       </a:br>
                       <a:r>
-                        <a:rPr lang="en-GB" dirty="0" smtClean="0"/>
+                        <a:rPr lang="en-GB" dirty="0"/>
                         <a:t>✔ Password recovery &amp; OTP</a:t>
                       </a:r>
                       <a:br>
-                        <a:rPr lang="en-GB" dirty="0" smtClean="0"/>
+                        <a:rPr lang="en-GB" dirty="0"/>
                       </a:br>
                       <a:r>
-                        <a:rPr lang="en-GB" dirty="0" smtClean="0"/>
+                        <a:rPr lang="en-GB" dirty="0"/>
                         <a:t>✔ Input forms</a:t>
                       </a:r>
                       <a:br>
-                        <a:rPr lang="en-GB" dirty="0" smtClean="0"/>
+                        <a:rPr lang="en-GB" dirty="0"/>
                       </a:br>
                       <a:r>
-                        <a:rPr lang="en-GB" dirty="0" smtClean="0"/>
+                        <a:rPr lang="en-GB" dirty="0"/>
                         <a:t>✔ Diet plans</a:t>
                       </a:r>
                       <a:br>
-                        <a:rPr lang="en-GB" dirty="0" smtClean="0"/>
+                        <a:rPr lang="en-GB" dirty="0"/>
                       </a:br>
                       <a:r>
-                        <a:rPr lang="en-GB" dirty="0" smtClean="0"/>
+                        <a:rPr lang="en-GB" dirty="0"/>
                         <a:t>✔ Admin management</a:t>
                       </a:r>
                     </a:p>
@@ -20151,14 +19989,14 @@
                         <a:defRPr/>
                       </a:pPr>
                       <a:r>
-                        <a:rPr lang="en-GB" dirty="0" smtClean="0"/>
+                        <a:rPr lang="en-GB" dirty="0"/>
                         <a:t>✔Model</a:t>
                       </a:r>
                       <a:r>
-                        <a:rPr lang="en-GB" baseline="0" dirty="0" smtClean="0"/>
+                        <a:rPr lang="en-GB" baseline="0" dirty="0"/>
                         <a:t> Testing</a:t>
                       </a:r>
-                      <a:endParaRPr lang="en-GB" dirty="0" smtClean="0"/>
+                      <a:endParaRPr lang="en-GB" dirty="0"/>
                     </a:p>
                   </a:txBody>
                   <a:tcPr/>
@@ -20176,10 +20014,9 @@
                     <a:lstStyle/>
                     <a:p>
                       <a:r>
-                        <a:rPr lang="en-GB" dirty="0" smtClean="0"/>
+                        <a:rPr lang="en-GB" dirty="0"/>
                         <a:t>Result</a:t>
                       </a:r>
-                      <a:endParaRPr lang="en-GB" dirty="0"/>
                     </a:p>
                   </a:txBody>
                   <a:tcPr/>
@@ -20190,24 +20027,23 @@
                     <a:lstStyle/>
                     <a:p>
                       <a:r>
-                        <a:rPr lang="en-GB" dirty="0" smtClean="0"/>
+                        <a:rPr lang="en-GB" dirty="0"/>
                         <a:t>✔ All critical test cases passed successfully</a:t>
                       </a:r>
                       <a:br>
-                        <a:rPr lang="en-GB" dirty="0" smtClean="0"/>
+                        <a:rPr lang="en-GB" dirty="0"/>
                       </a:br>
                       <a:r>
-                        <a:rPr lang="en-GB" dirty="0" smtClean="0"/>
+                        <a:rPr lang="en-GB" dirty="0"/>
                         <a:t>✔ Correct handling of all input types</a:t>
                       </a:r>
                       <a:br>
-                        <a:rPr lang="en-GB" dirty="0" smtClean="0"/>
+                        <a:rPr lang="en-GB" dirty="0"/>
                       </a:br>
                       <a:r>
-                        <a:rPr lang="en-GB" dirty="0" smtClean="0"/>
+                        <a:rPr lang="en-GB" dirty="0"/>
                         <a:t>✔ Confirmed user-friendly experience</a:t>
                       </a:r>
-                      <a:endParaRPr lang="en-GB" dirty="0"/>
                     </a:p>
                   </a:txBody>
                   <a:tcPr/>
@@ -20230,7 +20066,7 @@
 </p:sld>
 </file>
 
-<file path=ppt/slides/slide37.xml><?xml version="1.0" encoding="utf-8"?>
+<file path=ppt/slides/slide38.xml><?xml version="1.0" encoding="utf-8"?>
 <p:sld xmlns:a="http://schemas.openxmlformats.org/drawingml/2006/main" xmlns:r="http://schemas.openxmlformats.org/officeDocument/2006/relationships" xmlns:p="http://schemas.openxmlformats.org/presentationml/2006/main">
   <p:cSld>
     <p:spTree>
@@ -20301,7 +20137,7 @@
 </p:sld>
 </file>
 
-<file path=ppt/slides/slide38.xml><?xml version="1.0" encoding="utf-8"?>
+<file path=ppt/slides/slide39.xml><?xml version="1.0" encoding="utf-8"?>
 <p:sld xmlns:a="http://schemas.openxmlformats.org/drawingml/2006/main" xmlns:r="http://schemas.openxmlformats.org/officeDocument/2006/relationships" xmlns:p="http://schemas.openxmlformats.org/presentationml/2006/main">
   <p:cSld>
     <p:spTree>
@@ -20357,7 +20193,7 @@
               <a:buNone/>
             </a:pPr>
             <a:r>
-              <a:rPr lang="en-US" sz="3200" dirty="0" smtClean="0">
+              <a:rPr lang="en-US" sz="3200" dirty="0">
                 <a:latin typeface="Times New Roman" panose="02020603050405020304" pitchFamily="18" charset="0"/>
                 <a:cs typeface="Times New Roman" panose="02020603050405020304" pitchFamily="18" charset="0"/>
               </a:rPr>
@@ -20382,7 +20218,7 @@
         </p:nvSpPr>
         <p:spPr>
           <a:xfrm>
-            <a:off x="457200" y="1275347"/>
+            <a:off x="457200" y="1090285"/>
             <a:ext cx="8229600" cy="4878565"/>
           </a:xfrm>
           <a:prstGeom prst="rect">
@@ -20406,18 +20242,11 @@
               <a:buSzPts val="3200"/>
             </a:pPr>
             <a:r>
-              <a:rPr lang="en-US" sz="2500" dirty="0" smtClean="0">
-                <a:latin typeface="Times New Roman" panose="02020603050405020304" pitchFamily="18" charset="0"/>
-                <a:cs typeface="Times New Roman" panose="02020603050405020304" pitchFamily="18" charset="0"/>
-              </a:rPr>
-              <a:t>Describe </a:t>
-            </a:r>
-            <a:r>
               <a:rPr lang="en-US" sz="2500" dirty="0">
                 <a:latin typeface="Times New Roman" panose="02020603050405020304" pitchFamily="18" charset="0"/>
                 <a:cs typeface="Times New Roman" panose="02020603050405020304" pitchFamily="18" charset="0"/>
               </a:rPr>
-              <a:t>roles of your team members</a:t>
+              <a:t>Describe roles of your team members</a:t>
             </a:r>
           </a:p>
           <a:p>
@@ -20636,16 +20465,12 @@
               <a:buSzPts val="3200"/>
             </a:pPr>
             <a:r>
-              <a:rPr lang="en-US" sz="1800" dirty="0" smtClean="0">
+              <a:rPr lang="en-US" sz="1800" dirty="0">
                 <a:latin typeface="Times New Roman" panose="02020603050405020304" pitchFamily="18" charset="0"/>
                 <a:cs typeface="Times New Roman" panose="02020603050405020304" pitchFamily="18" charset="0"/>
               </a:rPr>
               <a:t>Documentation</a:t>
             </a:r>
-            <a:endParaRPr lang="en-US" sz="1800" dirty="0">
-              <a:latin typeface="Times New Roman" panose="02020603050405020304" pitchFamily="18" charset="0"/>
-              <a:cs typeface="Times New Roman" panose="02020603050405020304" pitchFamily="18" charset="0"/>
-            </a:endParaRPr>
           </a:p>
           <a:p>
             <a:pPr marL="1117600" lvl="1" indent="-457200">
@@ -20659,14 +20484,7 @@
                 <a:latin typeface="Times New Roman" panose="02020603050405020304" pitchFamily="18" charset="0"/>
                 <a:cs typeface="Times New Roman" panose="02020603050405020304" pitchFamily="18" charset="0"/>
               </a:rPr>
-              <a:t>Gap </a:t>
-            </a:r>
-            <a:r>
-              <a:rPr lang="en-US" sz="1800" dirty="0" smtClean="0">
-                <a:latin typeface="Times New Roman" panose="02020603050405020304" pitchFamily="18" charset="0"/>
-                <a:cs typeface="Times New Roman" panose="02020603050405020304" pitchFamily="18" charset="0"/>
-              </a:rPr>
-              <a:t>Analysis</a:t>
+              <a:t>Gap Analysis</a:t>
             </a:r>
           </a:p>
           <a:p>
@@ -20681,19 +20499,8 @@
                 <a:latin typeface="Times New Roman" panose="02020603050405020304" pitchFamily="18" charset="0"/>
                 <a:cs typeface="Times New Roman" panose="02020603050405020304" pitchFamily="18" charset="0"/>
               </a:rPr>
-              <a:t>Literature </a:t>
-            </a:r>
-            <a:r>
-              <a:rPr lang="en-US" sz="1800" dirty="0" smtClean="0">
-                <a:latin typeface="Times New Roman" panose="02020603050405020304" pitchFamily="18" charset="0"/>
-                <a:cs typeface="Times New Roman" panose="02020603050405020304" pitchFamily="18" charset="0"/>
-              </a:rPr>
-              <a:t>Review</a:t>
-            </a:r>
-            <a:endParaRPr lang="en-US" sz="1800" dirty="0" smtClean="0">
-              <a:latin typeface="Times New Roman" panose="02020603050405020304" pitchFamily="18" charset="0"/>
-              <a:cs typeface="Times New Roman" panose="02020603050405020304" pitchFamily="18" charset="0"/>
-            </a:endParaRPr>
+              <a:t>Literature Review</a:t>
+            </a:r>
           </a:p>
           <a:p>
             <a:pPr marL="1117600" lvl="1" indent="-457200">
@@ -20762,225 +20569,6 @@
         </p:txBody>
       </p:sp>
     </p:spTree>
-  </p:cSld>
-  <p:clrMapOvr>
-    <a:masterClrMapping/>
-  </p:clrMapOvr>
-</p:sld>
-</file>
-
-<file path=ppt/slides/slide39.xml><?xml version="1.0" encoding="utf-8"?>
-<p:sld xmlns:a="http://schemas.openxmlformats.org/drawingml/2006/main" xmlns:r="http://schemas.openxmlformats.org/officeDocument/2006/relationships" xmlns:p="http://schemas.openxmlformats.org/presentationml/2006/main">
-  <p:cSld>
-    <p:spTree>
-      <p:nvGrpSpPr>
-        <p:cNvPr id="1" name=""/>
-        <p:cNvGrpSpPr/>
-        <p:nvPr/>
-      </p:nvGrpSpPr>
-      <p:grpSpPr>
-        <a:xfrm>
-          <a:off x="0" y="0"/>
-          <a:ext cx="0" cy="0"/>
-          <a:chOff x="0" y="0"/>
-          <a:chExt cx="0" cy="0"/>
-        </a:xfrm>
-      </p:grpSpPr>
-      <p:sp>
-        <p:nvSpPr>
-          <p:cNvPr id="2" name="Title 1"/>
-          <p:cNvSpPr>
-            <a:spLocks noGrp="1"/>
-          </p:cNvSpPr>
-          <p:nvPr>
-            <p:ph type="title"/>
-          </p:nvPr>
-        </p:nvSpPr>
-        <p:spPr/>
-        <p:txBody>
-          <a:bodyPr/>
-          <a:lstStyle/>
-          <a:p>
-            <a:r>
-              <a:rPr lang="en-US" dirty="0" smtClean="0">
-                <a:latin typeface="Times New Roman" panose="02020603050405020304" pitchFamily="18" charset="0"/>
-                <a:cs typeface="Times New Roman" panose="02020603050405020304" pitchFamily="18" charset="0"/>
-              </a:rPr>
-              <a:t>Endeavour[2/2</a:t>
-            </a:r>
-            <a:r>
-              <a:rPr lang="en-US" dirty="0">
-                <a:latin typeface="Times New Roman" panose="02020603050405020304" pitchFamily="18" charset="0"/>
-                <a:cs typeface="Times New Roman" panose="02020603050405020304" pitchFamily="18" charset="0"/>
-              </a:rPr>
-              <a:t>]</a:t>
-            </a:r>
-            <a:endParaRPr lang="en-GB" dirty="0"/>
-          </a:p>
-        </p:txBody>
-      </p:sp>
-      <p:sp>
-        <p:nvSpPr>
-          <p:cNvPr id="3" name="Text Placeholder 2"/>
-          <p:cNvSpPr>
-            <a:spLocks noGrp="1"/>
-          </p:cNvSpPr>
-          <p:nvPr>
-            <p:ph type="body" idx="1"/>
-          </p:nvPr>
-        </p:nvSpPr>
-        <p:spPr/>
-        <p:txBody>
-          <a:bodyPr/>
-          <a:lstStyle/>
-          <a:p>
-            <a:pPr marL="114300" indent="0">
-              <a:buNone/>
-            </a:pPr>
-            <a:r>
-              <a:rPr lang="en-US" b="1" dirty="0">
-                <a:sym typeface="+mn-ea"/>
-              </a:rPr>
-              <a:t>Describe your way of working as a team</a:t>
-            </a:r>
-          </a:p>
-          <a:p>
-            <a:r>
-              <a:rPr lang="en-US" sz="2200" b="1" dirty="0">
-                <a:latin typeface="Times New Roman" panose="02020603050405020304" pitchFamily="18" charset="0"/>
-                <a:cs typeface="Times New Roman" panose="02020603050405020304" pitchFamily="18" charset="0"/>
-              </a:rPr>
-              <a:t>Clear Role Assignments: </a:t>
-            </a:r>
-            <a:r>
-              <a:rPr lang="en-US" sz="2200" dirty="0">
-                <a:latin typeface="Times New Roman" panose="02020603050405020304" pitchFamily="18" charset="0"/>
-                <a:cs typeface="Times New Roman" panose="02020603050405020304" pitchFamily="18" charset="0"/>
-              </a:rPr>
-              <a:t>Tasks are assigned based </a:t>
-            </a:r>
-            <a:r>
-              <a:rPr lang="en-US" sz="2200" dirty="0" smtClean="0">
-                <a:latin typeface="Times New Roman" panose="02020603050405020304" pitchFamily="18" charset="0"/>
-                <a:cs typeface="Times New Roman" panose="02020603050405020304" pitchFamily="18" charset="0"/>
-              </a:rPr>
-              <a:t>By </a:t>
-            </a:r>
-            <a:r>
-              <a:rPr lang="en-US" sz="2200" b="1" dirty="0" smtClean="0">
-                <a:latin typeface="Times New Roman" panose="02020603050405020304" pitchFamily="18" charset="0"/>
-                <a:cs typeface="Times New Roman" panose="02020603050405020304" pitchFamily="18" charset="0"/>
-              </a:rPr>
-              <a:t>Team Leader</a:t>
-            </a:r>
-            <a:r>
-              <a:rPr lang="en-US" sz="2200" dirty="0" smtClean="0">
-                <a:latin typeface="Times New Roman" panose="02020603050405020304" pitchFamily="18" charset="0"/>
-                <a:cs typeface="Times New Roman" panose="02020603050405020304" pitchFamily="18" charset="0"/>
-              </a:rPr>
-              <a:t>.</a:t>
-            </a:r>
-            <a:r>
-              <a:rPr lang="en-US" sz="1800" dirty="0">
-                <a:latin typeface="Times New Roman" panose="02020603050405020304" pitchFamily="18" charset="0"/>
-                <a:cs typeface="Times New Roman" panose="02020603050405020304" pitchFamily="18" charset="0"/>
-              </a:rPr>
-              <a:t>						</a:t>
-            </a:r>
-          </a:p>
-          <a:p>
-            <a:r>
-              <a:rPr lang="en-US" sz="2200" b="1" dirty="0">
-                <a:latin typeface="Times New Roman" panose="02020603050405020304" pitchFamily="18" charset="0"/>
-                <a:cs typeface="Times New Roman" panose="02020603050405020304" pitchFamily="18" charset="0"/>
-              </a:rPr>
-              <a:t>Communication:</a:t>
-            </a:r>
-            <a:endParaRPr lang="en-US" sz="2200" dirty="0">
-              <a:latin typeface="Times New Roman" panose="02020603050405020304" pitchFamily="18" charset="0"/>
-              <a:cs typeface="Times New Roman" panose="02020603050405020304" pitchFamily="18" charset="0"/>
-            </a:endParaRPr>
-          </a:p>
-          <a:p>
-            <a:pPr lvl="1"/>
-            <a:r>
-              <a:rPr lang="en-US" sz="2200" dirty="0">
-                <a:latin typeface="Times New Roman" panose="02020603050405020304" pitchFamily="18" charset="0"/>
-                <a:cs typeface="Times New Roman" panose="02020603050405020304" pitchFamily="18" charset="0"/>
-              </a:rPr>
-              <a:t>Held regular meetings to review progress, address challenges, and plan next steps.</a:t>
-            </a:r>
-          </a:p>
-          <a:p>
-            <a:pPr lvl="1"/>
-            <a:r>
-              <a:rPr lang="en-US" sz="2200" dirty="0">
-                <a:latin typeface="Times New Roman" panose="02020603050405020304" pitchFamily="18" charset="0"/>
-                <a:cs typeface="Times New Roman" panose="02020603050405020304" pitchFamily="18" charset="0"/>
-              </a:rPr>
-              <a:t>Leveraged tools like </a:t>
-            </a:r>
-            <a:r>
-              <a:rPr lang="en-US" sz="2200" b="1" dirty="0">
-                <a:latin typeface="Times New Roman" panose="02020603050405020304" pitchFamily="18" charset="0"/>
-                <a:cs typeface="Times New Roman" panose="02020603050405020304" pitchFamily="18" charset="0"/>
-              </a:rPr>
-              <a:t>GitHub for version control </a:t>
-            </a:r>
-            <a:r>
-              <a:rPr lang="en-US" sz="2200" dirty="0">
-                <a:latin typeface="Times New Roman" panose="02020603050405020304" pitchFamily="18" charset="0"/>
-                <a:cs typeface="Times New Roman" panose="02020603050405020304" pitchFamily="18" charset="0"/>
-              </a:rPr>
-              <a:t>and collaborative development</a:t>
-            </a:r>
-            <a:r>
-              <a:rPr lang="en-US" sz="1600" dirty="0"/>
-              <a:t>.</a:t>
-            </a:r>
-          </a:p>
-          <a:p>
-            <a:pPr>
-              <a:buFont typeface="Arial" panose="020B0604020202020204" pitchFamily="34" charset="0"/>
-              <a:buChar char="•"/>
-            </a:pPr>
-            <a:r>
-              <a:rPr lang="en-US" sz="2000" b="1" dirty="0">
-                <a:latin typeface="Times New Roman" panose="02020603050405020304" pitchFamily="18" charset="0"/>
-                <a:cs typeface="Times New Roman" panose="02020603050405020304" pitchFamily="18" charset="0"/>
-              </a:rPr>
-              <a:t>Efficiency Focus:</a:t>
-            </a:r>
-            <a:r>
-              <a:rPr lang="en-US" sz="2000" dirty="0">
-                <a:latin typeface="Times New Roman" panose="02020603050405020304" pitchFamily="18" charset="0"/>
-                <a:cs typeface="Times New Roman" panose="02020603050405020304" pitchFamily="18" charset="0"/>
-              </a:rPr>
-              <a:t> Optimizing processes for real-time results and smooth </a:t>
-            </a:r>
-            <a:r>
-              <a:rPr lang="en-US" sz="2200" dirty="0">
-                <a:latin typeface="Times New Roman" panose="02020603050405020304" pitchFamily="18" charset="0"/>
-                <a:cs typeface="Times New Roman" panose="02020603050405020304" pitchFamily="18" charset="0"/>
-              </a:rPr>
-              <a:t>integration</a:t>
-            </a:r>
-            <a:r>
-              <a:rPr lang="en-US" sz="2000" dirty="0">
-                <a:latin typeface="Times New Roman" panose="02020603050405020304" pitchFamily="18" charset="0"/>
-                <a:cs typeface="Times New Roman" panose="02020603050405020304" pitchFamily="18" charset="0"/>
-              </a:rPr>
-              <a:t>.</a:t>
-            </a:r>
-          </a:p>
-        </p:txBody>
-      </p:sp>
-    </p:spTree>
-    <p:extLst>
-      <p:ext uri="{BB962C8B-B14F-4D97-AF65-F5344CB8AC3E}">
-        <p14:creationId xmlns:p14="http://schemas.microsoft.com/office/powerpoint/2010/main" val="3692856438"/>
-      </p:ext>
-    </p:extLst>
   </p:cSld>
   <p:clrMapOvr>
     <a:masterClrMapping/>
@@ -21078,6 +20666,32 @@
       </p:grpSpPr>
       <p:sp>
         <p:nvSpPr>
+          <p:cNvPr id="2" name="Title 1"/>
+          <p:cNvSpPr>
+            <a:spLocks noGrp="1"/>
+          </p:cNvSpPr>
+          <p:nvPr>
+            <p:ph type="title"/>
+          </p:nvPr>
+        </p:nvSpPr>
+        <p:spPr/>
+        <p:txBody>
+          <a:bodyPr/>
+          <a:lstStyle/>
+          <a:p>
+            <a:r>
+              <a:rPr lang="en-US" dirty="0">
+                <a:latin typeface="Times New Roman" panose="02020603050405020304" pitchFamily="18" charset="0"/>
+                <a:cs typeface="Times New Roman" panose="02020603050405020304" pitchFamily="18" charset="0"/>
+              </a:rPr>
+              <a:t>Endeavour[2/2]</a:t>
+            </a:r>
+            <a:endParaRPr lang="en-GB" dirty="0"/>
+          </a:p>
+        </p:txBody>
+      </p:sp>
+      <p:sp>
+        <p:nvSpPr>
           <p:cNvPr id="3" name="Text Placeholder 2"/>
           <p:cNvSpPr>
             <a:spLocks noGrp="1"/>
@@ -21086,12 +20700,7 @@
             <p:ph type="body" idx="1"/>
           </p:nvPr>
         </p:nvSpPr>
-        <p:spPr>
-          <a:xfrm>
-            <a:off x="529388" y="4018547"/>
-            <a:ext cx="8097253" cy="1265406"/>
-          </a:xfrm>
-        </p:spPr>
+        <p:spPr/>
         <p:txBody>
           <a:bodyPr/>
           <a:lstStyle/>
@@ -21100,23 +20709,166 @@
               <a:buNone/>
             </a:pPr>
             <a:r>
-              <a:rPr lang="en-GB" dirty="0" smtClean="0"/>
-              <a:t>		</a:t>
-            </a:r>
-            <a:r>
-              <a:rPr lang="en-GB" sz="4500" dirty="0" smtClean="0">
-                <a:latin typeface="Times New Roman" panose="02020603050405020304" pitchFamily="18" charset="0"/>
-                <a:cs typeface="Times New Roman" panose="02020603050405020304" pitchFamily="18" charset="0"/>
-              </a:rPr>
-              <a:t>	Thank You</a:t>
-            </a:r>
-            <a:endParaRPr lang="en-GB" sz="4500" dirty="0">
+              <a:rPr lang="en-US" b="1" dirty="0">
+                <a:sym typeface="+mn-ea"/>
+              </a:rPr>
+              <a:t>Describe your way of working as a team</a:t>
+            </a:r>
+          </a:p>
+          <a:p>
+            <a:r>
+              <a:rPr lang="en-US" sz="2200" b="1" dirty="0">
+                <a:latin typeface="Times New Roman" panose="02020603050405020304" pitchFamily="18" charset="0"/>
+                <a:cs typeface="Times New Roman" panose="02020603050405020304" pitchFamily="18" charset="0"/>
+              </a:rPr>
+              <a:t>Clear Role Assignments: </a:t>
+            </a:r>
+            <a:r>
+              <a:rPr lang="en-US" sz="2200" dirty="0">
+                <a:latin typeface="Times New Roman" panose="02020603050405020304" pitchFamily="18" charset="0"/>
+                <a:cs typeface="Times New Roman" panose="02020603050405020304" pitchFamily="18" charset="0"/>
+              </a:rPr>
+              <a:t>Tasks are assigned based By </a:t>
+            </a:r>
+            <a:r>
+              <a:rPr lang="en-US" sz="2200" b="1" dirty="0">
+                <a:latin typeface="Times New Roman" panose="02020603050405020304" pitchFamily="18" charset="0"/>
+                <a:cs typeface="Times New Roman" panose="02020603050405020304" pitchFamily="18" charset="0"/>
+              </a:rPr>
+              <a:t>Team Leader</a:t>
+            </a:r>
+            <a:r>
+              <a:rPr lang="en-US" sz="2200" dirty="0">
+                <a:latin typeface="Times New Roman" panose="02020603050405020304" pitchFamily="18" charset="0"/>
+                <a:cs typeface="Times New Roman" panose="02020603050405020304" pitchFamily="18" charset="0"/>
+              </a:rPr>
+              <a:t>.</a:t>
+            </a:r>
+            <a:r>
+              <a:rPr lang="en-US" sz="1800" dirty="0">
+                <a:latin typeface="Times New Roman" panose="02020603050405020304" pitchFamily="18" charset="0"/>
+                <a:cs typeface="Times New Roman" panose="02020603050405020304" pitchFamily="18" charset="0"/>
+              </a:rPr>
+              <a:t>						</a:t>
+            </a:r>
+          </a:p>
+          <a:p>
+            <a:r>
+              <a:rPr lang="en-US" sz="2200" b="1" dirty="0">
+                <a:latin typeface="Times New Roman" panose="02020603050405020304" pitchFamily="18" charset="0"/>
+                <a:cs typeface="Times New Roman" panose="02020603050405020304" pitchFamily="18" charset="0"/>
+              </a:rPr>
+              <a:t>Communication:</a:t>
+            </a:r>
+            <a:endParaRPr lang="en-US" sz="2200" dirty="0">
               <a:latin typeface="Times New Roman" panose="02020603050405020304" pitchFamily="18" charset="0"/>
               <a:cs typeface="Times New Roman" panose="02020603050405020304" pitchFamily="18" charset="0"/>
             </a:endParaRPr>
           </a:p>
+          <a:p>
+            <a:pPr lvl="1"/>
+            <a:r>
+              <a:rPr lang="en-US" sz="2200" dirty="0">
+                <a:latin typeface="Times New Roman" panose="02020603050405020304" pitchFamily="18" charset="0"/>
+                <a:cs typeface="Times New Roman" panose="02020603050405020304" pitchFamily="18" charset="0"/>
+              </a:rPr>
+              <a:t>Held regular meetings to review progress, address challenges, and plan next steps.</a:t>
+            </a:r>
+          </a:p>
+          <a:p>
+            <a:pPr lvl="1"/>
+            <a:r>
+              <a:rPr lang="en-US" sz="2200" dirty="0">
+                <a:latin typeface="Times New Roman" panose="02020603050405020304" pitchFamily="18" charset="0"/>
+                <a:cs typeface="Times New Roman" panose="02020603050405020304" pitchFamily="18" charset="0"/>
+              </a:rPr>
+              <a:t>Leveraged tools like </a:t>
+            </a:r>
+            <a:r>
+              <a:rPr lang="en-US" sz="2200" b="1" dirty="0">
+                <a:latin typeface="Times New Roman" panose="02020603050405020304" pitchFamily="18" charset="0"/>
+                <a:cs typeface="Times New Roman" panose="02020603050405020304" pitchFamily="18" charset="0"/>
+              </a:rPr>
+              <a:t>GitHub for version control </a:t>
+            </a:r>
+            <a:r>
+              <a:rPr lang="en-US" sz="2200" dirty="0">
+                <a:latin typeface="Times New Roman" panose="02020603050405020304" pitchFamily="18" charset="0"/>
+                <a:cs typeface="Times New Roman" panose="02020603050405020304" pitchFamily="18" charset="0"/>
+              </a:rPr>
+              <a:t>and collaborative development</a:t>
+            </a:r>
+            <a:r>
+              <a:rPr lang="en-US" sz="1600" dirty="0"/>
+              <a:t>.</a:t>
+            </a:r>
+          </a:p>
+          <a:p>
+            <a:pPr>
+              <a:buFont typeface="Arial" panose="020B0604020202020204" pitchFamily="34" charset="0"/>
+              <a:buChar char="•"/>
+            </a:pPr>
+            <a:r>
+              <a:rPr lang="en-US" sz="2000" b="1" dirty="0">
+                <a:latin typeface="Times New Roman" panose="02020603050405020304" pitchFamily="18" charset="0"/>
+                <a:cs typeface="Times New Roman" panose="02020603050405020304" pitchFamily="18" charset="0"/>
+              </a:rPr>
+              <a:t>Efficiency Focus:</a:t>
+            </a:r>
+            <a:r>
+              <a:rPr lang="en-US" sz="2000" dirty="0">
+                <a:latin typeface="Times New Roman" panose="02020603050405020304" pitchFamily="18" charset="0"/>
+                <a:cs typeface="Times New Roman" panose="02020603050405020304" pitchFamily="18" charset="0"/>
+              </a:rPr>
+              <a:t> Optimizing processes for real-time results and smooth </a:t>
+            </a:r>
+            <a:r>
+              <a:rPr lang="en-US" sz="2200" dirty="0">
+                <a:latin typeface="Times New Roman" panose="02020603050405020304" pitchFamily="18" charset="0"/>
+                <a:cs typeface="Times New Roman" panose="02020603050405020304" pitchFamily="18" charset="0"/>
+              </a:rPr>
+              <a:t>integration</a:t>
+            </a:r>
+            <a:r>
+              <a:rPr lang="en-US" sz="2000" dirty="0">
+                <a:latin typeface="Times New Roman" panose="02020603050405020304" pitchFamily="18" charset="0"/>
+                <a:cs typeface="Times New Roman" panose="02020603050405020304" pitchFamily="18" charset="0"/>
+              </a:rPr>
+              <a:t>.</a:t>
+            </a:r>
+          </a:p>
         </p:txBody>
       </p:sp>
+    </p:spTree>
+    <p:extLst>
+      <p:ext uri="{BB962C8B-B14F-4D97-AF65-F5344CB8AC3E}">
+        <p14:creationId xmlns:p14="http://schemas.microsoft.com/office/powerpoint/2010/main" val="3692856438"/>
+      </p:ext>
+    </p:extLst>
+  </p:cSld>
+  <p:clrMapOvr>
+    <a:masterClrMapping/>
+  </p:clrMapOvr>
+</p:sld>
+</file>
+
+<file path=ppt/slides/slide41.xml><?xml version="1.0" encoding="utf-8"?>
+<p:sld xmlns:a="http://schemas.openxmlformats.org/drawingml/2006/main" xmlns:r="http://schemas.openxmlformats.org/officeDocument/2006/relationships" xmlns:p="http://schemas.openxmlformats.org/presentationml/2006/main">
+  <p:cSld>
+    <p:spTree>
+      <p:nvGrpSpPr>
+        <p:cNvPr id="1" name=""/>
+        <p:cNvGrpSpPr/>
+        <p:nvPr/>
+      </p:nvGrpSpPr>
+      <p:grpSpPr>
+        <a:xfrm>
+          <a:off x="0" y="0"/>
+          <a:ext cx="0" cy="0"/>
+          <a:chOff x="0" y="0"/>
+          <a:chExt cx="0" cy="0"/>
+        </a:xfrm>
+      </p:grpSpPr>
       <p:pic>
         <p:nvPicPr>
           <p:cNvPr id="4" name="Picture 3">
@@ -21138,8 +20890,8 @@
         </p:blipFill>
         <p:spPr>
           <a:xfrm>
-            <a:off x="1160650" y="1078944"/>
-            <a:ext cx="7015205" cy="2939603"/>
+            <a:off x="-193494" y="1432100"/>
+            <a:ext cx="9530987" cy="3993799"/>
           </a:xfrm>
           <a:prstGeom prst="rect">
             <a:avLst/>
@@ -21215,7 +20967,7 @@
               <a:buNone/>
             </a:pPr>
             <a:r>
-              <a:rPr lang="en-US" sz="3200" dirty="0" smtClean="0">
+              <a:rPr lang="en-US" sz="3200" dirty="0">
                 <a:latin typeface="Times New Roman" panose="02020603050405020304" pitchFamily="18" charset="0"/>
                 <a:cs typeface="Times New Roman" panose="02020603050405020304" pitchFamily="18" charset="0"/>
               </a:rPr>
@@ -21291,21 +21043,8 @@
                 <a:ea typeface="Calibri" panose="020F0502020204030204" pitchFamily="34" charset="0"/>
                 <a:cs typeface="Times New Roman" panose="02020603050405020304" pitchFamily="18" charset="0"/>
               </a:rPr>
-              <a:t>Fitness is a state of health and well-being that allows a person to perform daily activities with vigor, alertness, and minimal fatigue</a:t>
-            </a:r>
-            <a:r>
-              <a:rPr lang="en-US" sz="2000" dirty="0" smtClean="0">
-                <a:latin typeface="Times New Roman" panose="02020603050405020304" pitchFamily="18" charset="0"/>
-                <a:ea typeface="Calibri" panose="020F0502020204030204" pitchFamily="34" charset="0"/>
-                <a:cs typeface="Times New Roman" panose="02020603050405020304" pitchFamily="18" charset="0"/>
-              </a:rPr>
-              <a:t>.[1]</a:t>
-            </a:r>
-            <a:endParaRPr lang="en-US" sz="2000" dirty="0">
-              <a:latin typeface="Times New Roman" panose="02020603050405020304" pitchFamily="18" charset="0"/>
-              <a:ea typeface="Calibri" panose="020F0502020204030204" pitchFamily="34" charset="0"/>
-              <a:cs typeface="Times New Roman" panose="02020603050405020304" pitchFamily="18" charset="0"/>
-            </a:endParaRPr>
+              <a:t>Fitness is a state of health and well-being that allows a person to perform daily activities with vigor, alertness, and minimal fatigue.[1]</a:t>
+            </a:r>
           </a:p>
           <a:p>
             <a:pPr marL="546100" algn="just">
@@ -21356,14 +21095,7 @@
                 <a:latin typeface="Times New Roman" panose="02020603050405020304" pitchFamily="18" charset="0"/>
                 <a:cs typeface="Times New Roman" panose="02020603050405020304" pitchFamily="18" charset="0"/>
               </a:rPr>
-              <a:t> is a specific selection of food and drink designed to meet health or fitness goals. It is often short-term and tailored to address immediate needs like weight loss or muscle gain</a:t>
-            </a:r>
-            <a:r>
-              <a:rPr lang="en-GB" sz="2000" dirty="0" smtClean="0">
-                <a:latin typeface="Times New Roman" panose="02020603050405020304" pitchFamily="18" charset="0"/>
-                <a:cs typeface="Times New Roman" panose="02020603050405020304" pitchFamily="18" charset="0"/>
-              </a:rPr>
-              <a:t>.[1]</a:t>
+              <a:t> is a specific selection of food and drink designed to meet health or fitness goals. It is often short-term and tailored to address immediate needs like weight loss or muscle gain.[1]</a:t>
             </a:r>
             <a:endParaRPr lang="en-US" sz="2000" dirty="0">
               <a:latin typeface="Times New Roman" panose="02020603050405020304" pitchFamily="18" charset="0"/>
@@ -21426,7 +21158,7 @@
                 <a:hlinkClick r:id="rId3">
                   <a:extLst>
                     <a:ext uri="{A12FA001-AC4F-418D-AE19-62706E023703}">
-                      <ahyp:hlinkClr xmlns:lc="http://schemas.openxmlformats.org/drawingml/2006/lockedCanvas" xmlns="" xmlns:ahyp="http://schemas.microsoft.com/office/drawing/2018/hyperlinkcolor" val="tx"/>
+                      <ahyp:hlinkClr xmlns:ahyp="http://schemas.microsoft.com/office/drawing/2018/hyperlinkcolor" val="tx"/>
                     </a:ext>
                   </a:extLst>
                 </a:hlinkClick>
@@ -21441,7 +21173,7 @@
                 <a:hlinkClick r:id="rId3">
                   <a:extLst>
                     <a:ext uri="{A12FA001-AC4F-418D-AE19-62706E023703}">
-                      <ahyp:hlinkClr xmlns:lc="http://schemas.openxmlformats.org/drawingml/2006/lockedCanvas" xmlns="" xmlns:ahyp="http://schemas.microsoft.com/office/drawing/2018/hyperlinkcolor" val="tx"/>
+                      <ahyp:hlinkClr xmlns:ahyp="http://schemas.microsoft.com/office/drawing/2018/hyperlinkcolor" val="tx"/>
                     </a:ext>
                   </a:extLst>
                 </a:hlinkClick>
@@ -21501,21 +21233,7 @@
                 <a:latin typeface="Times New Roman" panose="02020603050405020304" pitchFamily="18" charset="0"/>
                 <a:cs typeface="Times New Roman" panose="02020603050405020304" pitchFamily="18" charset="0"/>
               </a:rPr>
-              <a:t>Background and </a:t>
-            </a:r>
-            <a:r>
-              <a:rPr lang="en-US" sz="3200" dirty="0" smtClean="0">
-                <a:latin typeface="Times New Roman" panose="02020603050405020304" pitchFamily="18" charset="0"/>
-                <a:cs typeface="Times New Roman" panose="02020603050405020304" pitchFamily="18" charset="0"/>
-              </a:rPr>
-              <a:t>Introduction[2/2</a:t>
-            </a:r>
-            <a:r>
-              <a:rPr lang="en-US" sz="3200" dirty="0">
-                <a:latin typeface="Times New Roman" panose="02020603050405020304" pitchFamily="18" charset="0"/>
-                <a:cs typeface="Times New Roman" panose="02020603050405020304" pitchFamily="18" charset="0"/>
-              </a:rPr>
-              <a:t>]</a:t>
+              <a:t>Background and Introduction[2/2]</a:t>
             </a:r>
             <a:endParaRPr lang="en-GB" sz="3200" dirty="0">
               <a:latin typeface="Times New Roman" panose="02020603050405020304" pitchFamily="18" charset="0"/>
@@ -21540,60 +21258,18 @@
           <a:lstStyle/>
           <a:p>
             <a:r>
-              <a:rPr lang="en-GB" sz="2500" b="1" dirty="0" smtClean="0">
+              <a:rPr lang="en-GB" sz="2500" b="1" dirty="0">
                 <a:latin typeface="Times New Roman" panose="02020603050405020304" pitchFamily="18" charset="0"/>
                 <a:cs typeface="Times New Roman" panose="02020603050405020304" pitchFamily="18" charset="0"/>
               </a:rPr>
               <a:t>Fitnessstan</a:t>
             </a:r>
             <a:r>
-              <a:rPr lang="en-GB" sz="2500" dirty="0" smtClean="0">
-                <a:latin typeface="Times New Roman" panose="02020603050405020304" pitchFamily="18" charset="0"/>
-                <a:cs typeface="Times New Roman" panose="02020603050405020304" pitchFamily="18" charset="0"/>
-              </a:rPr>
-              <a:t> </a:t>
-            </a:r>
-            <a:r>
               <a:rPr lang="en-GB" sz="2500" dirty="0">
                 <a:latin typeface="Times New Roman" panose="02020603050405020304" pitchFamily="18" charset="0"/>
                 <a:cs typeface="Times New Roman" panose="02020603050405020304" pitchFamily="18" charset="0"/>
               </a:rPr>
-              <a:t>is an AI-powered web </a:t>
-            </a:r>
-            <a:r>
-              <a:rPr lang="en-GB" sz="2500" dirty="0" smtClean="0">
-                <a:latin typeface="Times New Roman" panose="02020603050405020304" pitchFamily="18" charset="0"/>
-                <a:cs typeface="Times New Roman" panose="02020603050405020304" pitchFamily="18" charset="0"/>
-              </a:rPr>
-              <a:t>platform </a:t>
-            </a:r>
-            <a:r>
-              <a:rPr lang="en-GB" sz="2500" dirty="0">
-                <a:latin typeface="Times New Roman" panose="02020603050405020304" pitchFamily="18" charset="0"/>
-                <a:cs typeface="Times New Roman" panose="02020603050405020304" pitchFamily="18" charset="0"/>
-              </a:rPr>
-              <a:t>that provides personalized fitness solutions for health-conscious individuals, including those managing conditions like </a:t>
-            </a:r>
-            <a:r>
-              <a:rPr lang="en-GB" sz="2500" dirty="0" smtClean="0">
-                <a:latin typeface="Times New Roman" panose="02020603050405020304" pitchFamily="18" charset="0"/>
-                <a:cs typeface="Times New Roman" panose="02020603050405020304" pitchFamily="18" charset="0"/>
-              </a:rPr>
-              <a:t>obesity</a:t>
-            </a:r>
-            <a:r>
-              <a:rPr lang="en-GB" sz="2500" dirty="0" smtClean="0">
-                <a:latin typeface="Times New Roman" panose="02020603050405020304" pitchFamily="18" charset="0"/>
-                <a:cs typeface="Times New Roman" panose="02020603050405020304" pitchFamily="18" charset="0"/>
-              </a:rPr>
-              <a:t>. </a:t>
-            </a:r>
-            <a:r>
-              <a:rPr lang="en-GB" sz="2500" dirty="0">
-                <a:latin typeface="Times New Roman" panose="02020603050405020304" pitchFamily="18" charset="0"/>
-                <a:cs typeface="Times New Roman" panose="02020603050405020304" pitchFamily="18" charset="0"/>
-              </a:rPr>
-              <a:t>By integrating tailored workout and diet recommendations, the platform ensures a balanced and comprehensive approach to achieving fitness goals. Its user-friendly design and accessibility aim to make fitness achievable for everyone.</a:t>
+              <a:t> is an AI-powered web platform that provides personalized fitness solutions for health-conscious individuals, including those managing conditions like obesity. By integrating tailored workout and diet recommendations, the platform ensures a balanced and comprehensive approach to achieving fitness goals. Its user-friendly design and accessibility aim to make fitness achievable for everyone.</a:t>
             </a:r>
           </a:p>
           <a:p>
@@ -21745,14 +21421,7 @@
                 <a:latin typeface="Times New Roman" panose="02020603050405020304" pitchFamily="18" charset="0"/>
                 <a:cs typeface="Times New Roman" panose="02020603050405020304" pitchFamily="18" charset="0"/>
               </a:rPr>
-              <a:t>Literature </a:t>
-            </a:r>
-            <a:r>
-              <a:rPr lang="en-US" sz="3200" dirty="0" smtClean="0">
-                <a:latin typeface="Times New Roman" panose="02020603050405020304" pitchFamily="18" charset="0"/>
-                <a:cs typeface="Times New Roman" panose="02020603050405020304" pitchFamily="18" charset="0"/>
-              </a:rPr>
-              <a:t>Review [1/6]</a:t>
+              <a:t>Literature Review [1/6]</a:t>
             </a:r>
             <a:endParaRPr sz="3200" dirty="0">
               <a:latin typeface="Times New Roman" panose="02020603050405020304" pitchFamily="18" charset="0"/>
@@ -21802,31 +21471,7 @@
                 <a:ea typeface="Calibri" panose="020F0502020204030204" pitchFamily="34" charset="0"/>
                 <a:cs typeface="Times New Roman" panose="02020603050405020304" pitchFamily="18" charset="0"/>
               </a:rPr>
-              <a:t>There's been a substantial increase in the usage of fitness </a:t>
-            </a:r>
-            <a:r>
-              <a:rPr lang="en-US" sz="2500" dirty="0" smtClean="0">
-                <a:latin typeface="Times New Roman" panose="02020603050405020304" pitchFamily="18" charset="0"/>
-                <a:ea typeface="Calibri" panose="020F0502020204030204" pitchFamily="34" charset="0"/>
-                <a:cs typeface="Times New Roman" panose="02020603050405020304" pitchFamily="18" charset="0"/>
-              </a:rPr>
-              <a:t>platforms </a:t>
-            </a:r>
-            <a:r>
-              <a:rPr lang="en-US" sz="2500" dirty="0" smtClean="0">
-                <a:latin typeface="Times New Roman" panose="02020603050405020304" pitchFamily="18" charset="0"/>
-                <a:ea typeface="Calibri" panose="020F0502020204030204" pitchFamily="34" charset="0"/>
-                <a:cs typeface="Times New Roman" panose="02020603050405020304" pitchFamily="18" charset="0"/>
-              </a:rPr>
-              <a:t>using </a:t>
-            </a:r>
-            <a:r>
-              <a:rPr lang="en-US" sz="2500" dirty="0">
-                <a:latin typeface="Times New Roman" panose="02020603050405020304" pitchFamily="18" charset="0"/>
-                <a:ea typeface="Calibri" panose="020F0502020204030204" pitchFamily="34" charset="0"/>
-                <a:cs typeface="Times New Roman" panose="02020603050405020304" pitchFamily="18" charset="0"/>
-              </a:rPr>
-              <a:t>AI, with an annual growth rate of 17%. [1]</a:t>
+              <a:t>There's been a substantial increase in the usage of fitness platforms using AI, with an annual growth rate of 17%. [1]</a:t>
             </a:r>
           </a:p>
           <a:p>
@@ -21922,7 +21567,7 @@
                 <a:hlinkClick r:id="rId3">
                   <a:extLst>
                     <a:ext uri="{A12FA001-AC4F-418D-AE19-62706E023703}">
-                      <ahyp:hlinkClr xmlns:lc="http://schemas.openxmlformats.org/drawingml/2006/lockedCanvas" xmlns:ahyp="http://schemas.microsoft.com/office/drawing/2018/hyperlinkcolor" xmlns="" val="tx"/>
+                      <ahyp:hlinkClr xmlns:ahyp="http://schemas.microsoft.com/office/drawing/2018/hyperlinkcolor" val="tx"/>
                     </a:ext>
                   </a:extLst>
                 </a:hlinkClick>
@@ -21961,7 +21606,7 @@
                 <a:hlinkClick r:id="rId4">
                   <a:extLst>
                     <a:ext uri="{A12FA001-AC4F-418D-AE19-62706E023703}">
-                      <ahyp:hlinkClr xmlns:lc="http://schemas.openxmlformats.org/drawingml/2006/lockedCanvas" xmlns:ahyp="http://schemas.microsoft.com/office/drawing/2018/hyperlinkcolor" xmlns="" val="tx"/>
+                      <ahyp:hlinkClr xmlns:ahyp="http://schemas.microsoft.com/office/drawing/2018/hyperlinkcolor" val="tx"/>
                     </a:ext>
                   </a:extLst>
                 </a:hlinkClick>
@@ -22000,7 +21645,7 @@
                 <a:hlinkClick r:id="rId5">
                   <a:extLst>
                     <a:ext uri="{A12FA001-AC4F-418D-AE19-62706E023703}">
-                      <ahyp:hlinkClr xmlns:lc="http://schemas.openxmlformats.org/drawingml/2006/lockedCanvas" xmlns:ahyp="http://schemas.microsoft.com/office/drawing/2018/hyperlinkcolor" xmlns="" val="tx"/>
+                      <ahyp:hlinkClr xmlns:ahyp="http://schemas.microsoft.com/office/drawing/2018/hyperlinkcolor" val="tx"/>
                     </a:ext>
                   </a:extLst>
                 </a:hlinkClick>
@@ -22063,21 +21708,7 @@
                 <a:latin typeface="Times New Roman" panose="02020603050405020304" pitchFamily="18" charset="0"/>
                 <a:cs typeface="Times New Roman" panose="02020603050405020304" pitchFamily="18" charset="0"/>
               </a:rPr>
-              <a:t>Literature Review </a:t>
-            </a:r>
-            <a:r>
-              <a:rPr lang="en-US" sz="3200" dirty="0" smtClean="0">
-                <a:latin typeface="Times New Roman" panose="02020603050405020304" pitchFamily="18" charset="0"/>
-                <a:cs typeface="Times New Roman" panose="02020603050405020304" pitchFamily="18" charset="0"/>
-              </a:rPr>
-              <a:t>[2/6</a:t>
-            </a:r>
-            <a:r>
-              <a:rPr lang="en-US" sz="3200" dirty="0">
-                <a:latin typeface="Times New Roman" panose="02020603050405020304" pitchFamily="18" charset="0"/>
-                <a:cs typeface="Times New Roman" panose="02020603050405020304" pitchFamily="18" charset="0"/>
-              </a:rPr>
-              <a:t>]</a:t>
+              <a:t>Literature Review [2/6]</a:t>
             </a:r>
             <a:endParaRPr lang="en-GB" sz="3200" dirty="0">
               <a:latin typeface="Times New Roman" panose="02020603050405020304" pitchFamily="18" charset="0"/>
@@ -22277,7 +21908,7 @@
                 <a:hlinkClick r:id="rId2">
                   <a:extLst>
                     <a:ext uri="{A12FA001-AC4F-418D-AE19-62706E023703}">
-                      <ahyp:hlinkClr xmlns:lc="http://schemas.openxmlformats.org/drawingml/2006/lockedCanvas" xmlns:ahyp="http://schemas.microsoft.com/office/drawing/2018/hyperlinkcolor" xmlns="" val="tx"/>
+                      <ahyp:hlinkClr xmlns:ahyp="http://schemas.microsoft.com/office/drawing/2018/hyperlinkcolor" val="tx"/>
                     </a:ext>
                   </a:extLst>
                 </a:hlinkClick>

</xml_diff>